<commit_message>
Finish presentation + finish comments in code
</commit_message>
<xml_diff>
--- a/Documentation/CargoFlow_Presentation.pptx
+++ b/Documentation/CargoFlow_Presentation.pptx
@@ -5,19 +5,21 @@
     <p:sldMasterId id="2147483648" r:id="rId1"/>
   </p:sldMasterIdLst>
   <p:notesMasterIdLst>
-    <p:notesMasterId r:id="rId12"/>
+    <p:notesMasterId r:id="rId14"/>
   </p:notesMasterIdLst>
   <p:sldIdLst>
     <p:sldId id="256" r:id="rId2"/>
     <p:sldId id="265" r:id="rId3"/>
-    <p:sldId id="257" r:id="rId4"/>
-    <p:sldId id="258" r:id="rId5"/>
-    <p:sldId id="259" r:id="rId6"/>
-    <p:sldId id="266" r:id="rId7"/>
-    <p:sldId id="267" r:id="rId8"/>
-    <p:sldId id="261" r:id="rId9"/>
-    <p:sldId id="262" r:id="rId10"/>
-    <p:sldId id="264" r:id="rId11"/>
+    <p:sldId id="268" r:id="rId4"/>
+    <p:sldId id="269" r:id="rId5"/>
+    <p:sldId id="270" r:id="rId6"/>
+    <p:sldId id="271" r:id="rId7"/>
+    <p:sldId id="272" r:id="rId8"/>
+    <p:sldId id="266" r:id="rId9"/>
+    <p:sldId id="273" r:id="rId10"/>
+    <p:sldId id="261" r:id="rId11"/>
+    <p:sldId id="262" r:id="rId12"/>
+    <p:sldId id="264" r:id="rId13"/>
   </p:sldIdLst>
   <p:sldSz cx="12192000" cy="6858000"/>
   <p:notesSz cx="6858000" cy="9144000"/>
@@ -127,7 +129,7 @@
 <file path=ppt/revisionInfo.xml><?xml version="1.0" encoding="utf-8"?>
 <p1510:revInfo xmlns:a="http://schemas.openxmlformats.org/drawingml/2006/main" xmlns:r="http://schemas.openxmlformats.org/officeDocument/2006/relationships" xmlns:p1510="http://schemas.microsoft.com/office/powerpoint/2015/10/main">
   <p1510:revLst>
-    <p1510:client id="{1BC09A2E-875D-4A1E-94FE-C9A40C0C8D60}" v="5" dt="2024-01-14T15:16:46.321"/>
+    <p1510:client id="{1BC09A2E-875D-4A1E-94FE-C9A40C0C8D60}" v="15" dt="2024-01-14T17:34:07.314"/>
     <p1510:client id="{56B12A74-7565-4FAE-90F3-D47DADDF4237}" v="96" dt="2024-01-13T21:27:52.994"/>
   </p1510:revLst>
 </p1510:revInfo>
@@ -137,19 +139,34 @@
 <pc:chgInfo xmlns:a="http://schemas.openxmlformats.org/drawingml/2006/main" xmlns:r="http://schemas.openxmlformats.org/officeDocument/2006/relationships" xmlns:ac="http://schemas.microsoft.com/office/drawing/2013/main/command" xmlns:pc="http://schemas.microsoft.com/office/powerpoint/2013/main/command">
   <pc:docChgLst>
     <pc:chgData name="Antoine Martet" userId="19c2f1c6d7cf0253" providerId="LiveId" clId="{1BC09A2E-875D-4A1E-94FE-C9A40C0C8D60}"/>
-    <pc:docChg chg="undo custSel addSld delSld modSld">
-      <pc:chgData name="Antoine Martet" userId="19c2f1c6d7cf0253" providerId="LiveId" clId="{1BC09A2E-875D-4A1E-94FE-C9A40C0C8D60}" dt="2024-01-14T15:28:55.906" v="822" actId="20577"/>
+    <pc:docChg chg="undo redo custSel addSld delSld modSld">
+      <pc:chgData name="Antoine Martet" userId="19c2f1c6d7cf0253" providerId="LiveId" clId="{1BC09A2E-875D-4A1E-94FE-C9A40C0C8D60}" dt="2024-01-14T18:18:45.228" v="1530" actId="2696"/>
       <pc:docMkLst>
         <pc:docMk/>
       </pc:docMkLst>
-      <pc:sldChg chg="modSp mod">
-        <pc:chgData name="Antoine Martet" userId="19c2f1c6d7cf0253" providerId="LiveId" clId="{1BC09A2E-875D-4A1E-94FE-C9A40C0C8D60}" dt="2024-01-14T14:22:43.702" v="22" actId="20577"/>
+      <pc:sldChg chg="modSp">
+        <pc:chgData name="Antoine Martet" userId="19c2f1c6d7cf0253" providerId="LiveId" clId="{1BC09A2E-875D-4A1E-94FE-C9A40C0C8D60}" dt="2024-01-14T16:56:23.834" v="825" actId="207"/>
+        <pc:sldMkLst>
+          <pc:docMk/>
+          <pc:sldMk cId="3081763230" sldId="256"/>
+        </pc:sldMkLst>
+        <pc:spChg chg="mod">
+          <ac:chgData name="Antoine Martet" userId="19c2f1c6d7cf0253" providerId="LiveId" clId="{1BC09A2E-875D-4A1E-94FE-C9A40C0C8D60}" dt="2024-01-14T16:56:23.834" v="825" actId="207"/>
+          <ac:spMkLst>
+            <pc:docMk/>
+            <pc:sldMk cId="3081763230" sldId="256"/>
+            <ac:spMk id="2" creationId="{BD26FBBD-2494-72F0-CBFE-3960FC309E81}"/>
+          </ac:spMkLst>
+        </pc:spChg>
+      </pc:sldChg>
+      <pc:sldChg chg="modSp del mod">
+        <pc:chgData name="Antoine Martet" userId="19c2f1c6d7cf0253" providerId="LiveId" clId="{1BC09A2E-875D-4A1E-94FE-C9A40C0C8D60}" dt="2024-01-14T17:03:37.776" v="880" actId="2696"/>
         <pc:sldMkLst>
           <pc:docMk/>
           <pc:sldMk cId="338176886" sldId="257"/>
         </pc:sldMkLst>
         <pc:spChg chg="mod">
-          <ac:chgData name="Antoine Martet" userId="19c2f1c6d7cf0253" providerId="LiveId" clId="{1BC09A2E-875D-4A1E-94FE-C9A40C0C8D60}" dt="2024-01-14T14:22:43.702" v="22" actId="20577"/>
+          <ac:chgData name="Antoine Martet" userId="19c2f1c6d7cf0253" providerId="LiveId" clId="{1BC09A2E-875D-4A1E-94FE-C9A40C0C8D60}" dt="2024-01-14T17:02:04.835" v="876" actId="20577"/>
           <ac:spMkLst>
             <pc:docMk/>
             <pc:sldMk cId="338176886" sldId="257"/>
@@ -157,8 +174,15 @@
           </ac:spMkLst>
         </pc:spChg>
       </pc:sldChg>
-      <pc:sldChg chg="mod modShow">
-        <pc:chgData name="Antoine Martet" userId="19c2f1c6d7cf0253" providerId="LiveId" clId="{1BC09A2E-875D-4A1E-94FE-C9A40C0C8D60}" dt="2024-01-14T15:21:54.289" v="619" actId="729"/>
+      <pc:sldChg chg="del">
+        <pc:chgData name="Antoine Martet" userId="19c2f1c6d7cf0253" providerId="LiveId" clId="{1BC09A2E-875D-4A1E-94FE-C9A40C0C8D60}" dt="2024-01-14T17:29:48.262" v="904" actId="2696"/>
+        <pc:sldMkLst>
+          <pc:docMk/>
+          <pc:sldMk cId="1382432922" sldId="258"/>
+        </pc:sldMkLst>
+      </pc:sldChg>
+      <pc:sldChg chg="del mod modShow">
+        <pc:chgData name="Antoine Martet" userId="19c2f1c6d7cf0253" providerId="LiveId" clId="{1BC09A2E-875D-4A1E-94FE-C9A40C0C8D60}" dt="2024-01-14T18:18:36.014" v="1529" actId="2696"/>
         <pc:sldMkLst>
           <pc:docMk/>
           <pc:sldMk cId="2686455783" sldId="259"/>
@@ -195,13 +219,13 @@
         </pc:spChg>
       </pc:sldChg>
       <pc:sldChg chg="modSp mod">
-        <pc:chgData name="Antoine Martet" userId="19c2f1c6d7cf0253" providerId="LiveId" clId="{1BC09A2E-875D-4A1E-94FE-C9A40C0C8D60}" dt="2024-01-14T15:22:46.870" v="657" actId="20577"/>
+        <pc:chgData name="Antoine Martet" userId="19c2f1c6d7cf0253" providerId="LiveId" clId="{1BC09A2E-875D-4A1E-94FE-C9A40C0C8D60}" dt="2024-01-14T18:18:05.283" v="1528" actId="20577"/>
         <pc:sldMkLst>
           <pc:docMk/>
           <pc:sldMk cId="600273276" sldId="265"/>
         </pc:sldMkLst>
         <pc:spChg chg="mod">
-          <ac:chgData name="Antoine Martet" userId="19c2f1c6d7cf0253" providerId="LiveId" clId="{1BC09A2E-875D-4A1E-94FE-C9A40C0C8D60}" dt="2024-01-14T15:22:46.870" v="657" actId="20577"/>
+          <ac:chgData name="Antoine Martet" userId="19c2f1c6d7cf0253" providerId="LiveId" clId="{1BC09A2E-875D-4A1E-94FE-C9A40C0C8D60}" dt="2024-01-14T18:18:05.283" v="1528" actId="20577"/>
           <ac:spMkLst>
             <pc:docMk/>
             <pc:sldMk cId="600273276" sldId="265"/>
@@ -224,8 +248,8 @@
           </ac:spMkLst>
         </pc:spChg>
       </pc:sldChg>
-      <pc:sldChg chg="addSp delSp modSp new mod">
-        <pc:chgData name="Antoine Martet" userId="19c2f1c6d7cf0253" providerId="LiveId" clId="{1BC09A2E-875D-4A1E-94FE-C9A40C0C8D60}" dt="2024-01-14T15:23:12.327" v="677" actId="14100"/>
+      <pc:sldChg chg="addSp delSp modSp new del mod modShow">
+        <pc:chgData name="Antoine Martet" userId="19c2f1c6d7cf0253" providerId="LiveId" clId="{1BC09A2E-875D-4A1E-94FE-C9A40C0C8D60}" dt="2024-01-14T18:18:45.228" v="1530" actId="2696"/>
         <pc:sldMkLst>
           <pc:docMk/>
           <pc:sldMk cId="4160466644" sldId="267"/>
@@ -389,6 +413,176 @@
           <pc:docMk/>
           <pc:sldMk cId="877894301" sldId="268"/>
         </pc:sldMkLst>
+      </pc:sldChg>
+      <pc:sldChg chg="addSp delSp modSp add mod">
+        <pc:chgData name="Antoine Martet" userId="19c2f1c6d7cf0253" providerId="LiveId" clId="{1BC09A2E-875D-4A1E-94FE-C9A40C0C8D60}" dt="2024-01-14T17:30:26.544" v="919" actId="1038"/>
+        <pc:sldMkLst>
+          <pc:docMk/>
+          <pc:sldMk cId="4181173588" sldId="268"/>
+        </pc:sldMkLst>
+        <pc:spChg chg="add del mod">
+          <ac:chgData name="Antoine Martet" userId="19c2f1c6d7cf0253" providerId="LiveId" clId="{1BC09A2E-875D-4A1E-94FE-C9A40C0C8D60}" dt="2024-01-14T17:29:08.664" v="902" actId="478"/>
+          <ac:spMkLst>
+            <pc:docMk/>
+            <pc:sldMk cId="4181173588" sldId="268"/>
+            <ac:spMk id="4" creationId="{3E98EDEB-B791-A009-65C2-D0E44DDBDFB7}"/>
+          </ac:spMkLst>
+        </pc:spChg>
+        <pc:spChg chg="del mod">
+          <ac:chgData name="Antoine Martet" userId="19c2f1c6d7cf0253" providerId="LiveId" clId="{1BC09A2E-875D-4A1E-94FE-C9A40C0C8D60}" dt="2024-01-14T17:25:16.209" v="883" actId="478"/>
+          <ac:spMkLst>
+            <pc:docMk/>
+            <pc:sldMk cId="4181173588" sldId="268"/>
+            <ac:spMk id="11" creationId="{5D3478D9-6DB1-8B21-054B-95EFB3D9BD9B}"/>
+          </ac:spMkLst>
+        </pc:spChg>
+        <pc:spChg chg="add del mod">
+          <ac:chgData name="Antoine Martet" userId="19c2f1c6d7cf0253" providerId="LiveId" clId="{1BC09A2E-875D-4A1E-94FE-C9A40C0C8D60}" dt="2024-01-14T17:25:34.372" v="888" actId="14100"/>
+          <ac:spMkLst>
+            <pc:docMk/>
+            <pc:sldMk cId="4181173588" sldId="268"/>
+            <ac:spMk id="17" creationId="{2D1B6F76-30B5-9BEF-DA4C-B0DB84809F1F}"/>
+          </ac:spMkLst>
+        </pc:spChg>
+        <pc:picChg chg="add mod">
+          <ac:chgData name="Antoine Martet" userId="19c2f1c6d7cf0253" providerId="LiveId" clId="{1BC09A2E-875D-4A1E-94FE-C9A40C0C8D60}" dt="2024-01-14T17:30:26.544" v="919" actId="1038"/>
+          <ac:picMkLst>
+            <pc:docMk/>
+            <pc:sldMk cId="4181173588" sldId="268"/>
+            <ac:picMk id="3" creationId="{EC54F52B-6CDF-17D3-D21B-6E3BB885224F}"/>
+          </ac:picMkLst>
+        </pc:picChg>
+        <pc:picChg chg="del">
+          <ac:chgData name="Antoine Martet" userId="19c2f1c6d7cf0253" providerId="LiveId" clId="{1BC09A2E-875D-4A1E-94FE-C9A40C0C8D60}" dt="2024-01-14T17:25:16.938" v="884" actId="478"/>
+          <ac:picMkLst>
+            <pc:docMk/>
+            <pc:sldMk cId="4181173588" sldId="268"/>
+            <ac:picMk id="10" creationId="{2F0BA88D-38B9-2405-A45B-333CAFC643C6}"/>
+          </ac:picMkLst>
+        </pc:picChg>
+      </pc:sldChg>
+      <pc:sldChg chg="addSp modSp add mod">
+        <pc:chgData name="Antoine Martet" userId="19c2f1c6d7cf0253" providerId="LiveId" clId="{1BC09A2E-875D-4A1E-94FE-C9A40C0C8D60}" dt="2024-01-14T17:30:23.779" v="917" actId="1037"/>
+        <pc:sldMkLst>
+          <pc:docMk/>
+          <pc:sldMk cId="42842401" sldId="269"/>
+        </pc:sldMkLst>
+        <pc:picChg chg="add mod">
+          <ac:chgData name="Antoine Martet" userId="19c2f1c6d7cf0253" providerId="LiveId" clId="{1BC09A2E-875D-4A1E-94FE-C9A40C0C8D60}" dt="2024-01-14T17:30:23.779" v="917" actId="1037"/>
+          <ac:picMkLst>
+            <pc:docMk/>
+            <pc:sldMk cId="42842401" sldId="269"/>
+            <ac:picMk id="3" creationId="{D8C5A062-E4ED-2710-EE95-D5C029455AC5}"/>
+          </ac:picMkLst>
+        </pc:picChg>
+      </pc:sldChg>
+      <pc:sldChg chg="addSp modSp add mod">
+        <pc:chgData name="Antoine Martet" userId="19c2f1c6d7cf0253" providerId="LiveId" clId="{1BC09A2E-875D-4A1E-94FE-C9A40C0C8D60}" dt="2024-01-14T17:31:49.616" v="948" actId="14100"/>
+        <pc:sldMkLst>
+          <pc:docMk/>
+          <pc:sldMk cId="3236359669" sldId="270"/>
+        </pc:sldMkLst>
+        <pc:picChg chg="add mod">
+          <ac:chgData name="Antoine Martet" userId="19c2f1c6d7cf0253" providerId="LiveId" clId="{1BC09A2E-875D-4A1E-94FE-C9A40C0C8D60}" dt="2024-01-14T17:31:49.616" v="948" actId="14100"/>
+          <ac:picMkLst>
+            <pc:docMk/>
+            <pc:sldMk cId="3236359669" sldId="270"/>
+            <ac:picMk id="3" creationId="{A520E31E-7D8D-B8AD-25F3-F5BFE3147D28}"/>
+          </ac:picMkLst>
+        </pc:picChg>
+      </pc:sldChg>
+      <pc:sldChg chg="addSp modSp add mod">
+        <pc:chgData name="Antoine Martet" userId="19c2f1c6d7cf0253" providerId="LiveId" clId="{1BC09A2E-875D-4A1E-94FE-C9A40C0C8D60}" dt="2024-01-14T17:32:28.393" v="989" actId="1037"/>
+        <pc:sldMkLst>
+          <pc:docMk/>
+          <pc:sldMk cId="1957221898" sldId="271"/>
+        </pc:sldMkLst>
+        <pc:picChg chg="add mod">
+          <ac:chgData name="Antoine Martet" userId="19c2f1c6d7cf0253" providerId="LiveId" clId="{1BC09A2E-875D-4A1E-94FE-C9A40C0C8D60}" dt="2024-01-14T17:32:28.393" v="989" actId="1037"/>
+          <ac:picMkLst>
+            <pc:docMk/>
+            <pc:sldMk cId="1957221898" sldId="271"/>
+            <ac:picMk id="3" creationId="{D4EF20A4-84A8-790C-567F-B79C776A7FC1}"/>
+          </ac:picMkLst>
+        </pc:picChg>
+      </pc:sldChg>
+      <pc:sldChg chg="addSp modSp add mod">
+        <pc:chgData name="Antoine Martet" userId="19c2f1c6d7cf0253" providerId="LiveId" clId="{1BC09A2E-875D-4A1E-94FE-C9A40C0C8D60}" dt="2024-01-14T17:32:45.821" v="1019" actId="1037"/>
+        <pc:sldMkLst>
+          <pc:docMk/>
+          <pc:sldMk cId="3778939939" sldId="272"/>
+        </pc:sldMkLst>
+        <pc:picChg chg="add mod">
+          <ac:chgData name="Antoine Martet" userId="19c2f1c6d7cf0253" providerId="LiveId" clId="{1BC09A2E-875D-4A1E-94FE-C9A40C0C8D60}" dt="2024-01-14T17:32:45.821" v="1019" actId="1037"/>
+          <ac:picMkLst>
+            <pc:docMk/>
+            <pc:sldMk cId="3778939939" sldId="272"/>
+            <ac:picMk id="3" creationId="{82A13E38-7B81-8C4C-BD1D-50CF697E0FB8}"/>
+          </ac:picMkLst>
+        </pc:picChg>
+      </pc:sldChg>
+      <pc:sldChg chg="addSp delSp modSp new mod">
+        <pc:chgData name="Antoine Martet" userId="19c2f1c6d7cf0253" providerId="LiveId" clId="{1BC09A2E-875D-4A1E-94FE-C9A40C0C8D60}" dt="2024-01-14T17:53:09.315" v="1475" actId="20577"/>
+        <pc:sldMkLst>
+          <pc:docMk/>
+          <pc:sldMk cId="834568603" sldId="273"/>
+        </pc:sldMkLst>
+        <pc:spChg chg="mod">
+          <ac:chgData name="Antoine Martet" userId="19c2f1c6d7cf0253" providerId="LiveId" clId="{1BC09A2E-875D-4A1E-94FE-C9A40C0C8D60}" dt="2024-01-14T17:33:51.324" v="1034" actId="20577"/>
+          <ac:spMkLst>
+            <pc:docMk/>
+            <pc:sldMk cId="834568603" sldId="273"/>
+            <ac:spMk id="2" creationId="{8E3C57CD-B4C5-F7C5-6981-2AFB26AFE046}"/>
+          </ac:spMkLst>
+        </pc:spChg>
+        <pc:spChg chg="del mod">
+          <ac:chgData name="Antoine Martet" userId="19c2f1c6d7cf0253" providerId="LiveId" clId="{1BC09A2E-875D-4A1E-94FE-C9A40C0C8D60}" dt="2024-01-14T17:34:07.006" v="1037" actId="478"/>
+          <ac:spMkLst>
+            <pc:docMk/>
+            <pc:sldMk cId="834568603" sldId="273"/>
+            <ac:spMk id="3" creationId="{E91FC89B-175F-99F1-15E1-BF83576D9506}"/>
+          </ac:spMkLst>
+        </pc:spChg>
+        <pc:spChg chg="add mod ord">
+          <ac:chgData name="Antoine Martet" userId="19c2f1c6d7cf0253" providerId="LiveId" clId="{1BC09A2E-875D-4A1E-94FE-C9A40C0C8D60}" dt="2024-01-14T17:53:09.315" v="1475" actId="20577"/>
+          <ac:spMkLst>
+            <pc:docMk/>
+            <pc:sldMk cId="834568603" sldId="273"/>
+            <ac:spMk id="5" creationId="{9499703C-042D-F512-B98B-225F231FC392}"/>
+          </ac:spMkLst>
+        </pc:spChg>
+        <pc:picChg chg="add mod">
+          <ac:chgData name="Antoine Martet" userId="19c2f1c6d7cf0253" providerId="LiveId" clId="{1BC09A2E-875D-4A1E-94FE-C9A40C0C8D60}" dt="2024-01-14T17:50:16.719" v="1435" actId="1038"/>
+          <ac:picMkLst>
+            <pc:docMk/>
+            <pc:sldMk cId="834568603" sldId="273"/>
+            <ac:picMk id="7" creationId="{55A5F03F-1598-1AA5-46B1-9B3A95BA4EC2}"/>
+          </ac:picMkLst>
+        </pc:picChg>
+        <pc:picChg chg="add del mod">
+          <ac:chgData name="Antoine Martet" userId="19c2f1c6d7cf0253" providerId="LiveId" clId="{1BC09A2E-875D-4A1E-94FE-C9A40C0C8D60}" dt="2024-01-14T17:46:40.172" v="1291" actId="478"/>
+          <ac:picMkLst>
+            <pc:docMk/>
+            <pc:sldMk cId="834568603" sldId="273"/>
+            <ac:picMk id="9" creationId="{8EC2E059-A979-AFA8-2E16-4A1BC3626775}"/>
+          </ac:picMkLst>
+        </pc:picChg>
+        <pc:picChg chg="add del mod">
+          <ac:chgData name="Antoine Martet" userId="19c2f1c6d7cf0253" providerId="LiveId" clId="{1BC09A2E-875D-4A1E-94FE-C9A40C0C8D60}" dt="2024-01-14T17:46:39.124" v="1290" actId="478"/>
+          <ac:picMkLst>
+            <pc:docMk/>
+            <pc:sldMk cId="834568603" sldId="273"/>
+            <ac:picMk id="11" creationId="{5C1E8D37-8FA6-EDAB-790E-C9F8B86FF861}"/>
+          </ac:picMkLst>
+        </pc:picChg>
+        <pc:picChg chg="add mod">
+          <ac:chgData name="Antoine Martet" userId="19c2f1c6d7cf0253" providerId="LiveId" clId="{1BC09A2E-875D-4A1E-94FE-C9A40C0C8D60}" dt="2024-01-14T17:50:04.150" v="1421" actId="1076"/>
+          <ac:picMkLst>
+            <pc:docMk/>
+            <pc:sldMk cId="834568603" sldId="273"/>
+            <ac:picMk id="13" creationId="{228910A3-9D45-EF53-6750-C9E421AB4730}"/>
+          </ac:picMkLst>
+        </pc:picChg>
       </pc:sldChg>
     </pc:docChg>
   </pc:docChgLst>
@@ -5619,8 +5813,9 @@
             <a:r>
               <a:rPr lang="fr-CH" sz="3600">
                 <a:solidFill>
-                  <a:schemeClr val="bg1">
+                  <a:schemeClr val="tx1">
                     <a:lumMod val="65000"/>
+                    <a:lumOff val="35000"/>
                   </a:schemeClr>
                 </a:solidFill>
               </a:rPr>
@@ -6072,6 +6267,835 @@
 <file path=ppt/slides/slide10.xml><?xml version="1.0" encoding="utf-8"?>
 <p:sld xmlns:a="http://schemas.openxmlformats.org/drawingml/2006/main" xmlns:r="http://schemas.openxmlformats.org/officeDocument/2006/relationships" xmlns:p="http://schemas.openxmlformats.org/presentationml/2006/main">
   <p:cSld>
+    <p:spTree>
+      <p:nvGrpSpPr>
+        <p:cNvPr id="1" name=""/>
+        <p:cNvGrpSpPr/>
+        <p:nvPr/>
+      </p:nvGrpSpPr>
+      <p:grpSpPr>
+        <a:xfrm>
+          <a:off x="0" y="0"/>
+          <a:ext cx="0" cy="0"/>
+          <a:chOff x="0" y="0"/>
+          <a:chExt cx="0" cy="0"/>
+        </a:xfrm>
+      </p:grpSpPr>
+      <p:sp>
+        <p:nvSpPr>
+          <p:cNvPr id="2" name="Titre 1">
+            <a:extLst>
+              <a:ext uri="{FF2B5EF4-FFF2-40B4-BE49-F238E27FC236}">
+                <a16:creationId xmlns:a16="http://schemas.microsoft.com/office/drawing/2014/main" id="{04AFF39B-F66A-9398-2B7A-52467BAF934C}"/>
+              </a:ext>
+            </a:extLst>
+          </p:cNvPr>
+          <p:cNvSpPr>
+            <a:spLocks noGrp="1"/>
+          </p:cNvSpPr>
+          <p:nvPr>
+            <p:ph type="title"/>
+          </p:nvPr>
+        </p:nvSpPr>
+        <p:spPr/>
+        <p:txBody>
+          <a:bodyPr/>
+          <a:lstStyle/>
+          <a:p>
+            <a:r>
+              <a:rPr lang="fr-CH"/>
+              <a:t>Améliorations possibles</a:t>
+            </a:r>
+          </a:p>
+        </p:txBody>
+      </p:sp>
+      <p:sp>
+        <p:nvSpPr>
+          <p:cNvPr id="5" name="Espace réservé du contenu 2">
+            <a:extLst>
+              <a:ext uri="{FF2B5EF4-FFF2-40B4-BE49-F238E27FC236}">
+                <a16:creationId xmlns:a16="http://schemas.microsoft.com/office/drawing/2014/main" id="{91888E6F-9C0C-B098-A4F5-28ADE9C34F2A}"/>
+              </a:ext>
+            </a:extLst>
+          </p:cNvPr>
+          <p:cNvSpPr txBox="1">
+            <a:spLocks/>
+          </p:cNvSpPr>
+          <p:nvPr/>
+        </p:nvSpPr>
+        <p:spPr>
+          <a:xfrm>
+            <a:off x="1124712" y="1891454"/>
+            <a:ext cx="10058400" cy="4023360"/>
+          </a:xfrm>
+          <a:prstGeom prst="rect">
+            <a:avLst/>
+          </a:prstGeom>
+        </p:spPr>
+        <p:txBody>
+          <a:bodyPr vert="horz" lIns="0" tIns="45720" rIns="0" bIns="45720" rtlCol="0">
+            <a:normAutofit/>
+          </a:bodyPr>
+          <a:lstStyle>
+            <a:lvl1pPr marL="91440" indent="-91440" algn="l" defTabSz="914400" rtl="0" eaLnBrk="1" latinLnBrk="0" hangingPunct="1">
+              <a:lnSpc>
+                <a:spcPct val="90000"/>
+              </a:lnSpc>
+              <a:spcBef>
+                <a:spcPts val="1200"/>
+              </a:spcBef>
+              <a:spcAft>
+                <a:spcPts val="200"/>
+              </a:spcAft>
+              <a:buClr>
+                <a:schemeClr val="accent1"/>
+              </a:buClr>
+              <a:buSzPct val="100000"/>
+              <a:buFont typeface="Calibri" panose="020F0502020204030204" pitchFamily="34" charset="0"/>
+              <a:buChar char=" "/>
+              <a:defRPr sz="2000" kern="1200">
+                <a:solidFill>
+                  <a:schemeClr val="tx1">
+                    <a:lumMod val="75000"/>
+                    <a:lumOff val="25000"/>
+                  </a:schemeClr>
+                </a:solidFill>
+                <a:latin typeface="+mn-lt"/>
+                <a:ea typeface="+mn-ea"/>
+                <a:cs typeface="+mn-cs"/>
+              </a:defRPr>
+            </a:lvl1pPr>
+            <a:lvl2pPr marL="384048" indent="-182880" algn="l" defTabSz="914400" rtl="0" eaLnBrk="1" latinLnBrk="0" hangingPunct="1">
+              <a:lnSpc>
+                <a:spcPct val="90000"/>
+              </a:lnSpc>
+              <a:spcBef>
+                <a:spcPts val="200"/>
+              </a:spcBef>
+              <a:spcAft>
+                <a:spcPts val="400"/>
+              </a:spcAft>
+              <a:buClr>
+                <a:schemeClr val="accent1"/>
+              </a:buClr>
+              <a:buFont typeface="Calibri" pitchFamily="34" charset="0"/>
+              <a:buChar char="◦"/>
+              <a:defRPr sz="1800" kern="1200">
+                <a:solidFill>
+                  <a:schemeClr val="tx1">
+                    <a:lumMod val="75000"/>
+                    <a:lumOff val="25000"/>
+                  </a:schemeClr>
+                </a:solidFill>
+                <a:latin typeface="+mn-lt"/>
+                <a:ea typeface="+mn-ea"/>
+                <a:cs typeface="+mn-cs"/>
+              </a:defRPr>
+            </a:lvl2pPr>
+            <a:lvl3pPr marL="566928" indent="-182880" algn="l" defTabSz="914400" rtl="0" eaLnBrk="1" latinLnBrk="0" hangingPunct="1">
+              <a:lnSpc>
+                <a:spcPct val="90000"/>
+              </a:lnSpc>
+              <a:spcBef>
+                <a:spcPts val="200"/>
+              </a:spcBef>
+              <a:spcAft>
+                <a:spcPts val="400"/>
+              </a:spcAft>
+              <a:buClr>
+                <a:schemeClr val="accent1"/>
+              </a:buClr>
+              <a:buFont typeface="Calibri" pitchFamily="34" charset="0"/>
+              <a:buChar char="◦"/>
+              <a:defRPr sz="1400" kern="1200">
+                <a:solidFill>
+                  <a:schemeClr val="tx1">
+                    <a:lumMod val="75000"/>
+                    <a:lumOff val="25000"/>
+                  </a:schemeClr>
+                </a:solidFill>
+                <a:latin typeface="+mn-lt"/>
+                <a:ea typeface="+mn-ea"/>
+                <a:cs typeface="+mn-cs"/>
+              </a:defRPr>
+            </a:lvl3pPr>
+            <a:lvl4pPr marL="749808" indent="-182880" algn="l" defTabSz="914400" rtl="0" eaLnBrk="1" latinLnBrk="0" hangingPunct="1">
+              <a:lnSpc>
+                <a:spcPct val="90000"/>
+              </a:lnSpc>
+              <a:spcBef>
+                <a:spcPts val="200"/>
+              </a:spcBef>
+              <a:spcAft>
+                <a:spcPts val="400"/>
+              </a:spcAft>
+              <a:buClr>
+                <a:schemeClr val="accent1"/>
+              </a:buClr>
+              <a:buFont typeface="Calibri" pitchFamily="34" charset="0"/>
+              <a:buChar char="◦"/>
+              <a:defRPr sz="1400" kern="1200">
+                <a:solidFill>
+                  <a:schemeClr val="tx1">
+                    <a:lumMod val="75000"/>
+                    <a:lumOff val="25000"/>
+                  </a:schemeClr>
+                </a:solidFill>
+                <a:latin typeface="+mn-lt"/>
+                <a:ea typeface="+mn-ea"/>
+                <a:cs typeface="+mn-cs"/>
+              </a:defRPr>
+            </a:lvl4pPr>
+            <a:lvl5pPr marL="932688" indent="-182880" algn="l" defTabSz="914400" rtl="0" eaLnBrk="1" latinLnBrk="0" hangingPunct="1">
+              <a:lnSpc>
+                <a:spcPct val="90000"/>
+              </a:lnSpc>
+              <a:spcBef>
+                <a:spcPts val="200"/>
+              </a:spcBef>
+              <a:spcAft>
+                <a:spcPts val="400"/>
+              </a:spcAft>
+              <a:buClr>
+                <a:schemeClr val="accent1"/>
+              </a:buClr>
+              <a:buFont typeface="Calibri" pitchFamily="34" charset="0"/>
+              <a:buChar char="◦"/>
+              <a:defRPr sz="1400" kern="1200">
+                <a:solidFill>
+                  <a:schemeClr val="tx1">
+                    <a:lumMod val="75000"/>
+                    <a:lumOff val="25000"/>
+                  </a:schemeClr>
+                </a:solidFill>
+                <a:latin typeface="+mn-lt"/>
+                <a:ea typeface="+mn-ea"/>
+                <a:cs typeface="+mn-cs"/>
+              </a:defRPr>
+            </a:lvl5pPr>
+            <a:lvl6pPr marL="1100000" indent="-228600" algn="l" defTabSz="914400" rtl="0" eaLnBrk="1" latinLnBrk="0" hangingPunct="1">
+              <a:lnSpc>
+                <a:spcPct val="90000"/>
+              </a:lnSpc>
+              <a:spcBef>
+                <a:spcPts val="200"/>
+              </a:spcBef>
+              <a:spcAft>
+                <a:spcPts val="400"/>
+              </a:spcAft>
+              <a:buClr>
+                <a:schemeClr val="accent1"/>
+              </a:buClr>
+              <a:buFont typeface="Calibri" pitchFamily="34" charset="0"/>
+              <a:buChar char="◦"/>
+              <a:defRPr sz="1400" kern="1200">
+                <a:solidFill>
+                  <a:schemeClr val="tx1">
+                    <a:lumMod val="75000"/>
+                    <a:lumOff val="25000"/>
+                  </a:schemeClr>
+                </a:solidFill>
+                <a:latin typeface="+mn-lt"/>
+                <a:ea typeface="+mn-ea"/>
+                <a:cs typeface="+mn-cs"/>
+              </a:defRPr>
+            </a:lvl6pPr>
+            <a:lvl7pPr marL="1300000" indent="-228600" algn="l" defTabSz="914400" rtl="0" eaLnBrk="1" latinLnBrk="0" hangingPunct="1">
+              <a:lnSpc>
+                <a:spcPct val="90000"/>
+              </a:lnSpc>
+              <a:spcBef>
+                <a:spcPts val="200"/>
+              </a:spcBef>
+              <a:spcAft>
+                <a:spcPts val="400"/>
+              </a:spcAft>
+              <a:buClr>
+                <a:schemeClr val="accent1"/>
+              </a:buClr>
+              <a:buFont typeface="Calibri" pitchFamily="34" charset="0"/>
+              <a:buChar char="◦"/>
+              <a:defRPr sz="1400" kern="1200">
+                <a:solidFill>
+                  <a:schemeClr val="tx1">
+                    <a:lumMod val="75000"/>
+                    <a:lumOff val="25000"/>
+                  </a:schemeClr>
+                </a:solidFill>
+                <a:latin typeface="+mn-lt"/>
+                <a:ea typeface="+mn-ea"/>
+                <a:cs typeface="+mn-cs"/>
+              </a:defRPr>
+            </a:lvl7pPr>
+            <a:lvl8pPr marL="1500000" indent="-228600" algn="l" defTabSz="914400" rtl="0" eaLnBrk="1" latinLnBrk="0" hangingPunct="1">
+              <a:lnSpc>
+                <a:spcPct val="90000"/>
+              </a:lnSpc>
+              <a:spcBef>
+                <a:spcPts val="200"/>
+              </a:spcBef>
+              <a:spcAft>
+                <a:spcPts val="400"/>
+              </a:spcAft>
+              <a:buClr>
+                <a:schemeClr val="accent1"/>
+              </a:buClr>
+              <a:buFont typeface="Calibri" pitchFamily="34" charset="0"/>
+              <a:buChar char="◦"/>
+              <a:defRPr sz="1400" kern="1200">
+                <a:solidFill>
+                  <a:schemeClr val="tx1">
+                    <a:lumMod val="75000"/>
+                    <a:lumOff val="25000"/>
+                  </a:schemeClr>
+                </a:solidFill>
+                <a:latin typeface="+mn-lt"/>
+                <a:ea typeface="+mn-ea"/>
+                <a:cs typeface="+mn-cs"/>
+              </a:defRPr>
+            </a:lvl8pPr>
+            <a:lvl9pPr marL="1700000" indent="-228600" algn="l" defTabSz="914400" rtl="0" eaLnBrk="1" latinLnBrk="0" hangingPunct="1">
+              <a:lnSpc>
+                <a:spcPct val="90000"/>
+              </a:lnSpc>
+              <a:spcBef>
+                <a:spcPts val="200"/>
+              </a:spcBef>
+              <a:spcAft>
+                <a:spcPts val="400"/>
+              </a:spcAft>
+              <a:buClr>
+                <a:schemeClr val="accent1"/>
+              </a:buClr>
+              <a:buFont typeface="Calibri" pitchFamily="34" charset="0"/>
+              <a:buChar char="◦"/>
+              <a:defRPr sz="1400" kern="1200">
+                <a:solidFill>
+                  <a:schemeClr val="tx1">
+                    <a:lumMod val="75000"/>
+                    <a:lumOff val="25000"/>
+                  </a:schemeClr>
+                </a:solidFill>
+                <a:latin typeface="+mn-lt"/>
+                <a:ea typeface="+mn-ea"/>
+                <a:cs typeface="+mn-cs"/>
+              </a:defRPr>
+            </a:lvl9pPr>
+          </a:lstStyle>
+          <a:p>
+            <a:pPr marL="0" indent="0">
+              <a:buNone/>
+            </a:pPr>
+            <a:endParaRPr lang="fr-CH" sz="2800"/>
+          </a:p>
+          <a:p>
+            <a:pPr>
+              <a:buFont typeface="Arial" panose="020B0604020202020204" pitchFamily="34" charset="0"/>
+              <a:buChar char="•"/>
+            </a:pPr>
+            <a:r>
+              <a:rPr lang="fr-CH" sz="2800"/>
+              <a:t> Implémenter les onglets restants</a:t>
+            </a:r>
+          </a:p>
+          <a:p>
+            <a:pPr>
+              <a:buFont typeface="Arial" panose="020B0604020202020204" pitchFamily="34" charset="0"/>
+              <a:buChar char="•"/>
+            </a:pPr>
+            <a:r>
+              <a:rPr lang="fr-CH" sz="2800"/>
+              <a:t> Gestion des droits via les rôles</a:t>
+            </a:r>
+          </a:p>
+          <a:p>
+            <a:pPr>
+              <a:buFont typeface="Arial" panose="020B0604020202020204" pitchFamily="34" charset="0"/>
+              <a:buChar char="•"/>
+            </a:pPr>
+            <a:r>
+              <a:rPr lang="fr-CH" sz="2800"/>
+              <a:t> </a:t>
+            </a:r>
+            <a:r>
+              <a:rPr lang="fr-FR" sz="2800"/>
+              <a:t>Utiliser les fonctions de tri de la DataGridView</a:t>
+            </a:r>
+          </a:p>
+          <a:p>
+            <a:pPr>
+              <a:buFont typeface="Arial" panose="020B0604020202020204" pitchFamily="34" charset="0"/>
+              <a:buChar char="•"/>
+            </a:pPr>
+            <a:r>
+              <a:rPr lang="fr-FR" sz="2800"/>
+              <a:t> Implémenter les filtres pour la DataGridView</a:t>
+            </a:r>
+            <a:endParaRPr lang="fr-CH" sz="2800"/>
+          </a:p>
+        </p:txBody>
+      </p:sp>
+      <p:sp>
+        <p:nvSpPr>
+          <p:cNvPr id="7" name="Espace réservé du numéro de diapositive 6">
+            <a:extLst>
+              <a:ext uri="{FF2B5EF4-FFF2-40B4-BE49-F238E27FC236}">
+                <a16:creationId xmlns:a16="http://schemas.microsoft.com/office/drawing/2014/main" id="{E1D68C4D-67A6-C3A6-16C7-9CED5EE89578}"/>
+              </a:ext>
+            </a:extLst>
+          </p:cNvPr>
+          <p:cNvSpPr>
+            <a:spLocks noGrp="1"/>
+          </p:cNvSpPr>
+          <p:nvPr>
+            <p:ph type="sldNum" sz="quarter" idx="12"/>
+          </p:nvPr>
+        </p:nvSpPr>
+        <p:spPr/>
+        <p:txBody>
+          <a:bodyPr/>
+          <a:lstStyle/>
+          <a:p>
+            <a:fld id="{629637A9-119A-49DA-BD12-AAC58B377D80}" type="slidenum">
+              <a:rPr lang="en-US" smtClean="0"/>
+              <a:t>10</a:t>
+            </a:fld>
+            <a:endParaRPr lang="en-US" dirty="0"/>
+          </a:p>
+        </p:txBody>
+      </p:sp>
+    </p:spTree>
+    <p:extLst>
+      <p:ext uri="{BB962C8B-B14F-4D97-AF65-F5344CB8AC3E}">
+        <p14:creationId xmlns:p14="http://schemas.microsoft.com/office/powerpoint/2010/main" val="3791526076"/>
+      </p:ext>
+    </p:extLst>
+  </p:cSld>
+  <p:clrMapOvr>
+    <a:masterClrMapping/>
+  </p:clrMapOvr>
+</p:sld>
+</file>
+
+<file path=ppt/slides/slide11.xml><?xml version="1.0" encoding="utf-8"?>
+<p:sld xmlns:a="http://schemas.openxmlformats.org/drawingml/2006/main" xmlns:r="http://schemas.openxmlformats.org/officeDocument/2006/relationships" xmlns:p="http://schemas.openxmlformats.org/presentationml/2006/main">
+  <p:cSld>
+    <p:spTree>
+      <p:nvGrpSpPr>
+        <p:cNvPr id="1" name=""/>
+        <p:cNvGrpSpPr/>
+        <p:nvPr/>
+      </p:nvGrpSpPr>
+      <p:grpSpPr>
+        <a:xfrm>
+          <a:off x="0" y="0"/>
+          <a:ext cx="0" cy="0"/>
+          <a:chOff x="0" y="0"/>
+          <a:chExt cx="0" cy="0"/>
+        </a:xfrm>
+      </p:grpSpPr>
+      <p:sp>
+        <p:nvSpPr>
+          <p:cNvPr id="2" name="Titre 1">
+            <a:extLst>
+              <a:ext uri="{FF2B5EF4-FFF2-40B4-BE49-F238E27FC236}">
+                <a16:creationId xmlns:a16="http://schemas.microsoft.com/office/drawing/2014/main" id="{0302F4C2-08FF-BC0E-F560-394FEE8F05D5}"/>
+              </a:ext>
+            </a:extLst>
+          </p:cNvPr>
+          <p:cNvSpPr>
+            <a:spLocks noGrp="1"/>
+          </p:cNvSpPr>
+          <p:nvPr>
+            <p:ph type="title"/>
+          </p:nvPr>
+        </p:nvSpPr>
+        <p:spPr/>
+        <p:txBody>
+          <a:bodyPr/>
+          <a:lstStyle/>
+          <a:p>
+            <a:r>
+              <a:rPr lang="fr-CH"/>
+              <a:t>Rétrospective</a:t>
+            </a:r>
+          </a:p>
+        </p:txBody>
+      </p:sp>
+      <p:sp>
+        <p:nvSpPr>
+          <p:cNvPr id="4" name="Espace réservé du contenu 2">
+            <a:extLst>
+              <a:ext uri="{FF2B5EF4-FFF2-40B4-BE49-F238E27FC236}">
+                <a16:creationId xmlns:a16="http://schemas.microsoft.com/office/drawing/2014/main" id="{857B3220-3DE6-14E8-E2D4-B619A7A66BEE}"/>
+              </a:ext>
+            </a:extLst>
+          </p:cNvPr>
+          <p:cNvSpPr txBox="1">
+            <a:spLocks/>
+          </p:cNvSpPr>
+          <p:nvPr/>
+        </p:nvSpPr>
+        <p:spPr>
+          <a:xfrm>
+            <a:off x="1139952" y="1906694"/>
+            <a:ext cx="10058400" cy="4023360"/>
+          </a:xfrm>
+          <a:prstGeom prst="rect">
+            <a:avLst/>
+          </a:prstGeom>
+        </p:spPr>
+        <p:txBody>
+          <a:bodyPr vert="horz" lIns="0" tIns="45720" rIns="0" bIns="45720" rtlCol="0">
+            <a:normAutofit/>
+          </a:bodyPr>
+          <a:lstStyle>
+            <a:lvl1pPr marL="91440" indent="-91440" algn="l" defTabSz="914400" rtl="0" eaLnBrk="1" latinLnBrk="0" hangingPunct="1">
+              <a:lnSpc>
+                <a:spcPct val="90000"/>
+              </a:lnSpc>
+              <a:spcBef>
+                <a:spcPts val="1200"/>
+              </a:spcBef>
+              <a:spcAft>
+                <a:spcPts val="200"/>
+              </a:spcAft>
+              <a:buClr>
+                <a:schemeClr val="accent1"/>
+              </a:buClr>
+              <a:buSzPct val="100000"/>
+              <a:buFont typeface="Calibri" panose="020F0502020204030204" pitchFamily="34" charset="0"/>
+              <a:buChar char=" "/>
+              <a:defRPr sz="2000" kern="1200">
+                <a:solidFill>
+                  <a:schemeClr val="tx1">
+                    <a:lumMod val="75000"/>
+                    <a:lumOff val="25000"/>
+                  </a:schemeClr>
+                </a:solidFill>
+                <a:latin typeface="+mn-lt"/>
+                <a:ea typeface="+mn-ea"/>
+                <a:cs typeface="+mn-cs"/>
+              </a:defRPr>
+            </a:lvl1pPr>
+            <a:lvl2pPr marL="384048" indent="-182880" algn="l" defTabSz="914400" rtl="0" eaLnBrk="1" latinLnBrk="0" hangingPunct="1">
+              <a:lnSpc>
+                <a:spcPct val="90000"/>
+              </a:lnSpc>
+              <a:spcBef>
+                <a:spcPts val="200"/>
+              </a:spcBef>
+              <a:spcAft>
+                <a:spcPts val="400"/>
+              </a:spcAft>
+              <a:buClr>
+                <a:schemeClr val="accent1"/>
+              </a:buClr>
+              <a:buFont typeface="Calibri" pitchFamily="34" charset="0"/>
+              <a:buChar char="◦"/>
+              <a:defRPr sz="1800" kern="1200">
+                <a:solidFill>
+                  <a:schemeClr val="tx1">
+                    <a:lumMod val="75000"/>
+                    <a:lumOff val="25000"/>
+                  </a:schemeClr>
+                </a:solidFill>
+                <a:latin typeface="+mn-lt"/>
+                <a:ea typeface="+mn-ea"/>
+                <a:cs typeface="+mn-cs"/>
+              </a:defRPr>
+            </a:lvl2pPr>
+            <a:lvl3pPr marL="566928" indent="-182880" algn="l" defTabSz="914400" rtl="0" eaLnBrk="1" latinLnBrk="0" hangingPunct="1">
+              <a:lnSpc>
+                <a:spcPct val="90000"/>
+              </a:lnSpc>
+              <a:spcBef>
+                <a:spcPts val="200"/>
+              </a:spcBef>
+              <a:spcAft>
+                <a:spcPts val="400"/>
+              </a:spcAft>
+              <a:buClr>
+                <a:schemeClr val="accent1"/>
+              </a:buClr>
+              <a:buFont typeface="Calibri" pitchFamily="34" charset="0"/>
+              <a:buChar char="◦"/>
+              <a:defRPr sz="1400" kern="1200">
+                <a:solidFill>
+                  <a:schemeClr val="tx1">
+                    <a:lumMod val="75000"/>
+                    <a:lumOff val="25000"/>
+                  </a:schemeClr>
+                </a:solidFill>
+                <a:latin typeface="+mn-lt"/>
+                <a:ea typeface="+mn-ea"/>
+                <a:cs typeface="+mn-cs"/>
+              </a:defRPr>
+            </a:lvl3pPr>
+            <a:lvl4pPr marL="749808" indent="-182880" algn="l" defTabSz="914400" rtl="0" eaLnBrk="1" latinLnBrk="0" hangingPunct="1">
+              <a:lnSpc>
+                <a:spcPct val="90000"/>
+              </a:lnSpc>
+              <a:spcBef>
+                <a:spcPts val="200"/>
+              </a:spcBef>
+              <a:spcAft>
+                <a:spcPts val="400"/>
+              </a:spcAft>
+              <a:buClr>
+                <a:schemeClr val="accent1"/>
+              </a:buClr>
+              <a:buFont typeface="Calibri" pitchFamily="34" charset="0"/>
+              <a:buChar char="◦"/>
+              <a:defRPr sz="1400" kern="1200">
+                <a:solidFill>
+                  <a:schemeClr val="tx1">
+                    <a:lumMod val="75000"/>
+                    <a:lumOff val="25000"/>
+                  </a:schemeClr>
+                </a:solidFill>
+                <a:latin typeface="+mn-lt"/>
+                <a:ea typeface="+mn-ea"/>
+                <a:cs typeface="+mn-cs"/>
+              </a:defRPr>
+            </a:lvl4pPr>
+            <a:lvl5pPr marL="932688" indent="-182880" algn="l" defTabSz="914400" rtl="0" eaLnBrk="1" latinLnBrk="0" hangingPunct="1">
+              <a:lnSpc>
+                <a:spcPct val="90000"/>
+              </a:lnSpc>
+              <a:spcBef>
+                <a:spcPts val="200"/>
+              </a:spcBef>
+              <a:spcAft>
+                <a:spcPts val="400"/>
+              </a:spcAft>
+              <a:buClr>
+                <a:schemeClr val="accent1"/>
+              </a:buClr>
+              <a:buFont typeface="Calibri" pitchFamily="34" charset="0"/>
+              <a:buChar char="◦"/>
+              <a:defRPr sz="1400" kern="1200">
+                <a:solidFill>
+                  <a:schemeClr val="tx1">
+                    <a:lumMod val="75000"/>
+                    <a:lumOff val="25000"/>
+                  </a:schemeClr>
+                </a:solidFill>
+                <a:latin typeface="+mn-lt"/>
+                <a:ea typeface="+mn-ea"/>
+                <a:cs typeface="+mn-cs"/>
+              </a:defRPr>
+            </a:lvl5pPr>
+            <a:lvl6pPr marL="1100000" indent="-228600" algn="l" defTabSz="914400" rtl="0" eaLnBrk="1" latinLnBrk="0" hangingPunct="1">
+              <a:lnSpc>
+                <a:spcPct val="90000"/>
+              </a:lnSpc>
+              <a:spcBef>
+                <a:spcPts val="200"/>
+              </a:spcBef>
+              <a:spcAft>
+                <a:spcPts val="400"/>
+              </a:spcAft>
+              <a:buClr>
+                <a:schemeClr val="accent1"/>
+              </a:buClr>
+              <a:buFont typeface="Calibri" pitchFamily="34" charset="0"/>
+              <a:buChar char="◦"/>
+              <a:defRPr sz="1400" kern="1200">
+                <a:solidFill>
+                  <a:schemeClr val="tx1">
+                    <a:lumMod val="75000"/>
+                    <a:lumOff val="25000"/>
+                  </a:schemeClr>
+                </a:solidFill>
+                <a:latin typeface="+mn-lt"/>
+                <a:ea typeface="+mn-ea"/>
+                <a:cs typeface="+mn-cs"/>
+              </a:defRPr>
+            </a:lvl6pPr>
+            <a:lvl7pPr marL="1300000" indent="-228600" algn="l" defTabSz="914400" rtl="0" eaLnBrk="1" latinLnBrk="0" hangingPunct="1">
+              <a:lnSpc>
+                <a:spcPct val="90000"/>
+              </a:lnSpc>
+              <a:spcBef>
+                <a:spcPts val="200"/>
+              </a:spcBef>
+              <a:spcAft>
+                <a:spcPts val="400"/>
+              </a:spcAft>
+              <a:buClr>
+                <a:schemeClr val="accent1"/>
+              </a:buClr>
+              <a:buFont typeface="Calibri" pitchFamily="34" charset="0"/>
+              <a:buChar char="◦"/>
+              <a:defRPr sz="1400" kern="1200">
+                <a:solidFill>
+                  <a:schemeClr val="tx1">
+                    <a:lumMod val="75000"/>
+                    <a:lumOff val="25000"/>
+                  </a:schemeClr>
+                </a:solidFill>
+                <a:latin typeface="+mn-lt"/>
+                <a:ea typeface="+mn-ea"/>
+                <a:cs typeface="+mn-cs"/>
+              </a:defRPr>
+            </a:lvl7pPr>
+            <a:lvl8pPr marL="1500000" indent="-228600" algn="l" defTabSz="914400" rtl="0" eaLnBrk="1" latinLnBrk="0" hangingPunct="1">
+              <a:lnSpc>
+                <a:spcPct val="90000"/>
+              </a:lnSpc>
+              <a:spcBef>
+                <a:spcPts val="200"/>
+              </a:spcBef>
+              <a:spcAft>
+                <a:spcPts val="400"/>
+              </a:spcAft>
+              <a:buClr>
+                <a:schemeClr val="accent1"/>
+              </a:buClr>
+              <a:buFont typeface="Calibri" pitchFamily="34" charset="0"/>
+              <a:buChar char="◦"/>
+              <a:defRPr sz="1400" kern="1200">
+                <a:solidFill>
+                  <a:schemeClr val="tx1">
+                    <a:lumMod val="75000"/>
+                    <a:lumOff val="25000"/>
+                  </a:schemeClr>
+                </a:solidFill>
+                <a:latin typeface="+mn-lt"/>
+                <a:ea typeface="+mn-ea"/>
+                <a:cs typeface="+mn-cs"/>
+              </a:defRPr>
+            </a:lvl8pPr>
+            <a:lvl9pPr marL="1700000" indent="-228600" algn="l" defTabSz="914400" rtl="0" eaLnBrk="1" latinLnBrk="0" hangingPunct="1">
+              <a:lnSpc>
+                <a:spcPct val="90000"/>
+              </a:lnSpc>
+              <a:spcBef>
+                <a:spcPts val="200"/>
+              </a:spcBef>
+              <a:spcAft>
+                <a:spcPts val="400"/>
+              </a:spcAft>
+              <a:buClr>
+                <a:schemeClr val="accent1"/>
+              </a:buClr>
+              <a:buFont typeface="Calibri" pitchFamily="34" charset="0"/>
+              <a:buChar char="◦"/>
+              <a:defRPr sz="1400" kern="1200">
+                <a:solidFill>
+                  <a:schemeClr val="tx1">
+                    <a:lumMod val="75000"/>
+                    <a:lumOff val="25000"/>
+                  </a:schemeClr>
+                </a:solidFill>
+                <a:latin typeface="+mn-lt"/>
+                <a:ea typeface="+mn-ea"/>
+                <a:cs typeface="+mn-cs"/>
+              </a:defRPr>
+            </a:lvl9pPr>
+          </a:lstStyle>
+          <a:p>
+            <a:pPr marL="0" indent="0">
+              <a:buNone/>
+            </a:pPr>
+            <a:r>
+              <a:rPr lang="fr-CH" sz="2800"/>
+              <a:t> </a:t>
+            </a:r>
+          </a:p>
+          <a:p>
+            <a:pPr>
+              <a:buFont typeface="Arial" panose="020B0604020202020204" pitchFamily="34" charset="0"/>
+              <a:buChar char="•"/>
+            </a:pPr>
+            <a:r>
+              <a:rPr lang="fr-CH" sz="2800"/>
+              <a:t> Fonctions essentielles implémentées</a:t>
+            </a:r>
+          </a:p>
+          <a:p>
+            <a:pPr>
+              <a:buFont typeface="Arial" panose="020B0604020202020204" pitchFamily="34" charset="0"/>
+              <a:buChar char="•"/>
+            </a:pPr>
+            <a:r>
+              <a:rPr lang="fr-CH" sz="2800"/>
+              <a:t> </a:t>
+            </a:r>
+            <a:r>
+              <a:rPr lang="fr-FR" sz="2800"/>
+              <a:t>Bonne collaboration</a:t>
+            </a:r>
+          </a:p>
+          <a:p>
+            <a:pPr>
+              <a:buFont typeface="Arial" panose="020B0604020202020204" pitchFamily="34" charset="0"/>
+              <a:buChar char="•"/>
+            </a:pPr>
+            <a:r>
+              <a:rPr lang="fr-FR" sz="2800"/>
+              <a:t> Difficulté à intégrer les notions du 226b en cours de route</a:t>
+            </a:r>
+          </a:p>
+          <a:p>
+            <a:pPr>
+              <a:buFont typeface="Arial" panose="020B0604020202020204" pitchFamily="34" charset="0"/>
+              <a:buChar char="•"/>
+            </a:pPr>
+            <a:r>
+              <a:rPr lang="fr-FR" sz="2800"/>
+              <a:t> Plaisir malgré les difficultés mentionnées</a:t>
+            </a:r>
+            <a:endParaRPr lang="fr-CH" sz="2800"/>
+          </a:p>
+        </p:txBody>
+      </p:sp>
+      <p:sp>
+        <p:nvSpPr>
+          <p:cNvPr id="7" name="Espace réservé du numéro de diapositive 6">
+            <a:extLst>
+              <a:ext uri="{FF2B5EF4-FFF2-40B4-BE49-F238E27FC236}">
+                <a16:creationId xmlns:a16="http://schemas.microsoft.com/office/drawing/2014/main" id="{C7F90290-362F-7B5E-23D3-FF5F3B72FD28}"/>
+              </a:ext>
+            </a:extLst>
+          </p:cNvPr>
+          <p:cNvSpPr>
+            <a:spLocks noGrp="1"/>
+          </p:cNvSpPr>
+          <p:nvPr>
+            <p:ph type="sldNum" sz="quarter" idx="12"/>
+          </p:nvPr>
+        </p:nvSpPr>
+        <p:spPr/>
+        <p:txBody>
+          <a:bodyPr/>
+          <a:lstStyle/>
+          <a:p>
+            <a:fld id="{629637A9-119A-49DA-BD12-AAC58B377D80}" type="slidenum">
+              <a:rPr lang="en-US" smtClean="0"/>
+              <a:t>11</a:t>
+            </a:fld>
+            <a:endParaRPr lang="en-US" dirty="0"/>
+          </a:p>
+        </p:txBody>
+      </p:sp>
+    </p:spTree>
+    <p:extLst>
+      <p:ext uri="{BB962C8B-B14F-4D97-AF65-F5344CB8AC3E}">
+        <p14:creationId xmlns:p14="http://schemas.microsoft.com/office/powerpoint/2010/main" val="2081047817"/>
+      </p:ext>
+    </p:extLst>
+  </p:cSld>
+  <p:clrMapOvr>
+    <a:masterClrMapping/>
+  </p:clrMapOvr>
+</p:sld>
+</file>
+
+<file path=ppt/slides/slide12.xml><?xml version="1.0" encoding="utf-8"?>
+<p:sld xmlns:a="http://schemas.openxmlformats.org/drawingml/2006/main" xmlns:r="http://schemas.openxmlformats.org/officeDocument/2006/relationships" xmlns:p="http://schemas.openxmlformats.org/presentationml/2006/main">
+  <p:cSld>
     <p:bg>
       <p:bgPr>
         <a:solidFill>
@@ -6541,7 +7565,7 @@
           <a:p>
             <a:fld id="{629637A9-119A-49DA-BD12-AAC58B377D80}" type="slidenum">
               <a:rPr lang="en-US" smtClean="0"/>
-              <a:t>10</a:t>
+              <a:t>12</a:t>
             </a:fld>
             <a:endParaRPr lang="en-US" dirty="0"/>
           </a:p>
@@ -6634,16 +7658,6 @@
             </a:pPr>
             <a:r>
               <a:rPr lang="fr-CH" sz="2800"/>
-              <a:t> Pourquoi ce projet ?</a:t>
-            </a:r>
-          </a:p>
-          <a:p>
-            <a:pPr>
-              <a:buFont typeface="Arial" panose="020B0604020202020204" pitchFamily="34" charset="0"/>
-              <a:buChar char="•"/>
-            </a:pPr>
-            <a:r>
-              <a:rPr lang="fr-CH" sz="2800"/>
               <a:t> Démonstration</a:t>
             </a:r>
           </a:p>
@@ -6664,7 +7678,7 @@
             </a:pPr>
             <a:r>
               <a:rPr lang="fr-CH" sz="2800"/>
-              <a:t> Méthode AddRecord</a:t>
+              <a:t> DataGridView</a:t>
             </a:r>
           </a:p>
           <a:p>
@@ -6674,7 +7688,7 @@
             </a:pPr>
             <a:r>
               <a:rPr lang="fr-CH" sz="2800"/>
-              <a:t> Perspective</a:t>
+              <a:t> Améliorations possibles</a:t>
             </a:r>
           </a:p>
           <a:p>
@@ -6766,173 +7780,6 @@
       </p:grpSpPr>
       <p:sp>
         <p:nvSpPr>
-          <p:cNvPr id="2" name="Titre 1">
-            <a:extLst>
-              <a:ext uri="{FF2B5EF4-FFF2-40B4-BE49-F238E27FC236}">
-                <a16:creationId xmlns:a16="http://schemas.microsoft.com/office/drawing/2014/main" id="{D8BF5A23-4FB7-8E41-E5CF-79AB526801F4}"/>
-              </a:ext>
-            </a:extLst>
-          </p:cNvPr>
-          <p:cNvSpPr>
-            <a:spLocks noGrp="1"/>
-          </p:cNvSpPr>
-          <p:nvPr>
-            <p:ph type="title"/>
-          </p:nvPr>
-        </p:nvSpPr>
-        <p:spPr/>
-        <p:txBody>
-          <a:bodyPr/>
-          <a:lstStyle/>
-          <a:p>
-            <a:r>
-              <a:rPr lang="fr-CH" sz="4800"/>
-              <a:t>Pourquoi ce projet ?</a:t>
-            </a:r>
-            <a:endParaRPr lang="fr-CH"/>
-          </a:p>
-        </p:txBody>
-      </p:sp>
-      <p:sp>
-        <p:nvSpPr>
-          <p:cNvPr id="3" name="Espace réservé du contenu 2">
-            <a:extLst>
-              <a:ext uri="{FF2B5EF4-FFF2-40B4-BE49-F238E27FC236}">
-                <a16:creationId xmlns:a16="http://schemas.microsoft.com/office/drawing/2014/main" id="{44C0C1A7-F7E0-268F-81C8-3B88E367D38B}"/>
-              </a:ext>
-            </a:extLst>
-          </p:cNvPr>
-          <p:cNvSpPr>
-            <a:spLocks noGrp="1"/>
-          </p:cNvSpPr>
-          <p:nvPr>
-            <p:ph idx="1"/>
-          </p:nvPr>
-        </p:nvSpPr>
-        <p:spPr/>
-        <p:txBody>
-          <a:bodyPr>
-            <a:normAutofit/>
-          </a:bodyPr>
-          <a:lstStyle/>
-          <a:p>
-            <a:pPr marL="0" indent="0">
-              <a:buNone/>
-            </a:pPr>
-            <a:r>
-              <a:rPr lang="fr-CH" sz="2800"/>
-              <a:t> </a:t>
-            </a:r>
-          </a:p>
-          <a:p>
-            <a:pPr>
-              <a:buFont typeface="Arial" panose="020B0604020202020204" pitchFamily="34" charset="0"/>
-              <a:buChar char="•"/>
-            </a:pPr>
-            <a:r>
-              <a:rPr lang="fr-CH" sz="2800"/>
-              <a:t> Projet réaliste</a:t>
-            </a:r>
-          </a:p>
-          <a:p>
-            <a:pPr>
-              <a:buFont typeface="Arial" panose="020B0604020202020204" pitchFamily="34" charset="0"/>
-              <a:buChar char="•"/>
-            </a:pPr>
-            <a:r>
-              <a:rPr lang="fr-CH" sz="2800"/>
-              <a:t> Gestion de projet</a:t>
-            </a:r>
-          </a:p>
-          <a:p>
-            <a:pPr>
-              <a:buFont typeface="Arial" panose="020B0604020202020204" pitchFamily="34" charset="0"/>
-              <a:buChar char="•"/>
-            </a:pPr>
-            <a:r>
-              <a:rPr lang="fr-CH" sz="2800"/>
-              <a:t> Interaction BDD</a:t>
-            </a:r>
-          </a:p>
-          <a:p>
-            <a:pPr>
-              <a:buFont typeface="Arial" panose="020B0604020202020204" pitchFamily="34" charset="0"/>
-              <a:buChar char="•"/>
-            </a:pPr>
-            <a:r>
-              <a:rPr lang="fr-CH" sz="2800"/>
-              <a:t> Application POO</a:t>
-            </a:r>
-          </a:p>
-          <a:p>
-            <a:pPr marL="0" indent="0">
-              <a:buNone/>
-            </a:pPr>
-            <a:endParaRPr lang="fr-CH" sz="2800"/>
-          </a:p>
-        </p:txBody>
-      </p:sp>
-      <p:sp>
-        <p:nvSpPr>
-          <p:cNvPr id="4" name="Espace réservé du numéro de diapositive 3">
-            <a:extLst>
-              <a:ext uri="{FF2B5EF4-FFF2-40B4-BE49-F238E27FC236}">
-                <a16:creationId xmlns:a16="http://schemas.microsoft.com/office/drawing/2014/main" id="{2B8D82AD-2369-B5F5-77C0-4BCC3628A0FF}"/>
-              </a:ext>
-            </a:extLst>
-          </p:cNvPr>
-          <p:cNvSpPr>
-            <a:spLocks noGrp="1"/>
-          </p:cNvSpPr>
-          <p:nvPr>
-            <p:ph type="sldNum" sz="quarter" idx="12"/>
-          </p:nvPr>
-        </p:nvSpPr>
-        <p:spPr/>
-        <p:txBody>
-          <a:bodyPr/>
-          <a:lstStyle/>
-          <a:p>
-            <a:fld id="{629637A9-119A-49DA-BD12-AAC58B377D80}" type="slidenum">
-              <a:rPr lang="en-US" smtClean="0"/>
-              <a:t>3</a:t>
-            </a:fld>
-            <a:endParaRPr lang="en-US" dirty="0"/>
-          </a:p>
-        </p:txBody>
-      </p:sp>
-    </p:spTree>
-    <p:extLst>
-      <p:ext uri="{BB962C8B-B14F-4D97-AF65-F5344CB8AC3E}">
-        <p14:creationId xmlns:p14="http://schemas.microsoft.com/office/powerpoint/2010/main" val="338176886"/>
-      </p:ext>
-    </p:extLst>
-  </p:cSld>
-  <p:clrMapOvr>
-    <a:masterClrMapping/>
-  </p:clrMapOvr>
-</p:sld>
-</file>
-
-<file path=ppt/slides/slide4.xml><?xml version="1.0" encoding="utf-8"?>
-<p:sld xmlns:a="http://schemas.openxmlformats.org/drawingml/2006/main" xmlns:r="http://schemas.openxmlformats.org/officeDocument/2006/relationships" xmlns:p="http://schemas.openxmlformats.org/presentationml/2006/main">
-  <p:cSld>
-    <p:spTree>
-      <p:nvGrpSpPr>
-        <p:cNvPr id="1" name=""/>
-        <p:cNvGrpSpPr/>
-        <p:nvPr/>
-      </p:nvGrpSpPr>
-      <p:grpSpPr>
-        <a:xfrm>
-          <a:off x="0" y="0"/>
-          <a:ext cx="0" cy="0"/>
-          <a:chOff x="0" y="0"/>
-          <a:chExt cx="0" cy="0"/>
-        </a:xfrm>
-      </p:grpSpPr>
-      <p:sp>
-        <p:nvSpPr>
           <p:cNvPr id="17" name="Rectangle 16">
             <a:extLst>
               <a:ext uri="{FF2B5EF4-FFF2-40B4-BE49-F238E27FC236}">
@@ -6945,8 +7792,8 @@
         </p:nvSpPr>
         <p:spPr>
           <a:xfrm>
-            <a:off x="4793950" y="1390996"/>
-            <a:ext cx="757382" cy="692727"/>
+            <a:off x="978408" y="1390996"/>
+            <a:ext cx="10378440" cy="692727"/>
           </a:xfrm>
           <a:prstGeom prst="rect">
             <a:avLst/>
@@ -6994,12 +7841,41 @@
           </a:p>
         </p:txBody>
       </p:sp>
+      <p:sp>
+        <p:nvSpPr>
+          <p:cNvPr id="18" name="Espace réservé du numéro de diapositive 17">
+            <a:extLst>
+              <a:ext uri="{FF2B5EF4-FFF2-40B4-BE49-F238E27FC236}">
+                <a16:creationId xmlns:a16="http://schemas.microsoft.com/office/drawing/2014/main" id="{58B5CB20-8824-92A6-5186-58816AA76C2D}"/>
+              </a:ext>
+            </a:extLst>
+          </p:cNvPr>
+          <p:cNvSpPr>
+            <a:spLocks noGrp="1"/>
+          </p:cNvSpPr>
+          <p:nvPr>
+            <p:ph type="sldNum" sz="quarter" idx="12"/>
+          </p:nvPr>
+        </p:nvSpPr>
+        <p:spPr/>
+        <p:txBody>
+          <a:bodyPr/>
+          <a:lstStyle/>
+          <a:p>
+            <a:fld id="{629637A9-119A-49DA-BD12-AAC58B377D80}" type="slidenum">
+              <a:rPr lang="en-US" smtClean="0"/>
+              <a:t>3</a:t>
+            </a:fld>
+            <a:endParaRPr lang="en-US" dirty="0"/>
+          </a:p>
+        </p:txBody>
+      </p:sp>
       <p:pic>
         <p:nvPicPr>
-          <p:cNvPr id="10" name="Image 9" descr="Une image contenant texte, capture d’écran, affichage, Police&#10;&#10;Description générée automatiquement">
+          <p:cNvPr id="3" name="Image 2" descr="Une image contenant texte, capture d’écran, logiciel, conception&#10;&#10;Description générée automatiquement">
             <a:extLst>
               <a:ext uri="{FF2B5EF4-FFF2-40B4-BE49-F238E27FC236}">
-                <a16:creationId xmlns:a16="http://schemas.microsoft.com/office/drawing/2014/main" id="{2F0BA88D-38B9-2405-A45B-333CAFC643C6}"/>
+                <a16:creationId xmlns:a16="http://schemas.microsoft.com/office/drawing/2014/main" id="{EC54F52B-6CDF-17D3-D21B-6E3BB885224F}"/>
               </a:ext>
             </a:extLst>
           </p:cNvPr>
@@ -7016,104 +7892,18 @@
         </p:blipFill>
         <p:spPr>
           <a:xfrm>
-            <a:off x="5061528" y="480568"/>
-            <a:ext cx="6795416" cy="5446326"/>
+            <a:off x="1750652" y="0"/>
+            <a:ext cx="8727271" cy="6326645"/>
           </a:xfrm>
           <a:prstGeom prst="rect">
             <a:avLst/>
           </a:prstGeom>
         </p:spPr>
       </p:pic>
-      <p:sp>
-        <p:nvSpPr>
-          <p:cNvPr id="11" name="Titre 1">
-            <a:extLst>
-              <a:ext uri="{FF2B5EF4-FFF2-40B4-BE49-F238E27FC236}">
-                <a16:creationId xmlns:a16="http://schemas.microsoft.com/office/drawing/2014/main" id="{5D3478D9-6DB1-8B21-054B-95EFB3D9BD9B}"/>
-              </a:ext>
-            </a:extLst>
-          </p:cNvPr>
-          <p:cNvSpPr txBox="1">
-            <a:spLocks/>
-          </p:cNvSpPr>
-          <p:nvPr/>
-        </p:nvSpPr>
-        <p:spPr>
-          <a:xfrm>
-            <a:off x="1097280" y="286603"/>
-            <a:ext cx="10058400" cy="1450757"/>
-          </a:xfrm>
-          <a:prstGeom prst="rect">
-            <a:avLst/>
-          </a:prstGeom>
-        </p:spPr>
-        <p:txBody>
-          <a:bodyPr vert="horz" lIns="91440" tIns="45720" rIns="91440" bIns="45720" rtlCol="0" anchor="b">
-            <a:normAutofit/>
-          </a:bodyPr>
-          <a:lstStyle>
-            <a:lvl1pPr algn="l" defTabSz="914400" rtl="0" eaLnBrk="1" latinLnBrk="0" hangingPunct="1">
-              <a:lnSpc>
-                <a:spcPct val="85000"/>
-              </a:lnSpc>
-              <a:spcBef>
-                <a:spcPct val="0"/>
-              </a:spcBef>
-              <a:buNone/>
-              <a:defRPr sz="4800" kern="1200" spc="-50" baseline="0">
-                <a:solidFill>
-                  <a:schemeClr val="tx1">
-                    <a:lumMod val="75000"/>
-                    <a:lumOff val="25000"/>
-                  </a:schemeClr>
-                </a:solidFill>
-                <a:latin typeface="+mj-lt"/>
-                <a:ea typeface="+mj-ea"/>
-                <a:cs typeface="+mj-cs"/>
-              </a:defRPr>
-            </a:lvl1pPr>
-          </a:lstStyle>
-          <a:p>
-            <a:r>
-              <a:rPr lang="fr-CH"/>
-              <a:t>Démonstration</a:t>
-            </a:r>
-          </a:p>
-        </p:txBody>
-      </p:sp>
-      <p:sp>
-        <p:nvSpPr>
-          <p:cNvPr id="18" name="Espace réservé du numéro de diapositive 17">
-            <a:extLst>
-              <a:ext uri="{FF2B5EF4-FFF2-40B4-BE49-F238E27FC236}">
-                <a16:creationId xmlns:a16="http://schemas.microsoft.com/office/drawing/2014/main" id="{58B5CB20-8824-92A6-5186-58816AA76C2D}"/>
-              </a:ext>
-            </a:extLst>
-          </p:cNvPr>
-          <p:cNvSpPr>
-            <a:spLocks noGrp="1"/>
-          </p:cNvSpPr>
-          <p:nvPr>
-            <p:ph type="sldNum" sz="quarter" idx="12"/>
-          </p:nvPr>
-        </p:nvSpPr>
-        <p:spPr/>
-        <p:txBody>
-          <a:bodyPr/>
-          <a:lstStyle/>
-          <a:p>
-            <a:fld id="{629637A9-119A-49DA-BD12-AAC58B377D80}" type="slidenum">
-              <a:rPr lang="en-US" smtClean="0"/>
-              <a:t>4</a:t>
-            </a:fld>
-            <a:endParaRPr lang="en-US" dirty="0"/>
-          </a:p>
-        </p:txBody>
-      </p:sp>
     </p:spTree>
     <p:extLst>
       <p:ext uri="{BB962C8B-B14F-4D97-AF65-F5344CB8AC3E}">
-        <p14:creationId xmlns:p14="http://schemas.microsoft.com/office/powerpoint/2010/main" val="1382432922"/>
+        <p14:creationId xmlns:p14="http://schemas.microsoft.com/office/powerpoint/2010/main" val="4181173588"/>
       </p:ext>
     </p:extLst>
   </p:cSld>
@@ -7123,8 +7913,8 @@
 </p:sld>
 </file>
 
-<file path=ppt/slides/slide5.xml><?xml version="1.0" encoding="utf-8"?>
-<p:sld xmlns:a="http://schemas.openxmlformats.org/drawingml/2006/main" xmlns:r="http://schemas.openxmlformats.org/officeDocument/2006/relationships" xmlns:p="http://schemas.openxmlformats.org/presentationml/2006/main" show="0">
+<file path=ppt/slides/slide4.xml><?xml version="1.0" encoding="utf-8"?>
+<p:sld xmlns:a="http://schemas.openxmlformats.org/drawingml/2006/main" xmlns:r="http://schemas.openxmlformats.org/officeDocument/2006/relationships" xmlns:p="http://schemas.openxmlformats.org/presentationml/2006/main">
   <p:cSld>
     <p:spTree>
       <p:nvGrpSpPr>
@@ -7142,10 +7932,73 @@
       </p:grpSpPr>
       <p:sp>
         <p:nvSpPr>
-          <p:cNvPr id="2" name="Titre 1">
+          <p:cNvPr id="17" name="Rectangle 16">
             <a:extLst>
               <a:ext uri="{FF2B5EF4-FFF2-40B4-BE49-F238E27FC236}">
-                <a16:creationId xmlns:a16="http://schemas.microsoft.com/office/drawing/2014/main" id="{501402DB-434B-36F6-3525-B16732A9FDD7}"/>
+                <a16:creationId xmlns:a16="http://schemas.microsoft.com/office/drawing/2014/main" id="{2D1B6F76-30B5-9BEF-DA4C-B0DB84809F1F}"/>
+              </a:ext>
+            </a:extLst>
+          </p:cNvPr>
+          <p:cNvSpPr/>
+          <p:nvPr/>
+        </p:nvSpPr>
+        <p:spPr>
+          <a:xfrm>
+            <a:off x="978408" y="1390996"/>
+            <a:ext cx="10378440" cy="692727"/>
+          </a:xfrm>
+          <a:prstGeom prst="rect">
+            <a:avLst/>
+          </a:prstGeom>
+          <a:solidFill>
+            <a:schemeClr val="bg1"/>
+          </a:solidFill>
+          <a:ln>
+            <a:solidFill>
+              <a:schemeClr val="bg1"/>
+            </a:solidFill>
+          </a:ln>
+        </p:spPr>
+        <p:style>
+          <a:lnRef idx="2">
+            <a:schemeClr val="accent1">
+              <a:shade val="15000"/>
+            </a:schemeClr>
+          </a:lnRef>
+          <a:fillRef idx="1">
+            <a:schemeClr val="accent1"/>
+          </a:fillRef>
+          <a:effectRef idx="0">
+            <a:schemeClr val="accent1"/>
+          </a:effectRef>
+          <a:fontRef idx="minor">
+            <a:schemeClr val="lt1"/>
+          </a:fontRef>
+        </p:style>
+        <p:txBody>
+          <a:bodyPr rtlCol="0" anchor="ctr"/>
+          <a:lstStyle/>
+          <a:p>
+            <a:pPr algn="ctr"/>
+            <a:endParaRPr lang="fr-CH">
+              <a:ln>
+                <a:solidFill>
+                  <a:schemeClr val="bg1"/>
+                </a:solidFill>
+              </a:ln>
+              <a:solidFill>
+                <a:schemeClr val="bg1"/>
+              </a:solidFill>
+            </a:endParaRPr>
+          </a:p>
+        </p:txBody>
+      </p:sp>
+      <p:sp>
+        <p:nvSpPr>
+          <p:cNvPr id="18" name="Espace réservé du numéro de diapositive 17">
+            <a:extLst>
+              <a:ext uri="{FF2B5EF4-FFF2-40B4-BE49-F238E27FC236}">
+                <a16:creationId xmlns:a16="http://schemas.microsoft.com/office/drawing/2014/main" id="{58B5CB20-8824-92A6-5186-58816AA76C2D}"/>
               </a:ext>
             </a:extLst>
           </p:cNvPr>
@@ -7153,34 +8006,28 @@
             <a:spLocks noGrp="1"/>
           </p:cNvSpPr>
           <p:nvPr>
-            <p:ph type="title"/>
+            <p:ph type="sldNum" sz="quarter" idx="12"/>
           </p:nvPr>
         </p:nvSpPr>
-        <p:spPr>
-          <a:xfrm>
-            <a:off x="1097279" y="263528"/>
-            <a:ext cx="10058400" cy="1450757"/>
-          </a:xfrm>
-        </p:spPr>
+        <p:spPr/>
         <p:txBody>
           <a:bodyPr/>
           <a:lstStyle/>
           <a:p>
-            <a:r>
-              <a:rPr lang="fr-CH" sz="4800"/>
-              <a:t> Organisation de la BDD</a:t>
-            </a:r>
-            <a:endParaRPr lang="fr-CH"/>
+            <a:fld id="{629637A9-119A-49DA-BD12-AAC58B377D80}" type="slidenum">
+              <a:rPr lang="en-US" smtClean="0"/>
+              <a:t>4</a:t>
+            </a:fld>
+            <a:endParaRPr lang="en-US" dirty="0"/>
           </a:p>
         </p:txBody>
       </p:sp>
       <p:pic>
         <p:nvPicPr>
-          <p:cNvPr id="69" name="Image 68">
-            <a:hlinkClick r:id="rId2" action="ppaction://hlinkfile"/>
+          <p:cNvPr id="3" name="Image 2" descr="Une image contenant texte, capture d’écran, logiciel, Page web&#10;&#10;Description générée automatiquement">
             <a:extLst>
               <a:ext uri="{FF2B5EF4-FFF2-40B4-BE49-F238E27FC236}">
-                <a16:creationId xmlns:a16="http://schemas.microsoft.com/office/drawing/2014/main" id="{2A778510-E6CC-E4CE-6511-6B9B4AE78815}"/>
+                <a16:creationId xmlns:a16="http://schemas.microsoft.com/office/drawing/2014/main" id="{D8C5A062-E4ED-2710-EE95-D5C029455AC5}"/>
               </a:ext>
             </a:extLst>
           </p:cNvPr>
@@ -7190,32 +8037,120 @@
           <p:nvPr/>
         </p:nvPicPr>
         <p:blipFill>
-          <a:blip r:embed="rId3"/>
+          <a:blip r:embed="rId2"/>
           <a:stretch>
             <a:fillRect/>
           </a:stretch>
         </p:blipFill>
         <p:spPr>
           <a:xfrm>
-            <a:off x="2890795" y="1911927"/>
-            <a:ext cx="6469218" cy="4175627"/>
+            <a:off x="927690" y="0"/>
+            <a:ext cx="10426350" cy="6336792"/>
           </a:xfrm>
           <a:prstGeom prst="rect">
             <a:avLst/>
           </a:prstGeom>
-          <a:ln w="38100">
+        </p:spPr>
+      </p:pic>
+    </p:spTree>
+    <p:extLst>
+      <p:ext uri="{BB962C8B-B14F-4D97-AF65-F5344CB8AC3E}">
+        <p14:creationId xmlns:p14="http://schemas.microsoft.com/office/powerpoint/2010/main" val="42842401"/>
+      </p:ext>
+    </p:extLst>
+  </p:cSld>
+  <p:clrMapOvr>
+    <a:masterClrMapping/>
+  </p:clrMapOvr>
+</p:sld>
+</file>
+
+<file path=ppt/slides/slide5.xml><?xml version="1.0" encoding="utf-8"?>
+<p:sld xmlns:a="http://schemas.openxmlformats.org/drawingml/2006/main" xmlns:r="http://schemas.openxmlformats.org/officeDocument/2006/relationships" xmlns:p="http://schemas.openxmlformats.org/presentationml/2006/main">
+  <p:cSld>
+    <p:spTree>
+      <p:nvGrpSpPr>
+        <p:cNvPr id="1" name=""/>
+        <p:cNvGrpSpPr/>
+        <p:nvPr/>
+      </p:nvGrpSpPr>
+      <p:grpSpPr>
+        <a:xfrm>
+          <a:off x="0" y="0"/>
+          <a:ext cx="0" cy="0"/>
+          <a:chOff x="0" y="0"/>
+          <a:chExt cx="0" cy="0"/>
+        </a:xfrm>
+      </p:grpSpPr>
+      <p:sp>
+        <p:nvSpPr>
+          <p:cNvPr id="17" name="Rectangle 16">
+            <a:extLst>
+              <a:ext uri="{FF2B5EF4-FFF2-40B4-BE49-F238E27FC236}">
+                <a16:creationId xmlns:a16="http://schemas.microsoft.com/office/drawing/2014/main" id="{2D1B6F76-30B5-9BEF-DA4C-B0DB84809F1F}"/>
+              </a:ext>
+            </a:extLst>
+          </p:cNvPr>
+          <p:cNvSpPr/>
+          <p:nvPr/>
+        </p:nvSpPr>
+        <p:spPr>
+          <a:xfrm>
+            <a:off x="978408" y="1390996"/>
+            <a:ext cx="10378440" cy="692727"/>
+          </a:xfrm>
+          <a:prstGeom prst="rect">
+            <a:avLst/>
+          </a:prstGeom>
+          <a:solidFill>
+            <a:schemeClr val="bg1"/>
+          </a:solidFill>
+          <a:ln>
             <a:solidFill>
-              <a:schemeClr val="accent2"/>
+              <a:schemeClr val="bg1"/>
             </a:solidFill>
           </a:ln>
         </p:spPr>
-      </p:pic>
-      <p:sp>
-        <p:nvSpPr>
-          <p:cNvPr id="73" name="Espace réservé du numéro de diapositive 72">
+        <p:style>
+          <a:lnRef idx="2">
+            <a:schemeClr val="accent1">
+              <a:shade val="15000"/>
+            </a:schemeClr>
+          </a:lnRef>
+          <a:fillRef idx="1">
+            <a:schemeClr val="accent1"/>
+          </a:fillRef>
+          <a:effectRef idx="0">
+            <a:schemeClr val="accent1"/>
+          </a:effectRef>
+          <a:fontRef idx="minor">
+            <a:schemeClr val="lt1"/>
+          </a:fontRef>
+        </p:style>
+        <p:txBody>
+          <a:bodyPr rtlCol="0" anchor="ctr"/>
+          <a:lstStyle/>
+          <a:p>
+            <a:pPr algn="ctr"/>
+            <a:endParaRPr lang="fr-CH">
+              <a:ln>
+                <a:solidFill>
+                  <a:schemeClr val="bg1"/>
+                </a:solidFill>
+              </a:ln>
+              <a:solidFill>
+                <a:schemeClr val="bg1"/>
+              </a:solidFill>
+            </a:endParaRPr>
+          </a:p>
+        </p:txBody>
+      </p:sp>
+      <p:sp>
+        <p:nvSpPr>
+          <p:cNvPr id="18" name="Espace réservé du numéro de diapositive 17">
             <a:extLst>
               <a:ext uri="{FF2B5EF4-FFF2-40B4-BE49-F238E27FC236}">
-                <a16:creationId xmlns:a16="http://schemas.microsoft.com/office/drawing/2014/main" id="{6E0D40B9-4592-1093-F0F8-75E032A4A17B}"/>
+                <a16:creationId xmlns:a16="http://schemas.microsoft.com/office/drawing/2014/main" id="{58B5CB20-8824-92A6-5186-58816AA76C2D}"/>
               </a:ext>
             </a:extLst>
           </p:cNvPr>
@@ -7239,10 +8174,40 @@
           </a:p>
         </p:txBody>
       </p:sp>
+      <p:pic>
+        <p:nvPicPr>
+          <p:cNvPr id="3" name="Image 2" descr="Une image contenant texte, capture d’écran, logiciel, Icône d’ordinateur&#10;&#10;Description générée automatiquement">
+            <a:extLst>
+              <a:ext uri="{FF2B5EF4-FFF2-40B4-BE49-F238E27FC236}">
+                <a16:creationId xmlns:a16="http://schemas.microsoft.com/office/drawing/2014/main" id="{A520E31E-7D8D-B8AD-25F3-F5BFE3147D28}"/>
+              </a:ext>
+            </a:extLst>
+          </p:cNvPr>
+          <p:cNvPicPr>
+            <a:picLocks noChangeAspect="1"/>
+          </p:cNvPicPr>
+          <p:nvPr/>
+        </p:nvPicPr>
+        <p:blipFill>
+          <a:blip r:embed="rId2"/>
+          <a:stretch>
+            <a:fillRect/>
+          </a:stretch>
+        </p:blipFill>
+        <p:spPr>
+          <a:xfrm>
+            <a:off x="950120" y="0"/>
+            <a:ext cx="10418214" cy="6336792"/>
+          </a:xfrm>
+          <a:prstGeom prst="rect">
+            <a:avLst/>
+          </a:prstGeom>
+        </p:spPr>
+      </p:pic>
     </p:spTree>
     <p:extLst>
       <p:ext uri="{BB962C8B-B14F-4D97-AF65-F5344CB8AC3E}">
-        <p14:creationId xmlns:p14="http://schemas.microsoft.com/office/powerpoint/2010/main" val="2686455783"/>
+        <p14:creationId xmlns:p14="http://schemas.microsoft.com/office/powerpoint/2010/main" val="3236359669"/>
       </p:ext>
     </p:extLst>
   </p:cSld>
@@ -7253,6 +8218,310 @@
 </file>
 
 <file path=ppt/slides/slide6.xml><?xml version="1.0" encoding="utf-8"?>
+<p:sld xmlns:a="http://schemas.openxmlformats.org/drawingml/2006/main" xmlns:r="http://schemas.openxmlformats.org/officeDocument/2006/relationships" xmlns:p="http://schemas.openxmlformats.org/presentationml/2006/main">
+  <p:cSld>
+    <p:spTree>
+      <p:nvGrpSpPr>
+        <p:cNvPr id="1" name=""/>
+        <p:cNvGrpSpPr/>
+        <p:nvPr/>
+      </p:nvGrpSpPr>
+      <p:grpSpPr>
+        <a:xfrm>
+          <a:off x="0" y="0"/>
+          <a:ext cx="0" cy="0"/>
+          <a:chOff x="0" y="0"/>
+          <a:chExt cx="0" cy="0"/>
+        </a:xfrm>
+      </p:grpSpPr>
+      <p:sp>
+        <p:nvSpPr>
+          <p:cNvPr id="17" name="Rectangle 16">
+            <a:extLst>
+              <a:ext uri="{FF2B5EF4-FFF2-40B4-BE49-F238E27FC236}">
+                <a16:creationId xmlns:a16="http://schemas.microsoft.com/office/drawing/2014/main" id="{2D1B6F76-30B5-9BEF-DA4C-B0DB84809F1F}"/>
+              </a:ext>
+            </a:extLst>
+          </p:cNvPr>
+          <p:cNvSpPr/>
+          <p:nvPr/>
+        </p:nvSpPr>
+        <p:spPr>
+          <a:xfrm>
+            <a:off x="978408" y="1390996"/>
+            <a:ext cx="10378440" cy="692727"/>
+          </a:xfrm>
+          <a:prstGeom prst="rect">
+            <a:avLst/>
+          </a:prstGeom>
+          <a:solidFill>
+            <a:schemeClr val="bg1"/>
+          </a:solidFill>
+          <a:ln>
+            <a:solidFill>
+              <a:schemeClr val="bg1"/>
+            </a:solidFill>
+          </a:ln>
+        </p:spPr>
+        <p:style>
+          <a:lnRef idx="2">
+            <a:schemeClr val="accent1">
+              <a:shade val="15000"/>
+            </a:schemeClr>
+          </a:lnRef>
+          <a:fillRef idx="1">
+            <a:schemeClr val="accent1"/>
+          </a:fillRef>
+          <a:effectRef idx="0">
+            <a:schemeClr val="accent1"/>
+          </a:effectRef>
+          <a:fontRef idx="minor">
+            <a:schemeClr val="lt1"/>
+          </a:fontRef>
+        </p:style>
+        <p:txBody>
+          <a:bodyPr rtlCol="0" anchor="ctr"/>
+          <a:lstStyle/>
+          <a:p>
+            <a:pPr algn="ctr"/>
+            <a:endParaRPr lang="fr-CH">
+              <a:ln>
+                <a:solidFill>
+                  <a:schemeClr val="bg1"/>
+                </a:solidFill>
+              </a:ln>
+              <a:solidFill>
+                <a:schemeClr val="bg1"/>
+              </a:solidFill>
+            </a:endParaRPr>
+          </a:p>
+        </p:txBody>
+      </p:sp>
+      <p:sp>
+        <p:nvSpPr>
+          <p:cNvPr id="18" name="Espace réservé du numéro de diapositive 17">
+            <a:extLst>
+              <a:ext uri="{FF2B5EF4-FFF2-40B4-BE49-F238E27FC236}">
+                <a16:creationId xmlns:a16="http://schemas.microsoft.com/office/drawing/2014/main" id="{58B5CB20-8824-92A6-5186-58816AA76C2D}"/>
+              </a:ext>
+            </a:extLst>
+          </p:cNvPr>
+          <p:cNvSpPr>
+            <a:spLocks noGrp="1"/>
+          </p:cNvSpPr>
+          <p:nvPr>
+            <p:ph type="sldNum" sz="quarter" idx="12"/>
+          </p:nvPr>
+        </p:nvSpPr>
+        <p:spPr/>
+        <p:txBody>
+          <a:bodyPr/>
+          <a:lstStyle/>
+          <a:p>
+            <a:fld id="{629637A9-119A-49DA-BD12-AAC58B377D80}" type="slidenum">
+              <a:rPr lang="en-US" smtClean="0"/>
+              <a:t>6</a:t>
+            </a:fld>
+            <a:endParaRPr lang="en-US" dirty="0"/>
+          </a:p>
+        </p:txBody>
+      </p:sp>
+      <p:pic>
+        <p:nvPicPr>
+          <p:cNvPr id="3" name="Image 2" descr="Une image contenant texte, capture d’écran, affichage, logiciel&#10;&#10;Description générée automatiquement">
+            <a:extLst>
+              <a:ext uri="{FF2B5EF4-FFF2-40B4-BE49-F238E27FC236}">
+                <a16:creationId xmlns:a16="http://schemas.microsoft.com/office/drawing/2014/main" id="{D4EF20A4-84A8-790C-567F-B79C776A7FC1}"/>
+              </a:ext>
+            </a:extLst>
+          </p:cNvPr>
+          <p:cNvPicPr>
+            <a:picLocks noChangeAspect="1"/>
+          </p:cNvPicPr>
+          <p:nvPr/>
+        </p:nvPicPr>
+        <p:blipFill>
+          <a:blip r:embed="rId2"/>
+          <a:stretch>
+            <a:fillRect/>
+          </a:stretch>
+        </p:blipFill>
+        <p:spPr>
+          <a:xfrm>
+            <a:off x="895038" y="0"/>
+            <a:ext cx="10464242" cy="6336792"/>
+          </a:xfrm>
+          <a:prstGeom prst="rect">
+            <a:avLst/>
+          </a:prstGeom>
+        </p:spPr>
+      </p:pic>
+    </p:spTree>
+    <p:extLst>
+      <p:ext uri="{BB962C8B-B14F-4D97-AF65-F5344CB8AC3E}">
+        <p14:creationId xmlns:p14="http://schemas.microsoft.com/office/powerpoint/2010/main" val="1957221898"/>
+      </p:ext>
+    </p:extLst>
+  </p:cSld>
+  <p:clrMapOvr>
+    <a:masterClrMapping/>
+  </p:clrMapOvr>
+</p:sld>
+</file>
+
+<file path=ppt/slides/slide7.xml><?xml version="1.0" encoding="utf-8"?>
+<p:sld xmlns:a="http://schemas.openxmlformats.org/drawingml/2006/main" xmlns:r="http://schemas.openxmlformats.org/officeDocument/2006/relationships" xmlns:p="http://schemas.openxmlformats.org/presentationml/2006/main">
+  <p:cSld>
+    <p:spTree>
+      <p:nvGrpSpPr>
+        <p:cNvPr id="1" name=""/>
+        <p:cNvGrpSpPr/>
+        <p:nvPr/>
+      </p:nvGrpSpPr>
+      <p:grpSpPr>
+        <a:xfrm>
+          <a:off x="0" y="0"/>
+          <a:ext cx="0" cy="0"/>
+          <a:chOff x="0" y="0"/>
+          <a:chExt cx="0" cy="0"/>
+        </a:xfrm>
+      </p:grpSpPr>
+      <p:sp>
+        <p:nvSpPr>
+          <p:cNvPr id="17" name="Rectangle 16">
+            <a:extLst>
+              <a:ext uri="{FF2B5EF4-FFF2-40B4-BE49-F238E27FC236}">
+                <a16:creationId xmlns:a16="http://schemas.microsoft.com/office/drawing/2014/main" id="{2D1B6F76-30B5-9BEF-DA4C-B0DB84809F1F}"/>
+              </a:ext>
+            </a:extLst>
+          </p:cNvPr>
+          <p:cNvSpPr/>
+          <p:nvPr/>
+        </p:nvSpPr>
+        <p:spPr>
+          <a:xfrm>
+            <a:off x="978408" y="1390996"/>
+            <a:ext cx="10378440" cy="692727"/>
+          </a:xfrm>
+          <a:prstGeom prst="rect">
+            <a:avLst/>
+          </a:prstGeom>
+          <a:solidFill>
+            <a:schemeClr val="bg1"/>
+          </a:solidFill>
+          <a:ln>
+            <a:solidFill>
+              <a:schemeClr val="bg1"/>
+            </a:solidFill>
+          </a:ln>
+        </p:spPr>
+        <p:style>
+          <a:lnRef idx="2">
+            <a:schemeClr val="accent1">
+              <a:shade val="15000"/>
+            </a:schemeClr>
+          </a:lnRef>
+          <a:fillRef idx="1">
+            <a:schemeClr val="accent1"/>
+          </a:fillRef>
+          <a:effectRef idx="0">
+            <a:schemeClr val="accent1"/>
+          </a:effectRef>
+          <a:fontRef idx="minor">
+            <a:schemeClr val="lt1"/>
+          </a:fontRef>
+        </p:style>
+        <p:txBody>
+          <a:bodyPr rtlCol="0" anchor="ctr"/>
+          <a:lstStyle/>
+          <a:p>
+            <a:pPr algn="ctr"/>
+            <a:endParaRPr lang="fr-CH">
+              <a:ln>
+                <a:solidFill>
+                  <a:schemeClr val="bg1"/>
+                </a:solidFill>
+              </a:ln>
+              <a:solidFill>
+                <a:schemeClr val="bg1"/>
+              </a:solidFill>
+            </a:endParaRPr>
+          </a:p>
+        </p:txBody>
+      </p:sp>
+      <p:sp>
+        <p:nvSpPr>
+          <p:cNvPr id="18" name="Espace réservé du numéro de diapositive 17">
+            <a:extLst>
+              <a:ext uri="{FF2B5EF4-FFF2-40B4-BE49-F238E27FC236}">
+                <a16:creationId xmlns:a16="http://schemas.microsoft.com/office/drawing/2014/main" id="{58B5CB20-8824-92A6-5186-58816AA76C2D}"/>
+              </a:ext>
+            </a:extLst>
+          </p:cNvPr>
+          <p:cNvSpPr>
+            <a:spLocks noGrp="1"/>
+          </p:cNvSpPr>
+          <p:nvPr>
+            <p:ph type="sldNum" sz="quarter" idx="12"/>
+          </p:nvPr>
+        </p:nvSpPr>
+        <p:spPr/>
+        <p:txBody>
+          <a:bodyPr/>
+          <a:lstStyle/>
+          <a:p>
+            <a:fld id="{629637A9-119A-49DA-BD12-AAC58B377D80}" type="slidenum">
+              <a:rPr lang="en-US" smtClean="0"/>
+              <a:t>7</a:t>
+            </a:fld>
+            <a:endParaRPr lang="en-US" dirty="0"/>
+          </a:p>
+        </p:txBody>
+      </p:sp>
+      <p:pic>
+        <p:nvPicPr>
+          <p:cNvPr id="3" name="Image 2" descr="Une image contenant texte, capture d’écran, logiciel, Icône d’ordinateur&#10;&#10;Description générée automatiquement">
+            <a:extLst>
+              <a:ext uri="{FF2B5EF4-FFF2-40B4-BE49-F238E27FC236}">
+                <a16:creationId xmlns:a16="http://schemas.microsoft.com/office/drawing/2014/main" id="{82A13E38-7B81-8C4C-BD1D-50CF697E0FB8}"/>
+              </a:ext>
+            </a:extLst>
+          </p:cNvPr>
+          <p:cNvPicPr>
+            <a:picLocks noChangeAspect="1"/>
+          </p:cNvPicPr>
+          <p:nvPr/>
+        </p:nvPicPr>
+        <p:blipFill>
+          <a:blip r:embed="rId2"/>
+          <a:stretch>
+            <a:fillRect/>
+          </a:stretch>
+        </p:blipFill>
+        <p:spPr>
+          <a:xfrm>
+            <a:off x="913499" y="0"/>
+            <a:ext cx="10462762" cy="6345936"/>
+          </a:xfrm>
+          <a:prstGeom prst="rect">
+            <a:avLst/>
+          </a:prstGeom>
+        </p:spPr>
+      </p:pic>
+    </p:spTree>
+    <p:extLst>
+      <p:ext uri="{BB962C8B-B14F-4D97-AF65-F5344CB8AC3E}">
+        <p14:creationId xmlns:p14="http://schemas.microsoft.com/office/powerpoint/2010/main" val="3778939939"/>
+      </p:ext>
+    </p:extLst>
+  </p:cSld>
+  <p:clrMapOvr>
+    <a:masterClrMapping/>
+  </p:clrMapOvr>
+</p:sld>
+</file>
+
+<file path=ppt/slides/slide8.xml><?xml version="1.0" encoding="utf-8"?>
 <p:sld xmlns:a="http://schemas.openxmlformats.org/drawingml/2006/main" xmlns:r="http://schemas.openxmlformats.org/officeDocument/2006/relationships" xmlns:p="http://schemas.openxmlformats.org/presentationml/2006/main">
   <p:cSld>
     <p:spTree>
@@ -8216,7 +9485,7 @@
           <a:p>
             <a:fld id="{629637A9-119A-49DA-BD12-AAC58B377D80}" type="slidenum">
               <a:rPr lang="en-US" smtClean="0"/>
-              <a:t>6</a:t>
+              <a:t>8</a:t>
             </a:fld>
             <a:endParaRPr lang="en-US" dirty="0"/>
           </a:p>
@@ -8235,7 +9504,7 @@
 </p:sld>
 </file>
 
-<file path=ppt/slides/slide7.xml><?xml version="1.0" encoding="utf-8"?>
+<file path=ppt/slides/slide9.xml><?xml version="1.0" encoding="utf-8"?>
 <p:sld xmlns:a="http://schemas.openxmlformats.org/drawingml/2006/main" xmlns:r="http://schemas.openxmlformats.org/officeDocument/2006/relationships" xmlns:p="http://schemas.openxmlformats.org/presentationml/2006/main">
   <p:cSld>
     <p:spTree>
@@ -8254,118 +9523,10 @@
       </p:grpSpPr>
       <p:sp>
         <p:nvSpPr>
-          <p:cNvPr id="29" name="Rectangle 28">
-            <a:extLst>
-              <a:ext uri="{FF2B5EF4-FFF2-40B4-BE49-F238E27FC236}">
-                <a16:creationId xmlns:a16="http://schemas.microsoft.com/office/drawing/2014/main" id="{9949CEBF-A281-6972-70B7-FD0BA2554165}"/>
-              </a:ext>
-            </a:extLst>
-          </p:cNvPr>
-          <p:cNvSpPr/>
-          <p:nvPr/>
-        </p:nvSpPr>
-        <p:spPr>
-          <a:xfrm>
-            <a:off x="-112776" y="6319250"/>
-            <a:ext cx="12402312" cy="590233"/>
-          </a:xfrm>
-          <a:prstGeom prst="rect">
-            <a:avLst/>
-          </a:prstGeom>
-          <a:solidFill>
-            <a:schemeClr val="bg1"/>
-          </a:solidFill>
-          <a:ln>
-            <a:solidFill>
-              <a:schemeClr val="bg1"/>
-            </a:solidFill>
-          </a:ln>
-        </p:spPr>
-        <p:style>
-          <a:lnRef idx="2">
-            <a:schemeClr val="accent1">
-              <a:shade val="15000"/>
-            </a:schemeClr>
-          </a:lnRef>
-          <a:fillRef idx="1">
-            <a:schemeClr val="accent1"/>
-          </a:fillRef>
-          <a:effectRef idx="0">
-            <a:schemeClr val="accent1"/>
-          </a:effectRef>
-          <a:fontRef idx="minor">
-            <a:schemeClr val="lt1"/>
-          </a:fontRef>
-        </p:style>
-        <p:txBody>
-          <a:bodyPr rtlCol="0" anchor="ctr"/>
-          <a:lstStyle/>
-          <a:p>
-            <a:pPr algn="ctr"/>
-            <a:endParaRPr lang="fr-CH"/>
-          </a:p>
-        </p:txBody>
-      </p:sp>
-      <p:sp>
-        <p:nvSpPr>
-          <p:cNvPr id="23" name="Rectangle 22">
-            <a:extLst>
-              <a:ext uri="{FF2B5EF4-FFF2-40B4-BE49-F238E27FC236}">
-                <a16:creationId xmlns:a16="http://schemas.microsoft.com/office/drawing/2014/main" id="{9C786569-6568-0608-3F34-79A8651A3ED9}"/>
-              </a:ext>
-            </a:extLst>
-          </p:cNvPr>
-          <p:cNvSpPr/>
-          <p:nvPr/>
-        </p:nvSpPr>
-        <p:spPr>
-          <a:xfrm>
-            <a:off x="902208" y="1264580"/>
-            <a:ext cx="10387584" cy="978027"/>
-          </a:xfrm>
-          <a:prstGeom prst="rect">
-            <a:avLst/>
-          </a:prstGeom>
-          <a:solidFill>
-            <a:schemeClr val="bg1"/>
-          </a:solidFill>
-          <a:ln>
-            <a:solidFill>
-              <a:schemeClr val="bg1"/>
-            </a:solidFill>
-          </a:ln>
-        </p:spPr>
-        <p:style>
-          <a:lnRef idx="2">
-            <a:schemeClr val="accent1">
-              <a:shade val="15000"/>
-            </a:schemeClr>
-          </a:lnRef>
-          <a:fillRef idx="1">
-            <a:schemeClr val="accent1"/>
-          </a:fillRef>
-          <a:effectRef idx="0">
-            <a:schemeClr val="accent1"/>
-          </a:effectRef>
-          <a:fontRef idx="minor">
-            <a:schemeClr val="lt1"/>
-          </a:fontRef>
-        </p:style>
-        <p:txBody>
-          <a:bodyPr rtlCol="0" anchor="ctr"/>
-          <a:lstStyle/>
-          <a:p>
-            <a:pPr algn="ctr"/>
-            <a:endParaRPr lang="fr-CH"/>
-          </a:p>
-        </p:txBody>
-      </p:sp>
-      <p:sp>
-        <p:nvSpPr>
           <p:cNvPr id="2" name="Titre 1">
             <a:extLst>
               <a:ext uri="{FF2B5EF4-FFF2-40B4-BE49-F238E27FC236}">
-                <a16:creationId xmlns:a16="http://schemas.microsoft.com/office/drawing/2014/main" id="{A1F9B188-B064-DCCF-347F-E27C313F6271}"/>
+                <a16:creationId xmlns:a16="http://schemas.microsoft.com/office/drawing/2014/main" id="{8E3C57CD-B4C5-F7C5-6981-2AFB26AFE046}"/>
               </a:ext>
             </a:extLst>
           </p:cNvPr>
@@ -8376,21 +9537,14 @@
             <p:ph type="title"/>
           </p:nvPr>
         </p:nvSpPr>
-        <p:spPr>
-          <a:xfrm>
-            <a:off x="1490472" y="123033"/>
-            <a:ext cx="9665208" cy="654208"/>
-          </a:xfrm>
-        </p:spPr>
-        <p:txBody>
-          <a:bodyPr>
-            <a:noAutofit/>
-          </a:bodyPr>
+        <p:spPr/>
+        <p:txBody>
+          <a:bodyPr/>
           <a:lstStyle/>
           <a:p>
             <a:r>
-              <a:rPr lang="fr-CH" sz="3600"/>
-              <a:t>Méthode AddRecord</a:t>
+              <a:rPr lang="fr-CH"/>
+              <a:t>DataGridView</a:t>
             </a:r>
           </a:p>
         </p:txBody>
@@ -8400,7 +9554,7 @@
           <p:cNvPr id="4" name="Espace réservé du numéro de diapositive 3">
             <a:extLst>
               <a:ext uri="{FF2B5EF4-FFF2-40B4-BE49-F238E27FC236}">
-                <a16:creationId xmlns:a16="http://schemas.microsoft.com/office/drawing/2014/main" id="{5AC43FB5-7539-C051-F85E-BD02F426C63A}"/>
+                <a16:creationId xmlns:a16="http://schemas.microsoft.com/office/drawing/2014/main" id="{9C41DB5E-0447-399A-EAB7-330235728C6D}"/>
               </a:ext>
             </a:extLst>
           </p:cNvPr>
@@ -8411,407 +9565,16 @@
             <p:ph type="sldNum" sz="quarter" idx="12"/>
           </p:nvPr>
         </p:nvSpPr>
-        <p:spPr>
-          <a:xfrm>
-            <a:off x="9932047" y="6443698"/>
-            <a:ext cx="1312025" cy="365125"/>
-          </a:xfrm>
-        </p:spPr>
+        <p:spPr/>
         <p:txBody>
           <a:bodyPr/>
           <a:lstStyle/>
           <a:p>
             <a:fld id="{629637A9-119A-49DA-BD12-AAC58B377D80}" type="slidenum">
-              <a:rPr lang="en-US" smtClean="0">
-                <a:solidFill>
-                  <a:schemeClr val="tx1"/>
-                </a:solidFill>
-              </a:rPr>
-              <a:t>7</a:t>
+              <a:rPr lang="en-US" smtClean="0"/>
+              <a:t>9</a:t>
             </a:fld>
-            <a:endParaRPr lang="en-US" dirty="0">
-              <a:solidFill>
-                <a:schemeClr val="tx1"/>
-              </a:solidFill>
-            </a:endParaRPr>
-          </a:p>
-        </p:txBody>
-      </p:sp>
-      <p:pic>
-        <p:nvPicPr>
-          <p:cNvPr id="10" name="Image 9">
-            <a:extLst>
-              <a:ext uri="{FF2B5EF4-FFF2-40B4-BE49-F238E27FC236}">
-                <a16:creationId xmlns:a16="http://schemas.microsoft.com/office/drawing/2014/main" id="{BF24A46B-7778-125F-725A-69E00C1CA00F}"/>
-              </a:ext>
-            </a:extLst>
-          </p:cNvPr>
-          <p:cNvPicPr>
-            <a:picLocks noChangeAspect="1"/>
-          </p:cNvPicPr>
-          <p:nvPr/>
-        </p:nvPicPr>
-        <p:blipFill rotWithShape="1">
-          <a:blip r:embed="rId2"/>
-          <a:srcRect t="717"/>
-          <a:stretch/>
-        </p:blipFill>
-        <p:spPr>
-          <a:xfrm>
-            <a:off x="1327530" y="2783396"/>
-            <a:ext cx="8273670" cy="3911587"/>
-          </a:xfrm>
-          <a:prstGeom prst="rect">
-            <a:avLst/>
-          </a:prstGeom>
-          <a:ln w="38100">
-            <a:solidFill>
-              <a:srgbClr val="FFC000"/>
-            </a:solidFill>
-          </a:ln>
-        </p:spPr>
-      </p:pic>
-      <p:grpSp>
-        <p:nvGrpSpPr>
-          <p:cNvPr id="27" name="Groupe 26">
-            <a:extLst>
-              <a:ext uri="{FF2B5EF4-FFF2-40B4-BE49-F238E27FC236}">
-                <a16:creationId xmlns:a16="http://schemas.microsoft.com/office/drawing/2014/main" id="{9D17F709-A66C-DA1D-B65B-47B6249816A4}"/>
-              </a:ext>
-            </a:extLst>
-          </p:cNvPr>
-          <p:cNvGrpSpPr/>
-          <p:nvPr/>
-        </p:nvGrpSpPr>
-        <p:grpSpPr>
-          <a:xfrm>
-            <a:off x="1327530" y="974552"/>
-            <a:ext cx="10559670" cy="1510413"/>
-            <a:chOff x="1327530" y="974552"/>
-            <a:chExt cx="10269001" cy="1468837"/>
-          </a:xfrm>
-        </p:grpSpPr>
-        <p:pic>
-          <p:nvPicPr>
-            <p:cNvPr id="12" name="Image 11">
-              <a:extLst>
-                <a:ext uri="{FF2B5EF4-FFF2-40B4-BE49-F238E27FC236}">
-                  <a16:creationId xmlns:a16="http://schemas.microsoft.com/office/drawing/2014/main" id="{6CCE7ED8-4682-3953-5F7A-4EFD6BC0D871}"/>
-                </a:ext>
-              </a:extLst>
-            </p:cNvPr>
-            <p:cNvPicPr>
-              <a:picLocks noChangeAspect="1"/>
-            </p:cNvPicPr>
-            <p:nvPr/>
-          </p:nvPicPr>
-          <p:blipFill rotWithShape="1">
-            <a:blip r:embed="rId3"/>
-            <a:srcRect t="35037"/>
-            <a:stretch/>
-          </p:blipFill>
-          <p:spPr>
-            <a:xfrm>
-              <a:off x="1336674" y="974552"/>
-              <a:ext cx="10259857" cy="365125"/>
-            </a:xfrm>
-            <a:prstGeom prst="rect">
-              <a:avLst/>
-            </a:prstGeom>
-          </p:spPr>
-        </p:pic>
-        <p:pic>
-          <p:nvPicPr>
-            <p:cNvPr id="16" name="Image 15">
-              <a:extLst>
-                <a:ext uri="{FF2B5EF4-FFF2-40B4-BE49-F238E27FC236}">
-                  <a16:creationId xmlns:a16="http://schemas.microsoft.com/office/drawing/2014/main" id="{091F26D0-66C9-EC50-02B5-7EFEA2C3E0C9}"/>
-                </a:ext>
-              </a:extLst>
-            </p:cNvPr>
-            <p:cNvPicPr>
-              <a:picLocks noChangeAspect="1"/>
-            </p:cNvPicPr>
-            <p:nvPr/>
-          </p:nvPicPr>
-          <p:blipFill rotWithShape="1">
-            <a:blip r:embed="rId4"/>
-            <a:srcRect t="-1" b="1843"/>
-            <a:stretch/>
-          </p:blipFill>
-          <p:spPr>
-            <a:xfrm>
-              <a:off x="1327530" y="1232018"/>
-              <a:ext cx="8468907" cy="953779"/>
-            </a:xfrm>
-            <a:prstGeom prst="rect">
-              <a:avLst/>
-            </a:prstGeom>
-          </p:spPr>
-        </p:pic>
-        <p:pic>
-          <p:nvPicPr>
-            <p:cNvPr id="20" name="Image 19">
-              <a:extLst>
-                <a:ext uri="{FF2B5EF4-FFF2-40B4-BE49-F238E27FC236}">
-                  <a16:creationId xmlns:a16="http://schemas.microsoft.com/office/drawing/2014/main" id="{C0A3CBD1-215C-6577-46F9-BFD406AA5539}"/>
-                </a:ext>
-              </a:extLst>
-            </p:cNvPr>
-            <p:cNvPicPr>
-              <a:picLocks noChangeAspect="1"/>
-            </p:cNvPicPr>
-            <p:nvPr/>
-          </p:nvPicPr>
-          <p:blipFill>
-            <a:blip r:embed="rId5"/>
-            <a:stretch>
-              <a:fillRect/>
-            </a:stretch>
-          </p:blipFill>
-          <p:spPr>
-            <a:xfrm>
-              <a:off x="1327530" y="2176652"/>
-              <a:ext cx="3810532" cy="266737"/>
-            </a:xfrm>
-            <a:prstGeom prst="rect">
-              <a:avLst/>
-            </a:prstGeom>
-          </p:spPr>
-        </p:pic>
-      </p:grpSp>
-      <p:sp>
-        <p:nvSpPr>
-          <p:cNvPr id="21" name="ZoneTexte 20">
-            <a:extLst>
-              <a:ext uri="{FF2B5EF4-FFF2-40B4-BE49-F238E27FC236}">
-                <a16:creationId xmlns:a16="http://schemas.microsoft.com/office/drawing/2014/main" id="{1989956C-2D2B-E42E-F923-5CBAF288C1C9}"/>
-              </a:ext>
-            </a:extLst>
-          </p:cNvPr>
-          <p:cNvSpPr txBox="1"/>
-          <p:nvPr/>
-        </p:nvSpPr>
-        <p:spPr>
-          <a:xfrm rot="16200000">
-            <a:off x="-115410" y="1558654"/>
-            <a:ext cx="1681930" cy="338554"/>
-          </a:xfrm>
-          <a:prstGeom prst="rect">
-            <a:avLst/>
-          </a:prstGeom>
-          <a:solidFill>
-            <a:schemeClr val="bg1">
-              <a:lumMod val="85000"/>
-            </a:schemeClr>
-          </a:solidFill>
-        </p:spPr>
-        <p:txBody>
-          <a:bodyPr wrap="square" rtlCol="0">
-            <a:spAutoFit/>
-          </a:bodyPr>
-          <a:lstStyle/>
-          <a:p>
-            <a:pPr algn="ctr"/>
-            <a:r>
-              <a:rPr lang="fr-CH" sz="1600"/>
-              <a:t>AddUpdCarrier.cs</a:t>
-            </a:r>
-          </a:p>
-        </p:txBody>
-      </p:sp>
-      <p:sp>
-        <p:nvSpPr>
-          <p:cNvPr id="22" name="ZoneTexte 21">
-            <a:extLst>
-              <a:ext uri="{FF2B5EF4-FFF2-40B4-BE49-F238E27FC236}">
-                <a16:creationId xmlns:a16="http://schemas.microsoft.com/office/drawing/2014/main" id="{F4AC3951-0226-6A88-1E31-2C3C157F9163}"/>
-              </a:ext>
-            </a:extLst>
-          </p:cNvPr>
-          <p:cNvSpPr txBox="1"/>
-          <p:nvPr/>
-        </p:nvSpPr>
-        <p:spPr>
-          <a:xfrm rot="16200000">
-            <a:off x="-1230240" y="4579056"/>
-            <a:ext cx="3911587" cy="338554"/>
-          </a:xfrm>
-          <a:prstGeom prst="rect">
-            <a:avLst/>
-          </a:prstGeom>
-          <a:solidFill>
-            <a:srgbClr val="FFC000"/>
-          </a:solidFill>
-        </p:spPr>
-        <p:txBody>
-          <a:bodyPr wrap="square" rtlCol="0">
-            <a:spAutoFit/>
-          </a:bodyPr>
-          <a:lstStyle/>
-          <a:p>
-            <a:pPr algn="ctr"/>
-            <a:r>
-              <a:rPr lang="fr-CH" sz="1600"/>
-              <a:t>AddUpdCarrier.cs</a:t>
-            </a:r>
-          </a:p>
-        </p:txBody>
-      </p:sp>
-      <p:cxnSp>
-        <p:nvCxnSpPr>
-          <p:cNvPr id="25" name="Connecteur droit 24">
-            <a:extLst>
-              <a:ext uri="{FF2B5EF4-FFF2-40B4-BE49-F238E27FC236}">
-                <a16:creationId xmlns:a16="http://schemas.microsoft.com/office/drawing/2014/main" id="{37A394B4-5F66-6C0A-F816-8B0428E36CF1}"/>
-              </a:ext>
-            </a:extLst>
-          </p:cNvPr>
-          <p:cNvCxnSpPr>
-            <a:cxnSpLocks/>
-          </p:cNvCxnSpPr>
-          <p:nvPr/>
-        </p:nvCxnSpPr>
-        <p:spPr>
-          <a:xfrm flipV="1">
-            <a:off x="1572768" y="768095"/>
-            <a:ext cx="9930384" cy="9145"/>
-          </a:xfrm>
-          <a:prstGeom prst="line">
-            <a:avLst/>
-          </a:prstGeom>
-          <a:ln>
-            <a:solidFill>
-              <a:schemeClr val="bg1">
-                <a:lumMod val="50000"/>
-              </a:schemeClr>
-            </a:solidFill>
-          </a:ln>
-        </p:spPr>
-        <p:style>
-          <a:lnRef idx="1">
-            <a:schemeClr val="accent1"/>
-          </a:lnRef>
-          <a:fillRef idx="0">
-            <a:schemeClr val="accent1"/>
-          </a:fillRef>
-          <a:effectRef idx="0">
-            <a:schemeClr val="accent1"/>
-          </a:effectRef>
-          <a:fontRef idx="minor">
-            <a:schemeClr val="tx1"/>
-          </a:fontRef>
-        </p:style>
-      </p:cxnSp>
-      <p:sp>
-        <p:nvSpPr>
-          <p:cNvPr id="28" name="Rectangle 27">
-            <a:extLst>
-              <a:ext uri="{FF2B5EF4-FFF2-40B4-BE49-F238E27FC236}">
-                <a16:creationId xmlns:a16="http://schemas.microsoft.com/office/drawing/2014/main" id="{87ACDB25-4985-0B38-E803-3D4A724D4410}"/>
-              </a:ext>
-            </a:extLst>
-          </p:cNvPr>
-          <p:cNvSpPr/>
-          <p:nvPr/>
-        </p:nvSpPr>
-        <p:spPr>
-          <a:xfrm>
-            <a:off x="1327529" y="886966"/>
-            <a:ext cx="10559671" cy="1681930"/>
-          </a:xfrm>
-          <a:prstGeom prst="rect">
-            <a:avLst/>
-          </a:prstGeom>
-          <a:noFill/>
-          <a:ln w="38100">
-            <a:solidFill>
-              <a:schemeClr val="bg1">
-                <a:lumMod val="85000"/>
-              </a:schemeClr>
-            </a:solidFill>
-          </a:ln>
-        </p:spPr>
-        <p:style>
-          <a:lnRef idx="2">
-            <a:schemeClr val="accent1">
-              <a:shade val="15000"/>
-            </a:schemeClr>
-          </a:lnRef>
-          <a:fillRef idx="1">
-            <a:schemeClr val="accent1"/>
-          </a:fillRef>
-          <a:effectRef idx="0">
-            <a:schemeClr val="accent1"/>
-          </a:effectRef>
-          <a:fontRef idx="minor">
-            <a:schemeClr val="lt1"/>
-          </a:fontRef>
-        </p:style>
-        <p:txBody>
-          <a:bodyPr rtlCol="0" anchor="ctr"/>
-          <a:lstStyle/>
-          <a:p>
-            <a:pPr algn="ctr"/>
-            <a:endParaRPr lang="fr-CH"/>
-          </a:p>
-        </p:txBody>
-      </p:sp>
-    </p:spTree>
-    <p:extLst>
-      <p:ext uri="{BB962C8B-B14F-4D97-AF65-F5344CB8AC3E}">
-        <p14:creationId xmlns:p14="http://schemas.microsoft.com/office/powerpoint/2010/main" val="4160466644"/>
-      </p:ext>
-    </p:extLst>
-  </p:cSld>
-  <p:clrMapOvr>
-    <a:masterClrMapping/>
-  </p:clrMapOvr>
-</p:sld>
-</file>
-
-<file path=ppt/slides/slide8.xml><?xml version="1.0" encoding="utf-8"?>
-<p:sld xmlns:a="http://schemas.openxmlformats.org/drawingml/2006/main" xmlns:r="http://schemas.openxmlformats.org/officeDocument/2006/relationships" xmlns:p="http://schemas.openxmlformats.org/presentationml/2006/main">
-  <p:cSld>
-    <p:spTree>
-      <p:nvGrpSpPr>
-        <p:cNvPr id="1" name=""/>
-        <p:cNvGrpSpPr/>
-        <p:nvPr/>
-      </p:nvGrpSpPr>
-      <p:grpSpPr>
-        <a:xfrm>
-          <a:off x="0" y="0"/>
-          <a:ext cx="0" cy="0"/>
-          <a:chOff x="0" y="0"/>
-          <a:chExt cx="0" cy="0"/>
-        </a:xfrm>
-      </p:grpSpPr>
-      <p:sp>
-        <p:nvSpPr>
-          <p:cNvPr id="2" name="Titre 1">
-            <a:extLst>
-              <a:ext uri="{FF2B5EF4-FFF2-40B4-BE49-F238E27FC236}">
-                <a16:creationId xmlns:a16="http://schemas.microsoft.com/office/drawing/2014/main" id="{04AFF39B-F66A-9398-2B7A-52467BAF934C}"/>
-              </a:ext>
-            </a:extLst>
-          </p:cNvPr>
-          <p:cNvSpPr>
-            <a:spLocks noGrp="1"/>
-          </p:cNvSpPr>
-          <p:nvPr>
-            <p:ph type="title"/>
-          </p:nvPr>
-        </p:nvSpPr>
-        <p:spPr/>
-        <p:txBody>
-          <a:bodyPr/>
-          <a:lstStyle/>
-          <a:p>
-            <a:r>
-              <a:rPr lang="fr-CH"/>
-              <a:t>Améliorations possibles</a:t>
-            </a:r>
+            <a:endParaRPr lang="en-US" dirty="0"/>
           </a:p>
         </p:txBody>
       </p:sp>
@@ -8820,7 +9583,7 @@
           <p:cNvPr id="5" name="Espace réservé du contenu 2">
             <a:extLst>
               <a:ext uri="{FF2B5EF4-FFF2-40B4-BE49-F238E27FC236}">
-                <a16:creationId xmlns:a16="http://schemas.microsoft.com/office/drawing/2014/main" id="{91888E6F-9C0C-B098-A4F5-28ADE9C34F2A}"/>
+                <a16:creationId xmlns:a16="http://schemas.microsoft.com/office/drawing/2014/main" id="{9499703C-042D-F512-B98B-225F231FC392}"/>
               </a:ext>
             </a:extLst>
           </p:cNvPr>
@@ -8831,7 +9594,7 @@
         </p:nvSpPr>
         <p:spPr>
           <a:xfrm>
-            <a:off x="1124712" y="1891454"/>
+            <a:off x="978408" y="1300326"/>
             <a:ext cx="10058400" cy="4023360"/>
           </a:xfrm>
           <a:prstGeom prst="rect">
@@ -9101,7 +9864,7 @@
             </a:pPr>
             <a:r>
               <a:rPr lang="fr-CH" sz="2800"/>
-              <a:t> Implémenter les onglets restants</a:t>
+              <a:t> DataSource : DataTable, DataSet, IBindingList… List&lt;Employee&gt;</a:t>
             </a:r>
           </a:p>
           <a:p>
@@ -9111,7 +9874,7 @@
             </a:pPr>
             <a:r>
               <a:rPr lang="fr-CH" sz="2800"/>
-              <a:t> Gestion des droits via les rôles</a:t>
+              <a:t> DGV crée une colonne par accesseur</a:t>
             </a:r>
           </a:p>
           <a:p>
@@ -9121,11 +9884,7 @@
             </a:pPr>
             <a:r>
               <a:rPr lang="fr-CH" sz="2800"/>
-              <a:t> </a:t>
-            </a:r>
-            <a:r>
-              <a:rPr lang="fr-FR" sz="2800"/>
-              <a:t>Utiliser les fonctions de tri de la DataGridView</a:t>
+              <a:t> Personnalisation via les propriétés :</a:t>
             </a:r>
           </a:p>
           <a:p>
@@ -9133,382 +9892,7 @@
               <a:buFont typeface="Arial" panose="020B0604020202020204" pitchFamily="34" charset="0"/>
               <a:buChar char="•"/>
             </a:pPr>
-            <a:r>
-              <a:rPr lang="fr-FR" sz="2800"/>
-              <a:t> Implémenter les filtres pour la DataGridView</a:t>
-            </a:r>
             <a:endParaRPr lang="fr-CH" sz="2800"/>
-          </a:p>
-        </p:txBody>
-      </p:sp>
-      <p:sp>
-        <p:nvSpPr>
-          <p:cNvPr id="7" name="Espace réservé du numéro de diapositive 6">
-            <a:extLst>
-              <a:ext uri="{FF2B5EF4-FFF2-40B4-BE49-F238E27FC236}">
-                <a16:creationId xmlns:a16="http://schemas.microsoft.com/office/drawing/2014/main" id="{E1D68C4D-67A6-C3A6-16C7-9CED5EE89578}"/>
-              </a:ext>
-            </a:extLst>
-          </p:cNvPr>
-          <p:cNvSpPr>
-            <a:spLocks noGrp="1"/>
-          </p:cNvSpPr>
-          <p:nvPr>
-            <p:ph type="sldNum" sz="quarter" idx="12"/>
-          </p:nvPr>
-        </p:nvSpPr>
-        <p:spPr/>
-        <p:txBody>
-          <a:bodyPr/>
-          <a:lstStyle/>
-          <a:p>
-            <a:fld id="{629637A9-119A-49DA-BD12-AAC58B377D80}" type="slidenum">
-              <a:rPr lang="en-US" smtClean="0"/>
-              <a:t>8</a:t>
-            </a:fld>
-            <a:endParaRPr lang="en-US" dirty="0"/>
-          </a:p>
-        </p:txBody>
-      </p:sp>
-    </p:spTree>
-    <p:extLst>
-      <p:ext uri="{BB962C8B-B14F-4D97-AF65-F5344CB8AC3E}">
-        <p14:creationId xmlns:p14="http://schemas.microsoft.com/office/powerpoint/2010/main" val="3791526076"/>
-      </p:ext>
-    </p:extLst>
-  </p:cSld>
-  <p:clrMapOvr>
-    <a:masterClrMapping/>
-  </p:clrMapOvr>
-</p:sld>
-</file>
-
-<file path=ppt/slides/slide9.xml><?xml version="1.0" encoding="utf-8"?>
-<p:sld xmlns:a="http://schemas.openxmlformats.org/drawingml/2006/main" xmlns:r="http://schemas.openxmlformats.org/officeDocument/2006/relationships" xmlns:p="http://schemas.openxmlformats.org/presentationml/2006/main">
-  <p:cSld>
-    <p:spTree>
-      <p:nvGrpSpPr>
-        <p:cNvPr id="1" name=""/>
-        <p:cNvGrpSpPr/>
-        <p:nvPr/>
-      </p:nvGrpSpPr>
-      <p:grpSpPr>
-        <a:xfrm>
-          <a:off x="0" y="0"/>
-          <a:ext cx="0" cy="0"/>
-          <a:chOff x="0" y="0"/>
-          <a:chExt cx="0" cy="0"/>
-        </a:xfrm>
-      </p:grpSpPr>
-      <p:sp>
-        <p:nvSpPr>
-          <p:cNvPr id="2" name="Titre 1">
-            <a:extLst>
-              <a:ext uri="{FF2B5EF4-FFF2-40B4-BE49-F238E27FC236}">
-                <a16:creationId xmlns:a16="http://schemas.microsoft.com/office/drawing/2014/main" id="{0302F4C2-08FF-BC0E-F560-394FEE8F05D5}"/>
-              </a:ext>
-            </a:extLst>
-          </p:cNvPr>
-          <p:cNvSpPr>
-            <a:spLocks noGrp="1"/>
-          </p:cNvSpPr>
-          <p:nvPr>
-            <p:ph type="title"/>
-          </p:nvPr>
-        </p:nvSpPr>
-        <p:spPr/>
-        <p:txBody>
-          <a:bodyPr/>
-          <a:lstStyle/>
-          <a:p>
-            <a:r>
-              <a:rPr lang="fr-CH"/>
-              <a:t>Rétrospective</a:t>
-            </a:r>
-          </a:p>
-        </p:txBody>
-      </p:sp>
-      <p:sp>
-        <p:nvSpPr>
-          <p:cNvPr id="4" name="Espace réservé du contenu 2">
-            <a:extLst>
-              <a:ext uri="{FF2B5EF4-FFF2-40B4-BE49-F238E27FC236}">
-                <a16:creationId xmlns:a16="http://schemas.microsoft.com/office/drawing/2014/main" id="{857B3220-3DE6-14E8-E2D4-B619A7A66BEE}"/>
-              </a:ext>
-            </a:extLst>
-          </p:cNvPr>
-          <p:cNvSpPr txBox="1">
-            <a:spLocks/>
-          </p:cNvSpPr>
-          <p:nvPr/>
-        </p:nvSpPr>
-        <p:spPr>
-          <a:xfrm>
-            <a:off x="1139952" y="1906694"/>
-            <a:ext cx="10058400" cy="4023360"/>
-          </a:xfrm>
-          <a:prstGeom prst="rect">
-            <a:avLst/>
-          </a:prstGeom>
-        </p:spPr>
-        <p:txBody>
-          <a:bodyPr vert="horz" lIns="0" tIns="45720" rIns="0" bIns="45720" rtlCol="0">
-            <a:normAutofit/>
-          </a:bodyPr>
-          <a:lstStyle>
-            <a:lvl1pPr marL="91440" indent="-91440" algn="l" defTabSz="914400" rtl="0" eaLnBrk="1" latinLnBrk="0" hangingPunct="1">
-              <a:lnSpc>
-                <a:spcPct val="90000"/>
-              </a:lnSpc>
-              <a:spcBef>
-                <a:spcPts val="1200"/>
-              </a:spcBef>
-              <a:spcAft>
-                <a:spcPts val="200"/>
-              </a:spcAft>
-              <a:buClr>
-                <a:schemeClr val="accent1"/>
-              </a:buClr>
-              <a:buSzPct val="100000"/>
-              <a:buFont typeface="Calibri" panose="020F0502020204030204" pitchFamily="34" charset="0"/>
-              <a:buChar char=" "/>
-              <a:defRPr sz="2000" kern="1200">
-                <a:solidFill>
-                  <a:schemeClr val="tx1">
-                    <a:lumMod val="75000"/>
-                    <a:lumOff val="25000"/>
-                  </a:schemeClr>
-                </a:solidFill>
-                <a:latin typeface="+mn-lt"/>
-                <a:ea typeface="+mn-ea"/>
-                <a:cs typeface="+mn-cs"/>
-              </a:defRPr>
-            </a:lvl1pPr>
-            <a:lvl2pPr marL="384048" indent="-182880" algn="l" defTabSz="914400" rtl="0" eaLnBrk="1" latinLnBrk="0" hangingPunct="1">
-              <a:lnSpc>
-                <a:spcPct val="90000"/>
-              </a:lnSpc>
-              <a:spcBef>
-                <a:spcPts val="200"/>
-              </a:spcBef>
-              <a:spcAft>
-                <a:spcPts val="400"/>
-              </a:spcAft>
-              <a:buClr>
-                <a:schemeClr val="accent1"/>
-              </a:buClr>
-              <a:buFont typeface="Calibri" pitchFamily="34" charset="0"/>
-              <a:buChar char="◦"/>
-              <a:defRPr sz="1800" kern="1200">
-                <a:solidFill>
-                  <a:schemeClr val="tx1">
-                    <a:lumMod val="75000"/>
-                    <a:lumOff val="25000"/>
-                  </a:schemeClr>
-                </a:solidFill>
-                <a:latin typeface="+mn-lt"/>
-                <a:ea typeface="+mn-ea"/>
-                <a:cs typeface="+mn-cs"/>
-              </a:defRPr>
-            </a:lvl2pPr>
-            <a:lvl3pPr marL="566928" indent="-182880" algn="l" defTabSz="914400" rtl="0" eaLnBrk="1" latinLnBrk="0" hangingPunct="1">
-              <a:lnSpc>
-                <a:spcPct val="90000"/>
-              </a:lnSpc>
-              <a:spcBef>
-                <a:spcPts val="200"/>
-              </a:spcBef>
-              <a:spcAft>
-                <a:spcPts val="400"/>
-              </a:spcAft>
-              <a:buClr>
-                <a:schemeClr val="accent1"/>
-              </a:buClr>
-              <a:buFont typeface="Calibri" pitchFamily="34" charset="0"/>
-              <a:buChar char="◦"/>
-              <a:defRPr sz="1400" kern="1200">
-                <a:solidFill>
-                  <a:schemeClr val="tx1">
-                    <a:lumMod val="75000"/>
-                    <a:lumOff val="25000"/>
-                  </a:schemeClr>
-                </a:solidFill>
-                <a:latin typeface="+mn-lt"/>
-                <a:ea typeface="+mn-ea"/>
-                <a:cs typeface="+mn-cs"/>
-              </a:defRPr>
-            </a:lvl3pPr>
-            <a:lvl4pPr marL="749808" indent="-182880" algn="l" defTabSz="914400" rtl="0" eaLnBrk="1" latinLnBrk="0" hangingPunct="1">
-              <a:lnSpc>
-                <a:spcPct val="90000"/>
-              </a:lnSpc>
-              <a:spcBef>
-                <a:spcPts val="200"/>
-              </a:spcBef>
-              <a:spcAft>
-                <a:spcPts val="400"/>
-              </a:spcAft>
-              <a:buClr>
-                <a:schemeClr val="accent1"/>
-              </a:buClr>
-              <a:buFont typeface="Calibri" pitchFamily="34" charset="0"/>
-              <a:buChar char="◦"/>
-              <a:defRPr sz="1400" kern="1200">
-                <a:solidFill>
-                  <a:schemeClr val="tx1">
-                    <a:lumMod val="75000"/>
-                    <a:lumOff val="25000"/>
-                  </a:schemeClr>
-                </a:solidFill>
-                <a:latin typeface="+mn-lt"/>
-                <a:ea typeface="+mn-ea"/>
-                <a:cs typeface="+mn-cs"/>
-              </a:defRPr>
-            </a:lvl4pPr>
-            <a:lvl5pPr marL="932688" indent="-182880" algn="l" defTabSz="914400" rtl="0" eaLnBrk="1" latinLnBrk="0" hangingPunct="1">
-              <a:lnSpc>
-                <a:spcPct val="90000"/>
-              </a:lnSpc>
-              <a:spcBef>
-                <a:spcPts val="200"/>
-              </a:spcBef>
-              <a:spcAft>
-                <a:spcPts val="400"/>
-              </a:spcAft>
-              <a:buClr>
-                <a:schemeClr val="accent1"/>
-              </a:buClr>
-              <a:buFont typeface="Calibri" pitchFamily="34" charset="0"/>
-              <a:buChar char="◦"/>
-              <a:defRPr sz="1400" kern="1200">
-                <a:solidFill>
-                  <a:schemeClr val="tx1">
-                    <a:lumMod val="75000"/>
-                    <a:lumOff val="25000"/>
-                  </a:schemeClr>
-                </a:solidFill>
-                <a:latin typeface="+mn-lt"/>
-                <a:ea typeface="+mn-ea"/>
-                <a:cs typeface="+mn-cs"/>
-              </a:defRPr>
-            </a:lvl5pPr>
-            <a:lvl6pPr marL="1100000" indent="-228600" algn="l" defTabSz="914400" rtl="0" eaLnBrk="1" latinLnBrk="0" hangingPunct="1">
-              <a:lnSpc>
-                <a:spcPct val="90000"/>
-              </a:lnSpc>
-              <a:spcBef>
-                <a:spcPts val="200"/>
-              </a:spcBef>
-              <a:spcAft>
-                <a:spcPts val="400"/>
-              </a:spcAft>
-              <a:buClr>
-                <a:schemeClr val="accent1"/>
-              </a:buClr>
-              <a:buFont typeface="Calibri" pitchFamily="34" charset="0"/>
-              <a:buChar char="◦"/>
-              <a:defRPr sz="1400" kern="1200">
-                <a:solidFill>
-                  <a:schemeClr val="tx1">
-                    <a:lumMod val="75000"/>
-                    <a:lumOff val="25000"/>
-                  </a:schemeClr>
-                </a:solidFill>
-                <a:latin typeface="+mn-lt"/>
-                <a:ea typeface="+mn-ea"/>
-                <a:cs typeface="+mn-cs"/>
-              </a:defRPr>
-            </a:lvl6pPr>
-            <a:lvl7pPr marL="1300000" indent="-228600" algn="l" defTabSz="914400" rtl="0" eaLnBrk="1" latinLnBrk="0" hangingPunct="1">
-              <a:lnSpc>
-                <a:spcPct val="90000"/>
-              </a:lnSpc>
-              <a:spcBef>
-                <a:spcPts val="200"/>
-              </a:spcBef>
-              <a:spcAft>
-                <a:spcPts val="400"/>
-              </a:spcAft>
-              <a:buClr>
-                <a:schemeClr val="accent1"/>
-              </a:buClr>
-              <a:buFont typeface="Calibri" pitchFamily="34" charset="0"/>
-              <a:buChar char="◦"/>
-              <a:defRPr sz="1400" kern="1200">
-                <a:solidFill>
-                  <a:schemeClr val="tx1">
-                    <a:lumMod val="75000"/>
-                    <a:lumOff val="25000"/>
-                  </a:schemeClr>
-                </a:solidFill>
-                <a:latin typeface="+mn-lt"/>
-                <a:ea typeface="+mn-ea"/>
-                <a:cs typeface="+mn-cs"/>
-              </a:defRPr>
-            </a:lvl7pPr>
-            <a:lvl8pPr marL="1500000" indent="-228600" algn="l" defTabSz="914400" rtl="0" eaLnBrk="1" latinLnBrk="0" hangingPunct="1">
-              <a:lnSpc>
-                <a:spcPct val="90000"/>
-              </a:lnSpc>
-              <a:spcBef>
-                <a:spcPts val="200"/>
-              </a:spcBef>
-              <a:spcAft>
-                <a:spcPts val="400"/>
-              </a:spcAft>
-              <a:buClr>
-                <a:schemeClr val="accent1"/>
-              </a:buClr>
-              <a:buFont typeface="Calibri" pitchFamily="34" charset="0"/>
-              <a:buChar char="◦"/>
-              <a:defRPr sz="1400" kern="1200">
-                <a:solidFill>
-                  <a:schemeClr val="tx1">
-                    <a:lumMod val="75000"/>
-                    <a:lumOff val="25000"/>
-                  </a:schemeClr>
-                </a:solidFill>
-                <a:latin typeface="+mn-lt"/>
-                <a:ea typeface="+mn-ea"/>
-                <a:cs typeface="+mn-cs"/>
-              </a:defRPr>
-            </a:lvl8pPr>
-            <a:lvl9pPr marL="1700000" indent="-228600" algn="l" defTabSz="914400" rtl="0" eaLnBrk="1" latinLnBrk="0" hangingPunct="1">
-              <a:lnSpc>
-                <a:spcPct val="90000"/>
-              </a:lnSpc>
-              <a:spcBef>
-                <a:spcPts val="200"/>
-              </a:spcBef>
-              <a:spcAft>
-                <a:spcPts val="400"/>
-              </a:spcAft>
-              <a:buClr>
-                <a:schemeClr val="accent1"/>
-              </a:buClr>
-              <a:buFont typeface="Calibri" pitchFamily="34" charset="0"/>
-              <a:buChar char="◦"/>
-              <a:defRPr sz="1400" kern="1200">
-                <a:solidFill>
-                  <a:schemeClr val="tx1">
-                    <a:lumMod val="75000"/>
-                    <a:lumOff val="25000"/>
-                  </a:schemeClr>
-                </a:solidFill>
-                <a:latin typeface="+mn-lt"/>
-                <a:ea typeface="+mn-ea"/>
-                <a:cs typeface="+mn-cs"/>
-              </a:defRPr>
-            </a:lvl9pPr>
-          </a:lstStyle>
-          <a:p>
-            <a:pPr marL="0" indent="0">
-              <a:buNone/>
-            </a:pPr>
-            <a:r>
-              <a:rPr lang="fr-CH" sz="2800"/>
-              <a:t> </a:t>
-            </a:r>
           </a:p>
           <a:p>
             <a:pPr>
@@ -9517,7 +9901,7 @@
             </a:pPr>
             <a:r>
               <a:rPr lang="fr-CH" sz="2800"/>
-              <a:t> Fonctions essentielles implémentées</a:t>
+              <a:t> Interaction via les évènements : </a:t>
             </a:r>
           </a:p>
           <a:p>
@@ -9525,71 +9909,94 @@
               <a:buFont typeface="Arial" panose="020B0604020202020204" pitchFamily="34" charset="0"/>
               <a:buChar char="•"/>
             </a:pPr>
-            <a:r>
-              <a:rPr lang="fr-CH" sz="2800"/>
-              <a:t> </a:t>
-            </a:r>
-            <a:r>
-              <a:rPr lang="fr-FR" sz="2800"/>
-              <a:t>Bonne collaboration</a:t>
-            </a:r>
+            <a:endParaRPr lang="fr-CH" sz="2800"/>
           </a:p>
           <a:p>
             <a:pPr>
               <a:buFont typeface="Arial" panose="020B0604020202020204" pitchFamily="34" charset="0"/>
               <a:buChar char="•"/>
             </a:pPr>
-            <a:r>
-              <a:rPr lang="fr-FR" sz="2800"/>
-              <a:t> Difficulté à intégrer les notions du 226b en cours de route</a:t>
-            </a:r>
+            <a:endParaRPr lang="fr-CH" sz="2800"/>
+          </a:p>
+          <a:p>
+            <a:pPr marL="0" indent="0">
+              <a:buNone/>
+            </a:pPr>
+            <a:endParaRPr lang="fr-CH" sz="2800"/>
           </a:p>
           <a:p>
             <a:pPr>
               <a:buFont typeface="Arial" panose="020B0604020202020204" pitchFamily="34" charset="0"/>
               <a:buChar char="•"/>
             </a:pPr>
-            <a:r>
-              <a:rPr lang="fr-FR" sz="2800"/>
-              <a:t> Plaisir malgré les difficultés mentionnées</a:t>
-            </a:r>
             <a:endParaRPr lang="fr-CH" sz="2800"/>
           </a:p>
         </p:txBody>
       </p:sp>
-      <p:sp>
-        <p:nvSpPr>
-          <p:cNvPr id="7" name="Espace réservé du numéro de diapositive 6">
+      <p:pic>
+        <p:nvPicPr>
+          <p:cNvPr id="7" name="Image 6">
             <a:extLst>
               <a:ext uri="{FF2B5EF4-FFF2-40B4-BE49-F238E27FC236}">
-                <a16:creationId xmlns:a16="http://schemas.microsoft.com/office/drawing/2014/main" id="{C7F90290-362F-7B5E-23D3-FF5F3B72FD28}"/>
+                <a16:creationId xmlns:a16="http://schemas.microsoft.com/office/drawing/2014/main" id="{55A5F03F-1598-1AA5-46B1-9B3A95BA4EC2}"/>
               </a:ext>
             </a:extLst>
           </p:cNvPr>
-          <p:cNvSpPr>
-            <a:spLocks noGrp="1"/>
-          </p:cNvSpPr>
-          <p:nvPr>
-            <p:ph type="sldNum" sz="quarter" idx="12"/>
-          </p:nvPr>
-        </p:nvSpPr>
-        <p:spPr/>
-        <p:txBody>
-          <a:bodyPr/>
-          <a:lstStyle/>
-          <a:p>
-            <a:fld id="{629637A9-119A-49DA-BD12-AAC58B377D80}" type="slidenum">
-              <a:rPr lang="en-US" smtClean="0"/>
-              <a:t>9</a:t>
-            </a:fld>
-            <a:endParaRPr lang="en-US" dirty="0"/>
-          </a:p>
-        </p:txBody>
-      </p:sp>
+          <p:cNvPicPr>
+            <a:picLocks noChangeAspect="1"/>
+          </p:cNvPicPr>
+          <p:nvPr/>
+        </p:nvPicPr>
+        <p:blipFill>
+          <a:blip r:embed="rId2"/>
+          <a:stretch>
+            <a:fillRect/>
+          </a:stretch>
+        </p:blipFill>
+        <p:spPr>
+          <a:xfrm>
+            <a:off x="1393399" y="3451267"/>
+            <a:ext cx="5432319" cy="573837"/>
+          </a:xfrm>
+          <a:prstGeom prst="rect">
+            <a:avLst/>
+          </a:prstGeom>
+        </p:spPr>
+      </p:pic>
+      <p:pic>
+        <p:nvPicPr>
+          <p:cNvPr id="13" name="Image 12">
+            <a:extLst>
+              <a:ext uri="{FF2B5EF4-FFF2-40B4-BE49-F238E27FC236}">
+                <a16:creationId xmlns:a16="http://schemas.microsoft.com/office/drawing/2014/main" id="{228910A3-9D45-EF53-6750-C9E421AB4730}"/>
+              </a:ext>
+            </a:extLst>
+          </p:cNvPr>
+          <p:cNvPicPr>
+            <a:picLocks noChangeAspect="1"/>
+          </p:cNvPicPr>
+          <p:nvPr/>
+        </p:nvPicPr>
+        <p:blipFill>
+          <a:blip r:embed="rId3"/>
+          <a:stretch>
+            <a:fillRect/>
+          </a:stretch>
+        </p:blipFill>
+        <p:spPr>
+          <a:xfrm>
+            <a:off x="1379616" y="4596154"/>
+            <a:ext cx="10812384" cy="1295581"/>
+          </a:xfrm>
+          <a:prstGeom prst="rect">
+            <a:avLst/>
+          </a:prstGeom>
+        </p:spPr>
+      </p:pic>
     </p:spTree>
     <p:extLst>
       <p:ext uri="{BB962C8B-B14F-4D97-AF65-F5344CB8AC3E}">
-        <p14:creationId xmlns:p14="http://schemas.microsoft.com/office/powerpoint/2010/main" val="2081047817"/>
+        <p14:creationId xmlns:p14="http://schemas.microsoft.com/office/powerpoint/2010/main" val="834568603"/>
       </p:ext>
     </p:extLst>
   </p:cSld>

</xml_diff>

<commit_message>
Small fix in doc and presentation
</commit_message>
<xml_diff>
--- a/Documentation/CargoFlow_Presentation.pptx
+++ b/Documentation/CargoFlow_Presentation.pptx
@@ -140,7 +140,7 @@
   <pc:docChgLst>
     <pc:chgData name="Antoine Martet" userId="19c2f1c6d7cf0253" providerId="LiveId" clId="{1BC09A2E-875D-4A1E-94FE-C9A40C0C8D60}"/>
     <pc:docChg chg="undo redo custSel addSld delSld modSld">
-      <pc:chgData name="Antoine Martet" userId="19c2f1c6d7cf0253" providerId="LiveId" clId="{1BC09A2E-875D-4A1E-94FE-C9A40C0C8D60}" dt="2024-01-14T18:18:45.228" v="1530" actId="2696"/>
+      <pc:chgData name="Antoine Martet" userId="19c2f1c6d7cf0253" providerId="LiveId" clId="{1BC09A2E-875D-4A1E-94FE-C9A40C0C8D60}" dt="2024-01-14T19:32:46.102" v="1546" actId="5793"/>
       <pc:docMkLst>
         <pc:docMk/>
       </pc:docMkLst>
@@ -189,11 +189,19 @@
         </pc:sldMkLst>
       </pc:sldChg>
       <pc:sldChg chg="modSp mod">
-        <pc:chgData name="Antoine Martet" userId="19c2f1c6d7cf0253" providerId="LiveId" clId="{1BC09A2E-875D-4A1E-94FE-C9A40C0C8D60}" dt="2024-01-14T15:28:05.065" v="784" actId="20577"/>
+        <pc:chgData name="Antoine Martet" userId="19c2f1c6d7cf0253" providerId="LiveId" clId="{1BC09A2E-875D-4A1E-94FE-C9A40C0C8D60}" dt="2024-01-14T19:31:50.224" v="1540" actId="20577"/>
         <pc:sldMkLst>
           <pc:docMk/>
           <pc:sldMk cId="2081047817" sldId="262"/>
         </pc:sldMkLst>
+        <pc:spChg chg="mod">
+          <ac:chgData name="Antoine Martet" userId="19c2f1c6d7cf0253" providerId="LiveId" clId="{1BC09A2E-875D-4A1E-94FE-C9A40C0C8D60}" dt="2024-01-14T19:31:50.224" v="1540" actId="20577"/>
+          <ac:spMkLst>
+            <pc:docMk/>
+            <pc:sldMk cId="2081047817" sldId="262"/>
+            <ac:spMk id="2" creationId="{0302F4C2-08FF-BC0E-F560-394FEE8F05D5}"/>
+          </ac:spMkLst>
+        </pc:spChg>
         <pc:spChg chg="mod">
           <ac:chgData name="Antoine Martet" userId="19c2f1c6d7cf0253" providerId="LiveId" clId="{1BC09A2E-875D-4A1E-94FE-C9A40C0C8D60}" dt="2024-01-14T15:28:05.065" v="784" actId="20577"/>
           <ac:spMkLst>
@@ -219,13 +227,13 @@
         </pc:spChg>
       </pc:sldChg>
       <pc:sldChg chg="modSp mod">
-        <pc:chgData name="Antoine Martet" userId="19c2f1c6d7cf0253" providerId="LiveId" clId="{1BC09A2E-875D-4A1E-94FE-C9A40C0C8D60}" dt="2024-01-14T18:18:05.283" v="1528" actId="20577"/>
+        <pc:chgData name="Antoine Martet" userId="19c2f1c6d7cf0253" providerId="LiveId" clId="{1BC09A2E-875D-4A1E-94FE-C9A40C0C8D60}" dt="2024-01-14T19:32:46.102" v="1546" actId="5793"/>
         <pc:sldMkLst>
           <pc:docMk/>
           <pc:sldMk cId="600273276" sldId="265"/>
         </pc:sldMkLst>
         <pc:spChg chg="mod">
-          <ac:chgData name="Antoine Martet" userId="19c2f1c6d7cf0253" providerId="LiveId" clId="{1BC09A2E-875D-4A1E-94FE-C9A40C0C8D60}" dt="2024-01-14T18:18:05.283" v="1528" actId="20577"/>
+          <ac:chgData name="Antoine Martet" userId="19c2f1c6d7cf0253" providerId="LiveId" clId="{1BC09A2E-875D-4A1E-94FE-C9A40C0C8D60}" dt="2024-01-14T19:32:46.102" v="1546" actId="5793"/>
           <ac:spMkLst>
             <pc:docMk/>
             <pc:sldMk cId="600273276" sldId="265"/>
@@ -6717,7 +6725,7 @@
           <a:p>
             <a:r>
               <a:rPr lang="fr-CH"/>
-              <a:t>Rétrospective</a:t>
+              <a:t>Conclusion</a:t>
             </a:r>
           </a:p>
         </p:txBody>
@@ -7652,13 +7660,22 @@
           </a:bodyPr>
           <a:lstStyle/>
           <a:p>
+            <a:pPr marL="0" indent="0">
+              <a:buNone/>
+            </a:pPr>
+            <a:r>
+              <a:rPr lang="fr-CH" sz="2800"/>
+              <a:t> </a:t>
+            </a:r>
+          </a:p>
+          <a:p>
             <a:pPr>
               <a:buFont typeface="Arial" panose="020B0604020202020204" pitchFamily="34" charset="0"/>
               <a:buChar char="•"/>
             </a:pPr>
             <a:r>
               <a:rPr lang="fr-CH" sz="2800"/>
-              <a:t> Démonstration</a:t>
+              <a:t>Démonstration</a:t>
             </a:r>
           </a:p>
           <a:p>
@@ -7689,16 +7706,6 @@
             <a:r>
               <a:rPr lang="fr-CH" sz="2800"/>
               <a:t> Améliorations possibles</a:t>
-            </a:r>
-          </a:p>
-          <a:p>
-            <a:pPr>
-              <a:buFont typeface="Arial" panose="020B0604020202020204" pitchFamily="34" charset="0"/>
-              <a:buChar char="•"/>
-            </a:pPr>
-            <a:r>
-              <a:rPr lang="fr-CH" sz="2800"/>
-              <a:t> Rétrospective</a:t>
             </a:r>
           </a:p>
           <a:p>

</xml_diff>

<commit_message>
Add names on each slide
</commit_message>
<xml_diff>
--- a/Documentation/CargoFlow_Presentation.pptx
+++ b/Documentation/CargoFlow_Presentation.pptx
@@ -7,6 +7,9 @@
   <p:notesMasterIdLst>
     <p:notesMasterId r:id="rId14"/>
   </p:notesMasterIdLst>
+  <p:handoutMasterIdLst>
+    <p:handoutMasterId r:id="rId15"/>
+  </p:handoutMasterIdLst>
   <p:sldIdLst>
     <p:sldId id="256" r:id="rId2"/>
     <p:sldId id="265" r:id="rId3"/>
@@ -595,6 +598,472 @@
     </pc:docChg>
   </pc:docChgLst>
   <pc:docChgLst>
+    <pc:chgData name="Antoine Martet" userId="19c2f1c6d7cf0253" providerId="LiveId" clId="{EBB826D3-0641-494B-8483-E075ED1B91CF}"/>
+    <pc:docChg chg="undo redo custSel addSld modSld">
+      <pc:chgData name="Antoine Martet" userId="19c2f1c6d7cf0253" providerId="LiveId" clId="{EBB826D3-0641-494B-8483-E075ED1B91CF}" dt="2023-10-30T20:21:39.986" v="851" actId="20577"/>
+      <pc:docMkLst>
+        <pc:docMk/>
+      </pc:docMkLst>
+      <pc:sldChg chg="addSp delSp modSp mod setBg">
+        <pc:chgData name="Antoine Martet" userId="19c2f1c6d7cf0253" providerId="LiveId" clId="{EBB826D3-0641-494B-8483-E075ED1B91CF}" dt="2023-10-30T10:20:53.910" v="49" actId="26606"/>
+        <pc:sldMkLst>
+          <pc:docMk/>
+          <pc:sldMk cId="3081763230" sldId="256"/>
+        </pc:sldMkLst>
+        <pc:spChg chg="mod">
+          <ac:chgData name="Antoine Martet" userId="19c2f1c6d7cf0253" providerId="LiveId" clId="{EBB826D3-0641-494B-8483-E075ED1B91CF}" dt="2023-10-30T10:20:53.910" v="49" actId="26606"/>
+          <ac:spMkLst>
+            <pc:docMk/>
+            <pc:sldMk cId="3081763230" sldId="256"/>
+            <ac:spMk id="2" creationId="{BD26FBBD-2494-72F0-CBFE-3960FC309E81}"/>
+          </ac:spMkLst>
+        </pc:spChg>
+        <pc:spChg chg="mod">
+          <ac:chgData name="Antoine Martet" userId="19c2f1c6d7cf0253" providerId="LiveId" clId="{EBB826D3-0641-494B-8483-E075ED1B91CF}" dt="2023-10-30T10:20:53.910" v="49" actId="26606"/>
+          <ac:spMkLst>
+            <pc:docMk/>
+            <pc:sldMk cId="3081763230" sldId="256"/>
+            <ac:spMk id="3" creationId="{5F92FCC9-3708-C611-9C2D-D843066841B0}"/>
+          </ac:spMkLst>
+        </pc:spChg>
+        <pc:spChg chg="add del">
+          <ac:chgData name="Antoine Martet" userId="19c2f1c6d7cf0253" providerId="LiveId" clId="{EBB826D3-0641-494B-8483-E075ED1B91CF}" dt="2023-10-30T10:20:53.910" v="49" actId="26606"/>
+          <ac:spMkLst>
+            <pc:docMk/>
+            <pc:sldMk cId="3081763230" sldId="256"/>
+            <ac:spMk id="8" creationId="{FBDCECDC-EEE3-4128-AA5E-82A8C08796E8}"/>
+          </ac:spMkLst>
+        </pc:spChg>
+        <pc:spChg chg="add del">
+          <ac:chgData name="Antoine Martet" userId="19c2f1c6d7cf0253" providerId="LiveId" clId="{EBB826D3-0641-494B-8483-E075ED1B91CF}" dt="2023-10-30T10:20:53.910" v="49" actId="26606"/>
+          <ac:spMkLst>
+            <pc:docMk/>
+            <pc:sldMk cId="3081763230" sldId="256"/>
+            <ac:spMk id="10" creationId="{4260EDE0-989C-4E16-AF94-F652294D828E}"/>
+          </ac:spMkLst>
+        </pc:spChg>
+        <pc:spChg chg="add del">
+          <ac:chgData name="Antoine Martet" userId="19c2f1c6d7cf0253" providerId="LiveId" clId="{EBB826D3-0641-494B-8483-E075ED1B91CF}" dt="2023-10-30T10:20:53.910" v="49" actId="26606"/>
+          <ac:spMkLst>
+            <pc:docMk/>
+            <pc:sldMk cId="3081763230" sldId="256"/>
+            <ac:spMk id="12" creationId="{1F3985C0-E548-44D2-B30E-F3E42DADE133}"/>
+          </ac:spMkLst>
+        </pc:spChg>
+      </pc:sldChg>
+      <pc:sldChg chg="addSp delSp modSp mod setBg">
+        <pc:chgData name="Antoine Martet" userId="19c2f1c6d7cf0253" providerId="LiveId" clId="{EBB826D3-0641-494B-8483-E075ED1B91CF}" dt="2023-10-30T10:20:52.612" v="48" actId="26606"/>
+        <pc:sldMkLst>
+          <pc:docMk/>
+          <pc:sldMk cId="338176886" sldId="257"/>
+        </pc:sldMkLst>
+        <pc:spChg chg="mod">
+          <ac:chgData name="Antoine Martet" userId="19c2f1c6d7cf0253" providerId="LiveId" clId="{EBB826D3-0641-494B-8483-E075ED1B91CF}" dt="2023-10-30T10:20:52.612" v="48" actId="26606"/>
+          <ac:spMkLst>
+            <pc:docMk/>
+            <pc:sldMk cId="338176886" sldId="257"/>
+            <ac:spMk id="2" creationId="{D8BF5A23-4FB7-8E41-E5CF-79AB526801F4}"/>
+          </ac:spMkLst>
+        </pc:spChg>
+        <pc:spChg chg="mod">
+          <ac:chgData name="Antoine Martet" userId="19c2f1c6d7cf0253" providerId="LiveId" clId="{EBB826D3-0641-494B-8483-E075ED1B91CF}" dt="2023-10-30T10:20:52.612" v="48" actId="26606"/>
+          <ac:spMkLst>
+            <pc:docMk/>
+            <pc:sldMk cId="338176886" sldId="257"/>
+            <ac:spMk id="3" creationId="{44C0C1A7-F7E0-268F-81C8-3B88E367D38B}"/>
+          </ac:spMkLst>
+        </pc:spChg>
+        <pc:spChg chg="add del">
+          <ac:chgData name="Antoine Martet" userId="19c2f1c6d7cf0253" providerId="LiveId" clId="{EBB826D3-0641-494B-8483-E075ED1B91CF}" dt="2023-10-30T10:20:52.612" v="48" actId="26606"/>
+          <ac:spMkLst>
+            <pc:docMk/>
+            <pc:sldMk cId="338176886" sldId="257"/>
+            <ac:spMk id="8" creationId="{3558DB37-9FEE-48A2-8578-ED0401573943}"/>
+          </ac:spMkLst>
+        </pc:spChg>
+        <pc:spChg chg="add del">
+          <ac:chgData name="Antoine Martet" userId="19c2f1c6d7cf0253" providerId="LiveId" clId="{EBB826D3-0641-494B-8483-E075ED1B91CF}" dt="2023-10-30T10:20:52.612" v="48" actId="26606"/>
+          <ac:spMkLst>
+            <pc:docMk/>
+            <pc:sldMk cId="338176886" sldId="257"/>
+            <ac:spMk id="10" creationId="{5F7FCCA6-00E2-4F74-A105-0D769872F243}"/>
+          </ac:spMkLst>
+        </pc:spChg>
+        <pc:spChg chg="add del">
+          <ac:chgData name="Antoine Martet" userId="19c2f1c6d7cf0253" providerId="LiveId" clId="{EBB826D3-0641-494B-8483-E075ED1B91CF}" dt="2023-10-30T10:20:52.612" v="48" actId="26606"/>
+          <ac:spMkLst>
+            <pc:docMk/>
+            <pc:sldMk cId="338176886" sldId="257"/>
+            <ac:spMk id="12" creationId="{5E1ED12F-9F06-4B37-87B7-F98F52937F86}"/>
+          </ac:spMkLst>
+        </pc:spChg>
+      </pc:sldChg>
+      <pc:sldChg chg="addSp delSp modSp new mod setBg">
+        <pc:chgData name="Antoine Martet" userId="19c2f1c6d7cf0253" providerId="LiveId" clId="{EBB826D3-0641-494B-8483-E075ED1B91CF}" dt="2023-10-30T10:23:24.116" v="143" actId="1076"/>
+        <pc:sldMkLst>
+          <pc:docMk/>
+          <pc:sldMk cId="1382432922" sldId="258"/>
+        </pc:sldMkLst>
+        <pc:spChg chg="mod">
+          <ac:chgData name="Antoine Martet" userId="19c2f1c6d7cf0253" providerId="LiveId" clId="{EBB826D3-0641-494B-8483-E075ED1B91CF}" dt="2023-10-30T10:23:19.309" v="142" actId="1076"/>
+          <ac:spMkLst>
+            <pc:docMk/>
+            <pc:sldMk cId="1382432922" sldId="258"/>
+            <ac:spMk id="2" creationId="{F679E89F-DCD0-0408-D256-F2816E79CEE5}"/>
+          </ac:spMkLst>
+        </pc:spChg>
+        <pc:spChg chg="del mod">
+          <ac:chgData name="Antoine Martet" userId="19c2f1c6d7cf0253" providerId="LiveId" clId="{EBB826D3-0641-494B-8483-E075ED1B91CF}" dt="2023-10-30T10:18:31.743" v="27" actId="478"/>
+          <ac:spMkLst>
+            <pc:docMk/>
+            <pc:sldMk cId="1382432922" sldId="258"/>
+            <ac:spMk id="3" creationId="{CD53CD57-B563-8B09-D56A-6C380EDDA372}"/>
+          </ac:spMkLst>
+        </pc:spChg>
+        <pc:spChg chg="add del mod">
+          <ac:chgData name="Antoine Martet" userId="19c2f1c6d7cf0253" providerId="LiveId" clId="{EBB826D3-0641-494B-8483-E075ED1B91CF}" dt="2023-10-30T10:18:32.847" v="28" actId="478"/>
+          <ac:spMkLst>
+            <pc:docMk/>
+            <pc:sldMk cId="1382432922" sldId="258"/>
+            <ac:spMk id="5" creationId="{B3531927-3610-453F-13B6-601BFB77A9D6}"/>
+          </ac:spMkLst>
+        </pc:spChg>
+        <pc:spChg chg="add mod">
+          <ac:chgData name="Antoine Martet" userId="19c2f1c6d7cf0253" providerId="LiveId" clId="{EBB826D3-0641-494B-8483-E075ED1B91CF}" dt="2023-10-30T10:23:24.116" v="143" actId="1076"/>
+          <ac:spMkLst>
+            <pc:docMk/>
+            <pc:sldMk cId="1382432922" sldId="258"/>
+            <ac:spMk id="14" creationId="{FC71DD7B-B298-F467-A496-C02B0432F8F3}"/>
+          </ac:spMkLst>
+        </pc:spChg>
+        <pc:spChg chg="add mod">
+          <ac:chgData name="Antoine Martet" userId="19c2f1c6d7cf0253" providerId="LiveId" clId="{EBB826D3-0641-494B-8483-E075ED1B91CF}" dt="2023-10-30T10:23:14.023" v="140" actId="1076"/>
+          <ac:spMkLst>
+            <pc:docMk/>
+            <pc:sldMk cId="1382432922" sldId="258"/>
+            <ac:spMk id="15" creationId="{DF27B205-B659-728C-75A7-39008907B7B3}"/>
+          </ac:spMkLst>
+        </pc:spChg>
+        <pc:spChg chg="add del">
+          <ac:chgData name="Antoine Martet" userId="19c2f1c6d7cf0253" providerId="LiveId" clId="{EBB826D3-0641-494B-8483-E075ED1B91CF}" dt="2023-10-30T10:20:20.017" v="42" actId="26606"/>
+          <ac:spMkLst>
+            <pc:docMk/>
+            <pc:sldMk cId="1382432922" sldId="258"/>
+            <ac:spMk id="16" creationId="{BB2B8762-61F0-4F1B-9364-D633EE9D6AF5}"/>
+          </ac:spMkLst>
+        </pc:spChg>
+        <pc:spChg chg="add del">
+          <ac:chgData name="Antoine Martet" userId="19c2f1c6d7cf0253" providerId="LiveId" clId="{EBB826D3-0641-494B-8483-E075ED1B91CF}" dt="2023-10-30T10:20:20.017" v="42" actId="26606"/>
+          <ac:spMkLst>
+            <pc:docMk/>
+            <pc:sldMk cId="1382432922" sldId="258"/>
+            <ac:spMk id="18" creationId="{E97675C8-1328-460C-9EBF-6B446B67EAD3}"/>
+          </ac:spMkLst>
+        </pc:spChg>
+        <pc:spChg chg="add del">
+          <ac:chgData name="Antoine Martet" userId="19c2f1c6d7cf0253" providerId="LiveId" clId="{EBB826D3-0641-494B-8483-E075ED1B91CF}" dt="2023-10-30T10:20:20.017" v="42" actId="26606"/>
+          <ac:spMkLst>
+            <pc:docMk/>
+            <pc:sldMk cId="1382432922" sldId="258"/>
+            <ac:spMk id="22" creationId="{C6417104-D4C1-4710-9982-2154A7F48492}"/>
+          </ac:spMkLst>
+        </pc:spChg>
+        <pc:spChg chg="add del">
+          <ac:chgData name="Antoine Martet" userId="19c2f1c6d7cf0253" providerId="LiveId" clId="{EBB826D3-0641-494B-8483-E075ED1B91CF}" dt="2023-10-30T10:20:20.017" v="42" actId="26606"/>
+          <ac:spMkLst>
+            <pc:docMk/>
+            <pc:sldMk cId="1382432922" sldId="258"/>
+            <ac:spMk id="24" creationId="{626F1402-2DEC-4071-84AF-350C7BF00D43}"/>
+          </ac:spMkLst>
+        </pc:spChg>
+        <pc:spChg chg="add del">
+          <ac:chgData name="Antoine Martet" userId="19c2f1c6d7cf0253" providerId="LiveId" clId="{EBB826D3-0641-494B-8483-E075ED1B91CF}" dt="2023-10-30T10:20:20.017" v="42" actId="26606"/>
+          <ac:spMkLst>
+            <pc:docMk/>
+            <pc:sldMk cId="1382432922" sldId="258"/>
+            <ac:spMk id="28" creationId="{DA52A394-10F4-4AA5-90E4-634D1E919DBA}"/>
+          </ac:spMkLst>
+        </pc:spChg>
+        <pc:spChg chg="add del">
+          <ac:chgData name="Antoine Martet" userId="19c2f1c6d7cf0253" providerId="LiveId" clId="{EBB826D3-0641-494B-8483-E075ED1B91CF}" dt="2023-10-30T10:20:20.017" v="42" actId="26606"/>
+          <ac:spMkLst>
+            <pc:docMk/>
+            <pc:sldMk cId="1382432922" sldId="258"/>
+            <ac:spMk id="30" creationId="{07BDDC51-8BB2-42BE-8EA8-39B3E9AC1EF6}"/>
+          </ac:spMkLst>
+        </pc:spChg>
+        <pc:spChg chg="add del">
+          <ac:chgData name="Antoine Martet" userId="19c2f1c6d7cf0253" providerId="LiveId" clId="{EBB826D3-0641-494B-8483-E075ED1B91CF}" dt="2023-10-30T10:20:22.820" v="44" actId="26606"/>
+          <ac:spMkLst>
+            <pc:docMk/>
+            <pc:sldMk cId="1382432922" sldId="258"/>
+            <ac:spMk id="32" creationId="{BB2B8762-61F0-4F1B-9364-D633EE9D6AF5}"/>
+          </ac:spMkLst>
+        </pc:spChg>
+        <pc:spChg chg="add del">
+          <ac:chgData name="Antoine Martet" userId="19c2f1c6d7cf0253" providerId="LiveId" clId="{EBB826D3-0641-494B-8483-E075ED1B91CF}" dt="2023-10-30T10:20:22.820" v="44" actId="26606"/>
+          <ac:spMkLst>
+            <pc:docMk/>
+            <pc:sldMk cId="1382432922" sldId="258"/>
+            <ac:spMk id="33" creationId="{E97675C8-1328-460C-9EBF-6B446B67EAD3}"/>
+          </ac:spMkLst>
+        </pc:spChg>
+        <pc:spChg chg="add del">
+          <ac:chgData name="Antoine Martet" userId="19c2f1c6d7cf0253" providerId="LiveId" clId="{EBB826D3-0641-494B-8483-E075ED1B91CF}" dt="2023-10-30T10:20:22.820" v="44" actId="26606"/>
+          <ac:spMkLst>
+            <pc:docMk/>
+            <pc:sldMk cId="1382432922" sldId="258"/>
+            <ac:spMk id="35" creationId="{01C6F51C-53CC-4D4B-98DA-C143852FCF7F}"/>
+          </ac:spMkLst>
+        </pc:spChg>
+        <pc:spChg chg="add del">
+          <ac:chgData name="Antoine Martet" userId="19c2f1c6d7cf0253" providerId="LiveId" clId="{EBB826D3-0641-494B-8483-E075ED1B91CF}" dt="2023-10-30T10:20:22.820" v="44" actId="26606"/>
+          <ac:spMkLst>
+            <pc:docMk/>
+            <pc:sldMk cId="1382432922" sldId="258"/>
+            <ac:spMk id="37" creationId="{1702822D-7587-488C-BCDE-6366C82D9F42}"/>
+          </ac:spMkLst>
+        </pc:spChg>
+        <pc:spChg chg="add del">
+          <ac:chgData name="Antoine Martet" userId="19c2f1c6d7cf0253" providerId="LiveId" clId="{EBB826D3-0641-494B-8483-E075ED1B91CF}" dt="2023-10-30T10:20:22.820" v="44" actId="26606"/>
+          <ac:spMkLst>
+            <pc:docMk/>
+            <pc:sldMk cId="1382432922" sldId="258"/>
+            <ac:spMk id="38" creationId="{2336503F-9C9C-424B-B606-FD55CB6EC94A}"/>
+          </ac:spMkLst>
+        </pc:spChg>
+        <pc:spChg chg="add del">
+          <ac:chgData name="Antoine Martet" userId="19c2f1c6d7cf0253" providerId="LiveId" clId="{EBB826D3-0641-494B-8483-E075ED1B91CF}" dt="2023-10-30T10:20:55.489" v="50" actId="26606"/>
+          <ac:spMkLst>
+            <pc:docMk/>
+            <pc:sldMk cId="1382432922" sldId="258"/>
+            <ac:spMk id="40" creationId="{BB2B8762-61F0-4F1B-9364-D633EE9D6AF5}"/>
+          </ac:spMkLst>
+        </pc:spChg>
+        <pc:spChg chg="add del">
+          <ac:chgData name="Antoine Martet" userId="19c2f1c6d7cf0253" providerId="LiveId" clId="{EBB826D3-0641-494B-8483-E075ED1B91CF}" dt="2023-10-30T10:20:55.489" v="50" actId="26606"/>
+          <ac:spMkLst>
+            <pc:docMk/>
+            <pc:sldMk cId="1382432922" sldId="258"/>
+            <ac:spMk id="41" creationId="{E97675C8-1328-460C-9EBF-6B446B67EAD3}"/>
+          </ac:spMkLst>
+        </pc:spChg>
+        <pc:spChg chg="add del">
+          <ac:chgData name="Antoine Martet" userId="19c2f1c6d7cf0253" providerId="LiveId" clId="{EBB826D3-0641-494B-8483-E075ED1B91CF}" dt="2023-10-30T10:20:55.489" v="50" actId="26606"/>
+          <ac:spMkLst>
+            <pc:docMk/>
+            <pc:sldMk cId="1382432922" sldId="258"/>
+            <ac:spMk id="43" creationId="{2AD83CFE-1CA3-4832-A4B9-C48CD1347C03}"/>
+          </ac:spMkLst>
+        </pc:spChg>
+        <pc:spChg chg="add del">
+          <ac:chgData name="Antoine Martet" userId="19c2f1c6d7cf0253" providerId="LiveId" clId="{EBB826D3-0641-494B-8483-E075ED1B91CF}" dt="2023-10-30T10:20:55.489" v="50" actId="26606"/>
+          <ac:spMkLst>
+            <pc:docMk/>
+            <pc:sldMk cId="1382432922" sldId="258"/>
+            <ac:spMk id="44" creationId="{BC98641C-7F74-435D-996F-A4387A3C3C26}"/>
+          </ac:spMkLst>
+        </pc:spChg>
+        <pc:spChg chg="add del">
+          <ac:chgData name="Antoine Martet" userId="19c2f1c6d7cf0253" providerId="LiveId" clId="{EBB826D3-0641-494B-8483-E075ED1B91CF}" dt="2023-10-30T10:20:55.489" v="50" actId="26606"/>
+          <ac:spMkLst>
+            <pc:docMk/>
+            <pc:sldMk cId="1382432922" sldId="258"/>
+            <ac:spMk id="45" creationId="{F530C0F6-C8DF-4539-B30C-8105DB618C20}"/>
+          </ac:spMkLst>
+        </pc:spChg>
+        <pc:spChg chg="add del">
+          <ac:chgData name="Antoine Martet" userId="19c2f1c6d7cf0253" providerId="LiveId" clId="{EBB826D3-0641-494B-8483-E075ED1B91CF}" dt="2023-10-30T10:20:55.489" v="50" actId="26606"/>
+          <ac:spMkLst>
+            <pc:docMk/>
+            <pc:sldMk cId="1382432922" sldId="258"/>
+            <ac:spMk id="46" creationId="{BAE51241-AA8B-4B82-9C59-6738DB85674C}"/>
+          </ac:spMkLst>
+        </pc:spChg>
+        <pc:picChg chg="add mod ord">
+          <ac:chgData name="Antoine Martet" userId="19c2f1c6d7cf0253" providerId="LiveId" clId="{EBB826D3-0641-494B-8483-E075ED1B91CF}" dt="2023-10-30T10:23:24.116" v="143" actId="1076"/>
+          <ac:picMkLst>
+            <pc:docMk/>
+            <pc:sldMk cId="1382432922" sldId="258"/>
+            <ac:picMk id="7" creationId="{5D32B576-7A1A-3166-9944-9E4CF88EF761}"/>
+          </ac:picMkLst>
+        </pc:picChg>
+        <pc:picChg chg="add del mod">
+          <ac:chgData name="Antoine Martet" userId="19c2f1c6d7cf0253" providerId="LiveId" clId="{EBB826D3-0641-494B-8483-E075ED1B91CF}" dt="2023-10-30T10:20:57.715" v="53"/>
+          <ac:picMkLst>
+            <pc:docMk/>
+            <pc:sldMk cId="1382432922" sldId="258"/>
+            <ac:picMk id="9" creationId="{82373322-B8F8-EC58-1320-383787C98F31}"/>
+          </ac:picMkLst>
+        </pc:picChg>
+        <pc:picChg chg="add del mod">
+          <ac:chgData name="Antoine Martet" userId="19c2f1c6d7cf0253" providerId="LiveId" clId="{EBB826D3-0641-494B-8483-E075ED1B91CF}" dt="2023-10-30T10:20:56.621" v="51"/>
+          <ac:picMkLst>
+            <pc:docMk/>
+            <pc:sldMk cId="1382432922" sldId="258"/>
+            <ac:picMk id="11" creationId="{5F7B8FE6-9B13-F23C-9634-B1F9922F9D4F}"/>
+          </ac:picMkLst>
+        </pc:picChg>
+        <pc:picChg chg="add mod">
+          <ac:chgData name="Antoine Martet" userId="19c2f1c6d7cf0253" providerId="LiveId" clId="{EBB826D3-0641-494B-8483-E075ED1B91CF}" dt="2023-10-30T10:23:14.023" v="140" actId="1076"/>
+          <ac:picMkLst>
+            <pc:docMk/>
+            <pc:sldMk cId="1382432922" sldId="258"/>
+            <ac:picMk id="13" creationId="{7E857DAE-36D2-C641-6ABB-A7464986AC6F}"/>
+          </ac:picMkLst>
+        </pc:picChg>
+        <pc:cxnChg chg="add del">
+          <ac:chgData name="Antoine Martet" userId="19c2f1c6d7cf0253" providerId="LiveId" clId="{EBB826D3-0641-494B-8483-E075ED1B91CF}" dt="2023-10-30T10:20:20.017" v="42" actId="26606"/>
+          <ac:cxnSpMkLst>
+            <pc:docMk/>
+            <pc:sldMk cId="1382432922" sldId="258"/>
+            <ac:cxnSpMk id="20" creationId="{514EE78B-AF71-4195-A01B-F1165D9233BF}"/>
+          </ac:cxnSpMkLst>
+        </pc:cxnChg>
+        <pc:cxnChg chg="add del">
+          <ac:chgData name="Antoine Martet" userId="19c2f1c6d7cf0253" providerId="LiveId" clId="{EBB826D3-0641-494B-8483-E075ED1B91CF}" dt="2023-10-30T10:20:20.017" v="42" actId="26606"/>
+          <ac:cxnSpMkLst>
+            <pc:docMk/>
+            <pc:sldMk cId="1382432922" sldId="258"/>
+            <ac:cxnSpMk id="26" creationId="{04733B62-1719-4677-A612-CA0AC0AD7482}"/>
+          </ac:cxnSpMkLst>
+        </pc:cxnChg>
+        <pc:cxnChg chg="add del">
+          <ac:chgData name="Antoine Martet" userId="19c2f1c6d7cf0253" providerId="LiveId" clId="{EBB826D3-0641-494B-8483-E075ED1B91CF}" dt="2023-10-30T10:20:22.820" v="44" actId="26606"/>
+          <ac:cxnSpMkLst>
+            <pc:docMk/>
+            <pc:sldMk cId="1382432922" sldId="258"/>
+            <ac:cxnSpMk id="34" creationId="{514EE78B-AF71-4195-A01B-F1165D9233BF}"/>
+          </ac:cxnSpMkLst>
+        </pc:cxnChg>
+        <pc:cxnChg chg="add del">
+          <ac:chgData name="Antoine Martet" userId="19c2f1c6d7cf0253" providerId="LiveId" clId="{EBB826D3-0641-494B-8483-E075ED1B91CF}" dt="2023-10-30T10:20:22.820" v="44" actId="26606"/>
+          <ac:cxnSpMkLst>
+            <pc:docMk/>
+            <pc:sldMk cId="1382432922" sldId="258"/>
+            <ac:cxnSpMk id="36" creationId="{613AFA59-28DC-4A81-8ADB-6EE5C6322202}"/>
+          </ac:cxnSpMkLst>
+        </pc:cxnChg>
+        <pc:cxnChg chg="add del">
+          <ac:chgData name="Antoine Martet" userId="19c2f1c6d7cf0253" providerId="LiveId" clId="{EBB826D3-0641-494B-8483-E075ED1B91CF}" dt="2023-10-30T10:20:55.489" v="50" actId="26606"/>
+          <ac:cxnSpMkLst>
+            <pc:docMk/>
+            <pc:sldMk cId="1382432922" sldId="258"/>
+            <ac:cxnSpMk id="42" creationId="{514EE78B-AF71-4195-A01B-F1165D9233BF}"/>
+          </ac:cxnSpMkLst>
+        </pc:cxnChg>
+      </pc:sldChg>
+      <pc:sldChg chg="modSp new mod">
+        <pc:chgData name="Antoine Martet" userId="19c2f1c6d7cf0253" providerId="LiveId" clId="{EBB826D3-0641-494B-8483-E075ED1B91CF}" dt="2023-10-30T10:32:35.632" v="334" actId="20577"/>
+        <pc:sldMkLst>
+          <pc:docMk/>
+          <pc:sldMk cId="2686455783" sldId="259"/>
+        </pc:sldMkLst>
+        <pc:spChg chg="mod">
+          <ac:chgData name="Antoine Martet" userId="19c2f1c6d7cf0253" providerId="LiveId" clId="{EBB826D3-0641-494B-8483-E075ED1B91CF}" dt="2023-10-30T10:28:43.896" v="287" actId="20577"/>
+          <ac:spMkLst>
+            <pc:docMk/>
+            <pc:sldMk cId="2686455783" sldId="259"/>
+            <ac:spMk id="2" creationId="{501402DB-434B-36F6-3525-B16732A9FDD7}"/>
+          </ac:spMkLst>
+        </pc:spChg>
+        <pc:spChg chg="mod">
+          <ac:chgData name="Antoine Martet" userId="19c2f1c6d7cf0253" providerId="LiveId" clId="{EBB826D3-0641-494B-8483-E075ED1B91CF}" dt="2023-10-30T10:32:35.632" v="334" actId="20577"/>
+          <ac:spMkLst>
+            <pc:docMk/>
+            <pc:sldMk cId="2686455783" sldId="259"/>
+            <ac:spMk id="3" creationId="{E3709B17-FCD1-61A0-4127-BC0C704FF9B6}"/>
+          </ac:spMkLst>
+        </pc:spChg>
+      </pc:sldChg>
+      <pc:sldChg chg="modSp new mod">
+        <pc:chgData name="Antoine Martet" userId="19c2f1c6d7cf0253" providerId="LiveId" clId="{EBB826D3-0641-494B-8483-E075ED1B91CF}" dt="2023-10-30T10:35:12.500" v="342" actId="20577"/>
+        <pc:sldMkLst>
+          <pc:docMk/>
+          <pc:sldMk cId="4064782123" sldId="260"/>
+        </pc:sldMkLst>
+        <pc:spChg chg="mod">
+          <ac:chgData name="Antoine Martet" userId="19c2f1c6d7cf0253" providerId="LiveId" clId="{EBB826D3-0641-494B-8483-E075ED1B91CF}" dt="2023-10-30T10:28:34.206" v="285" actId="20577"/>
+          <ac:spMkLst>
+            <pc:docMk/>
+            <pc:sldMk cId="4064782123" sldId="260"/>
+            <ac:spMk id="2" creationId="{C126A169-59F4-C0DA-0AFF-7301274F7402}"/>
+          </ac:spMkLst>
+        </pc:spChg>
+        <pc:spChg chg="mod">
+          <ac:chgData name="Antoine Martet" userId="19c2f1c6d7cf0253" providerId="LiveId" clId="{EBB826D3-0641-494B-8483-E075ED1B91CF}" dt="2023-10-30T10:35:12.500" v="342" actId="20577"/>
+          <ac:spMkLst>
+            <pc:docMk/>
+            <pc:sldMk cId="4064782123" sldId="260"/>
+            <ac:spMk id="3" creationId="{8B603177-5EC7-5827-7FEC-9184743BEE3F}"/>
+          </ac:spMkLst>
+        </pc:spChg>
+      </pc:sldChg>
+      <pc:sldChg chg="addSp delSp modSp new mod">
+        <pc:chgData name="Antoine Martet" userId="19c2f1c6d7cf0253" providerId="LiveId" clId="{EBB826D3-0641-494B-8483-E075ED1B91CF}" dt="2023-10-30T10:44:02.289" v="461" actId="20577"/>
+        <pc:sldMkLst>
+          <pc:docMk/>
+          <pc:sldMk cId="3791526076" sldId="261"/>
+        </pc:sldMkLst>
+        <pc:spChg chg="mod">
+          <ac:chgData name="Antoine Martet" userId="19c2f1c6d7cf0253" providerId="LiveId" clId="{EBB826D3-0641-494B-8483-E075ED1B91CF}" dt="2023-10-30T10:36:20.332" v="364" actId="20577"/>
+          <ac:spMkLst>
+            <pc:docMk/>
+            <pc:sldMk cId="3791526076" sldId="261"/>
+            <ac:spMk id="2" creationId="{04AFF39B-F66A-9398-2B7A-52467BAF934C}"/>
+          </ac:spMkLst>
+        </pc:spChg>
+        <pc:spChg chg="del">
+          <ac:chgData name="Antoine Martet" userId="19c2f1c6d7cf0253" providerId="LiveId" clId="{EBB826D3-0641-494B-8483-E075ED1B91CF}" dt="2023-10-30T10:38:00.480" v="365"/>
+          <ac:spMkLst>
+            <pc:docMk/>
+            <pc:sldMk cId="3791526076" sldId="261"/>
+            <ac:spMk id="3" creationId="{5BDEACBE-F4B9-09AB-E168-982E9E5C1E16}"/>
+          </ac:spMkLst>
+        </pc:spChg>
+        <pc:spChg chg="add mod">
+          <ac:chgData name="Antoine Martet" userId="19c2f1c6d7cf0253" providerId="LiveId" clId="{EBB826D3-0641-494B-8483-E075ED1B91CF}" dt="2023-10-30T10:44:02.289" v="461" actId="20577"/>
+          <ac:spMkLst>
+            <pc:docMk/>
+            <pc:sldMk cId="3791526076" sldId="261"/>
+            <ac:spMk id="5" creationId="{91888E6F-9C0C-B098-A4F5-28ADE9C34F2A}"/>
+          </ac:spMkLst>
+        </pc:spChg>
+        <pc:picChg chg="add mod">
+          <ac:chgData name="Antoine Martet" userId="19c2f1c6d7cf0253" providerId="LiveId" clId="{EBB826D3-0641-494B-8483-E075ED1B91CF}" dt="2023-10-30T10:39:53.595" v="367" actId="14100"/>
+          <ac:picMkLst>
+            <pc:docMk/>
+            <pc:sldMk cId="3791526076" sldId="261"/>
+            <ac:picMk id="4" creationId="{C3F1E64F-9373-BC4C-7DE8-22CC7B3AFDE9}"/>
+          </ac:picMkLst>
+        </pc:picChg>
+      </pc:sldChg>
+      <pc:sldChg chg="modSp new mod">
+        <pc:chgData name="Antoine Martet" userId="19c2f1c6d7cf0253" providerId="LiveId" clId="{EBB826D3-0641-494B-8483-E075ED1B91CF}" dt="2023-10-30T20:21:39.986" v="851" actId="20577"/>
+        <pc:sldMkLst>
+          <pc:docMk/>
+          <pc:sldMk cId="2081047817" sldId="262"/>
+        </pc:sldMkLst>
+        <pc:spChg chg="mod">
+          <ac:chgData name="Antoine Martet" userId="19c2f1c6d7cf0253" providerId="LiveId" clId="{EBB826D3-0641-494B-8483-E075ED1B91CF}" dt="2023-10-30T20:10:32.505" v="642" actId="20577"/>
+          <ac:spMkLst>
+            <pc:docMk/>
+            <pc:sldMk cId="2081047817" sldId="262"/>
+            <ac:spMk id="2" creationId="{0302F4C2-08FF-BC0E-F560-394FEE8F05D5}"/>
+          </ac:spMkLst>
+        </pc:spChg>
+        <pc:spChg chg="mod">
+          <ac:chgData name="Antoine Martet" userId="19c2f1c6d7cf0253" providerId="LiveId" clId="{EBB826D3-0641-494B-8483-E075ED1B91CF}" dt="2023-10-30T20:21:39.986" v="851" actId="20577"/>
+          <ac:spMkLst>
+            <pc:docMk/>
+            <pc:sldMk cId="2081047817" sldId="262"/>
+            <ac:spMk id="3" creationId="{E185C213-9BF4-70D2-90C5-9151DE56EB98}"/>
+          </ac:spMkLst>
+        </pc:spChg>
+      </pc:sldChg>
+    </pc:docChg>
+  </pc:docChgLst>
+  <pc:docChgLst>
     <pc:chgData name="Antoine Martet" userId="19c2f1c6d7cf0253" providerId="LiveId" clId="{56B12A74-7565-4FAE-90F3-D47DADDF4237}"/>
     <pc:docChg chg="undo redo custSel addSld delSld modSld">
       <pc:chgData name="Antoine Martet" userId="19c2f1c6d7cf0253" providerId="LiveId" clId="{56B12A74-7565-4FAE-90F3-D47DADDF4237}" dt="2024-01-13T21:29:46.517" v="1973" actId="20577"/>
@@ -1257,473 +1726,200 @@
       </pc:sldChg>
     </pc:docChg>
   </pc:docChgLst>
-  <pc:docChgLst>
-    <pc:chgData name="Antoine Martet" userId="19c2f1c6d7cf0253" providerId="LiveId" clId="{EBB826D3-0641-494B-8483-E075ED1B91CF}"/>
-    <pc:docChg chg="undo redo custSel addSld modSld">
-      <pc:chgData name="Antoine Martet" userId="19c2f1c6d7cf0253" providerId="LiveId" clId="{EBB826D3-0641-494B-8483-E075ED1B91CF}" dt="2023-10-30T20:21:39.986" v="851" actId="20577"/>
-      <pc:docMkLst>
-        <pc:docMk/>
-      </pc:docMkLst>
-      <pc:sldChg chg="addSp delSp modSp mod setBg">
-        <pc:chgData name="Antoine Martet" userId="19c2f1c6d7cf0253" providerId="LiveId" clId="{EBB826D3-0641-494B-8483-E075ED1B91CF}" dt="2023-10-30T10:20:53.910" v="49" actId="26606"/>
-        <pc:sldMkLst>
-          <pc:docMk/>
-          <pc:sldMk cId="3081763230" sldId="256"/>
-        </pc:sldMkLst>
-        <pc:spChg chg="mod">
-          <ac:chgData name="Antoine Martet" userId="19c2f1c6d7cf0253" providerId="LiveId" clId="{EBB826D3-0641-494B-8483-E075ED1B91CF}" dt="2023-10-30T10:20:53.910" v="49" actId="26606"/>
-          <ac:spMkLst>
-            <pc:docMk/>
-            <pc:sldMk cId="3081763230" sldId="256"/>
-            <ac:spMk id="2" creationId="{BD26FBBD-2494-72F0-CBFE-3960FC309E81}"/>
-          </ac:spMkLst>
-        </pc:spChg>
-        <pc:spChg chg="mod">
-          <ac:chgData name="Antoine Martet" userId="19c2f1c6d7cf0253" providerId="LiveId" clId="{EBB826D3-0641-494B-8483-E075ED1B91CF}" dt="2023-10-30T10:20:53.910" v="49" actId="26606"/>
-          <ac:spMkLst>
-            <pc:docMk/>
-            <pc:sldMk cId="3081763230" sldId="256"/>
-            <ac:spMk id="3" creationId="{5F92FCC9-3708-C611-9C2D-D843066841B0}"/>
-          </ac:spMkLst>
-        </pc:spChg>
-        <pc:spChg chg="add del">
-          <ac:chgData name="Antoine Martet" userId="19c2f1c6d7cf0253" providerId="LiveId" clId="{EBB826D3-0641-494B-8483-E075ED1B91CF}" dt="2023-10-30T10:20:53.910" v="49" actId="26606"/>
-          <ac:spMkLst>
-            <pc:docMk/>
-            <pc:sldMk cId="3081763230" sldId="256"/>
-            <ac:spMk id="8" creationId="{FBDCECDC-EEE3-4128-AA5E-82A8C08796E8}"/>
-          </ac:spMkLst>
-        </pc:spChg>
-        <pc:spChg chg="add del">
-          <ac:chgData name="Antoine Martet" userId="19c2f1c6d7cf0253" providerId="LiveId" clId="{EBB826D3-0641-494B-8483-E075ED1B91CF}" dt="2023-10-30T10:20:53.910" v="49" actId="26606"/>
-          <ac:spMkLst>
-            <pc:docMk/>
-            <pc:sldMk cId="3081763230" sldId="256"/>
-            <ac:spMk id="10" creationId="{4260EDE0-989C-4E16-AF94-F652294D828E}"/>
-          </ac:spMkLst>
-        </pc:spChg>
-        <pc:spChg chg="add del">
-          <ac:chgData name="Antoine Martet" userId="19c2f1c6d7cf0253" providerId="LiveId" clId="{EBB826D3-0641-494B-8483-E075ED1B91CF}" dt="2023-10-30T10:20:53.910" v="49" actId="26606"/>
-          <ac:spMkLst>
-            <pc:docMk/>
-            <pc:sldMk cId="3081763230" sldId="256"/>
-            <ac:spMk id="12" creationId="{1F3985C0-E548-44D2-B30E-F3E42DADE133}"/>
-          </ac:spMkLst>
-        </pc:spChg>
-      </pc:sldChg>
-      <pc:sldChg chg="addSp delSp modSp mod setBg">
-        <pc:chgData name="Antoine Martet" userId="19c2f1c6d7cf0253" providerId="LiveId" clId="{EBB826D3-0641-494B-8483-E075ED1B91CF}" dt="2023-10-30T10:20:52.612" v="48" actId="26606"/>
-        <pc:sldMkLst>
-          <pc:docMk/>
-          <pc:sldMk cId="338176886" sldId="257"/>
-        </pc:sldMkLst>
-        <pc:spChg chg="mod">
-          <ac:chgData name="Antoine Martet" userId="19c2f1c6d7cf0253" providerId="LiveId" clId="{EBB826D3-0641-494B-8483-E075ED1B91CF}" dt="2023-10-30T10:20:52.612" v="48" actId="26606"/>
-          <ac:spMkLst>
-            <pc:docMk/>
-            <pc:sldMk cId="338176886" sldId="257"/>
-            <ac:spMk id="2" creationId="{D8BF5A23-4FB7-8E41-E5CF-79AB526801F4}"/>
-          </ac:spMkLst>
-        </pc:spChg>
-        <pc:spChg chg="mod">
-          <ac:chgData name="Antoine Martet" userId="19c2f1c6d7cf0253" providerId="LiveId" clId="{EBB826D3-0641-494B-8483-E075ED1B91CF}" dt="2023-10-30T10:20:52.612" v="48" actId="26606"/>
-          <ac:spMkLst>
-            <pc:docMk/>
-            <pc:sldMk cId="338176886" sldId="257"/>
-            <ac:spMk id="3" creationId="{44C0C1A7-F7E0-268F-81C8-3B88E367D38B}"/>
-          </ac:spMkLst>
-        </pc:spChg>
-        <pc:spChg chg="add del">
-          <ac:chgData name="Antoine Martet" userId="19c2f1c6d7cf0253" providerId="LiveId" clId="{EBB826D3-0641-494B-8483-E075ED1B91CF}" dt="2023-10-30T10:20:52.612" v="48" actId="26606"/>
-          <ac:spMkLst>
-            <pc:docMk/>
-            <pc:sldMk cId="338176886" sldId="257"/>
-            <ac:spMk id="8" creationId="{3558DB37-9FEE-48A2-8578-ED0401573943}"/>
-          </ac:spMkLst>
-        </pc:spChg>
-        <pc:spChg chg="add del">
-          <ac:chgData name="Antoine Martet" userId="19c2f1c6d7cf0253" providerId="LiveId" clId="{EBB826D3-0641-494B-8483-E075ED1B91CF}" dt="2023-10-30T10:20:52.612" v="48" actId="26606"/>
-          <ac:spMkLst>
-            <pc:docMk/>
-            <pc:sldMk cId="338176886" sldId="257"/>
-            <ac:spMk id="10" creationId="{5F7FCCA6-00E2-4F74-A105-0D769872F243}"/>
-          </ac:spMkLst>
-        </pc:spChg>
-        <pc:spChg chg="add del">
-          <ac:chgData name="Antoine Martet" userId="19c2f1c6d7cf0253" providerId="LiveId" clId="{EBB826D3-0641-494B-8483-E075ED1B91CF}" dt="2023-10-30T10:20:52.612" v="48" actId="26606"/>
-          <ac:spMkLst>
-            <pc:docMk/>
-            <pc:sldMk cId="338176886" sldId="257"/>
-            <ac:spMk id="12" creationId="{5E1ED12F-9F06-4B37-87B7-F98F52937F86}"/>
-          </ac:spMkLst>
-        </pc:spChg>
-      </pc:sldChg>
-      <pc:sldChg chg="addSp delSp modSp new mod setBg">
-        <pc:chgData name="Antoine Martet" userId="19c2f1c6d7cf0253" providerId="LiveId" clId="{EBB826D3-0641-494B-8483-E075ED1B91CF}" dt="2023-10-30T10:23:24.116" v="143" actId="1076"/>
-        <pc:sldMkLst>
-          <pc:docMk/>
-          <pc:sldMk cId="1382432922" sldId="258"/>
-        </pc:sldMkLst>
-        <pc:spChg chg="mod">
-          <ac:chgData name="Antoine Martet" userId="19c2f1c6d7cf0253" providerId="LiveId" clId="{EBB826D3-0641-494B-8483-E075ED1B91CF}" dt="2023-10-30T10:23:19.309" v="142" actId="1076"/>
-          <ac:spMkLst>
-            <pc:docMk/>
-            <pc:sldMk cId="1382432922" sldId="258"/>
-            <ac:spMk id="2" creationId="{F679E89F-DCD0-0408-D256-F2816E79CEE5}"/>
-          </ac:spMkLst>
-        </pc:spChg>
-        <pc:spChg chg="del mod">
-          <ac:chgData name="Antoine Martet" userId="19c2f1c6d7cf0253" providerId="LiveId" clId="{EBB826D3-0641-494B-8483-E075ED1B91CF}" dt="2023-10-30T10:18:31.743" v="27" actId="478"/>
-          <ac:spMkLst>
-            <pc:docMk/>
-            <pc:sldMk cId="1382432922" sldId="258"/>
-            <ac:spMk id="3" creationId="{CD53CD57-B563-8B09-D56A-6C380EDDA372}"/>
-          </ac:spMkLst>
-        </pc:spChg>
-        <pc:spChg chg="add del mod">
-          <ac:chgData name="Antoine Martet" userId="19c2f1c6d7cf0253" providerId="LiveId" clId="{EBB826D3-0641-494B-8483-E075ED1B91CF}" dt="2023-10-30T10:18:32.847" v="28" actId="478"/>
-          <ac:spMkLst>
-            <pc:docMk/>
-            <pc:sldMk cId="1382432922" sldId="258"/>
-            <ac:spMk id="5" creationId="{B3531927-3610-453F-13B6-601BFB77A9D6}"/>
-          </ac:spMkLst>
-        </pc:spChg>
-        <pc:spChg chg="add mod">
-          <ac:chgData name="Antoine Martet" userId="19c2f1c6d7cf0253" providerId="LiveId" clId="{EBB826D3-0641-494B-8483-E075ED1B91CF}" dt="2023-10-30T10:23:24.116" v="143" actId="1076"/>
-          <ac:spMkLst>
-            <pc:docMk/>
-            <pc:sldMk cId="1382432922" sldId="258"/>
-            <ac:spMk id="14" creationId="{FC71DD7B-B298-F467-A496-C02B0432F8F3}"/>
-          </ac:spMkLst>
-        </pc:spChg>
-        <pc:spChg chg="add mod">
-          <ac:chgData name="Antoine Martet" userId="19c2f1c6d7cf0253" providerId="LiveId" clId="{EBB826D3-0641-494B-8483-E075ED1B91CF}" dt="2023-10-30T10:23:14.023" v="140" actId="1076"/>
-          <ac:spMkLst>
-            <pc:docMk/>
-            <pc:sldMk cId="1382432922" sldId="258"/>
-            <ac:spMk id="15" creationId="{DF27B205-B659-728C-75A7-39008907B7B3}"/>
-          </ac:spMkLst>
-        </pc:spChg>
-        <pc:spChg chg="add del">
-          <ac:chgData name="Antoine Martet" userId="19c2f1c6d7cf0253" providerId="LiveId" clId="{EBB826D3-0641-494B-8483-E075ED1B91CF}" dt="2023-10-30T10:20:20.017" v="42" actId="26606"/>
-          <ac:spMkLst>
-            <pc:docMk/>
-            <pc:sldMk cId="1382432922" sldId="258"/>
-            <ac:spMk id="16" creationId="{BB2B8762-61F0-4F1B-9364-D633EE9D6AF5}"/>
-          </ac:spMkLst>
-        </pc:spChg>
-        <pc:spChg chg="add del">
-          <ac:chgData name="Antoine Martet" userId="19c2f1c6d7cf0253" providerId="LiveId" clId="{EBB826D3-0641-494B-8483-E075ED1B91CF}" dt="2023-10-30T10:20:20.017" v="42" actId="26606"/>
-          <ac:spMkLst>
-            <pc:docMk/>
-            <pc:sldMk cId="1382432922" sldId="258"/>
-            <ac:spMk id="18" creationId="{E97675C8-1328-460C-9EBF-6B446B67EAD3}"/>
-          </ac:spMkLst>
-        </pc:spChg>
-        <pc:spChg chg="add del">
-          <ac:chgData name="Antoine Martet" userId="19c2f1c6d7cf0253" providerId="LiveId" clId="{EBB826D3-0641-494B-8483-E075ED1B91CF}" dt="2023-10-30T10:20:20.017" v="42" actId="26606"/>
-          <ac:spMkLst>
-            <pc:docMk/>
-            <pc:sldMk cId="1382432922" sldId="258"/>
-            <ac:spMk id="22" creationId="{C6417104-D4C1-4710-9982-2154A7F48492}"/>
-          </ac:spMkLst>
-        </pc:spChg>
-        <pc:spChg chg="add del">
-          <ac:chgData name="Antoine Martet" userId="19c2f1c6d7cf0253" providerId="LiveId" clId="{EBB826D3-0641-494B-8483-E075ED1B91CF}" dt="2023-10-30T10:20:20.017" v="42" actId="26606"/>
-          <ac:spMkLst>
-            <pc:docMk/>
-            <pc:sldMk cId="1382432922" sldId="258"/>
-            <ac:spMk id="24" creationId="{626F1402-2DEC-4071-84AF-350C7BF00D43}"/>
-          </ac:spMkLst>
-        </pc:spChg>
-        <pc:spChg chg="add del">
-          <ac:chgData name="Antoine Martet" userId="19c2f1c6d7cf0253" providerId="LiveId" clId="{EBB826D3-0641-494B-8483-E075ED1B91CF}" dt="2023-10-30T10:20:20.017" v="42" actId="26606"/>
-          <ac:spMkLst>
-            <pc:docMk/>
-            <pc:sldMk cId="1382432922" sldId="258"/>
-            <ac:spMk id="28" creationId="{DA52A394-10F4-4AA5-90E4-634D1E919DBA}"/>
-          </ac:spMkLst>
-        </pc:spChg>
-        <pc:spChg chg="add del">
-          <ac:chgData name="Antoine Martet" userId="19c2f1c6d7cf0253" providerId="LiveId" clId="{EBB826D3-0641-494B-8483-E075ED1B91CF}" dt="2023-10-30T10:20:20.017" v="42" actId="26606"/>
-          <ac:spMkLst>
-            <pc:docMk/>
-            <pc:sldMk cId="1382432922" sldId="258"/>
-            <ac:spMk id="30" creationId="{07BDDC51-8BB2-42BE-8EA8-39B3E9AC1EF6}"/>
-          </ac:spMkLst>
-        </pc:spChg>
-        <pc:spChg chg="add del">
-          <ac:chgData name="Antoine Martet" userId="19c2f1c6d7cf0253" providerId="LiveId" clId="{EBB826D3-0641-494B-8483-E075ED1B91CF}" dt="2023-10-30T10:20:22.820" v="44" actId="26606"/>
-          <ac:spMkLst>
-            <pc:docMk/>
-            <pc:sldMk cId="1382432922" sldId="258"/>
-            <ac:spMk id="32" creationId="{BB2B8762-61F0-4F1B-9364-D633EE9D6AF5}"/>
-          </ac:spMkLst>
-        </pc:spChg>
-        <pc:spChg chg="add del">
-          <ac:chgData name="Antoine Martet" userId="19c2f1c6d7cf0253" providerId="LiveId" clId="{EBB826D3-0641-494B-8483-E075ED1B91CF}" dt="2023-10-30T10:20:22.820" v="44" actId="26606"/>
-          <ac:spMkLst>
-            <pc:docMk/>
-            <pc:sldMk cId="1382432922" sldId="258"/>
-            <ac:spMk id="33" creationId="{E97675C8-1328-460C-9EBF-6B446B67EAD3}"/>
-          </ac:spMkLst>
-        </pc:spChg>
-        <pc:spChg chg="add del">
-          <ac:chgData name="Antoine Martet" userId="19c2f1c6d7cf0253" providerId="LiveId" clId="{EBB826D3-0641-494B-8483-E075ED1B91CF}" dt="2023-10-30T10:20:22.820" v="44" actId="26606"/>
-          <ac:spMkLst>
-            <pc:docMk/>
-            <pc:sldMk cId="1382432922" sldId="258"/>
-            <ac:spMk id="35" creationId="{01C6F51C-53CC-4D4B-98DA-C143852FCF7F}"/>
-          </ac:spMkLst>
-        </pc:spChg>
-        <pc:spChg chg="add del">
-          <ac:chgData name="Antoine Martet" userId="19c2f1c6d7cf0253" providerId="LiveId" clId="{EBB826D3-0641-494B-8483-E075ED1B91CF}" dt="2023-10-30T10:20:22.820" v="44" actId="26606"/>
-          <ac:spMkLst>
-            <pc:docMk/>
-            <pc:sldMk cId="1382432922" sldId="258"/>
-            <ac:spMk id="37" creationId="{1702822D-7587-488C-BCDE-6366C82D9F42}"/>
-          </ac:spMkLst>
-        </pc:spChg>
-        <pc:spChg chg="add del">
-          <ac:chgData name="Antoine Martet" userId="19c2f1c6d7cf0253" providerId="LiveId" clId="{EBB826D3-0641-494B-8483-E075ED1B91CF}" dt="2023-10-30T10:20:22.820" v="44" actId="26606"/>
-          <ac:spMkLst>
-            <pc:docMk/>
-            <pc:sldMk cId="1382432922" sldId="258"/>
-            <ac:spMk id="38" creationId="{2336503F-9C9C-424B-B606-FD55CB6EC94A}"/>
-          </ac:spMkLst>
-        </pc:spChg>
-        <pc:spChg chg="add del">
-          <ac:chgData name="Antoine Martet" userId="19c2f1c6d7cf0253" providerId="LiveId" clId="{EBB826D3-0641-494B-8483-E075ED1B91CF}" dt="2023-10-30T10:20:55.489" v="50" actId="26606"/>
-          <ac:spMkLst>
-            <pc:docMk/>
-            <pc:sldMk cId="1382432922" sldId="258"/>
-            <ac:spMk id="40" creationId="{BB2B8762-61F0-4F1B-9364-D633EE9D6AF5}"/>
-          </ac:spMkLst>
-        </pc:spChg>
-        <pc:spChg chg="add del">
-          <ac:chgData name="Antoine Martet" userId="19c2f1c6d7cf0253" providerId="LiveId" clId="{EBB826D3-0641-494B-8483-E075ED1B91CF}" dt="2023-10-30T10:20:55.489" v="50" actId="26606"/>
-          <ac:spMkLst>
-            <pc:docMk/>
-            <pc:sldMk cId="1382432922" sldId="258"/>
-            <ac:spMk id="41" creationId="{E97675C8-1328-460C-9EBF-6B446B67EAD3}"/>
-          </ac:spMkLst>
-        </pc:spChg>
-        <pc:spChg chg="add del">
-          <ac:chgData name="Antoine Martet" userId="19c2f1c6d7cf0253" providerId="LiveId" clId="{EBB826D3-0641-494B-8483-E075ED1B91CF}" dt="2023-10-30T10:20:55.489" v="50" actId="26606"/>
-          <ac:spMkLst>
-            <pc:docMk/>
-            <pc:sldMk cId="1382432922" sldId="258"/>
-            <ac:spMk id="43" creationId="{2AD83CFE-1CA3-4832-A4B9-C48CD1347C03}"/>
-          </ac:spMkLst>
-        </pc:spChg>
-        <pc:spChg chg="add del">
-          <ac:chgData name="Antoine Martet" userId="19c2f1c6d7cf0253" providerId="LiveId" clId="{EBB826D3-0641-494B-8483-E075ED1B91CF}" dt="2023-10-30T10:20:55.489" v="50" actId="26606"/>
-          <ac:spMkLst>
-            <pc:docMk/>
-            <pc:sldMk cId="1382432922" sldId="258"/>
-            <ac:spMk id="44" creationId="{BC98641C-7F74-435D-996F-A4387A3C3C26}"/>
-          </ac:spMkLst>
-        </pc:spChg>
-        <pc:spChg chg="add del">
-          <ac:chgData name="Antoine Martet" userId="19c2f1c6d7cf0253" providerId="LiveId" clId="{EBB826D3-0641-494B-8483-E075ED1B91CF}" dt="2023-10-30T10:20:55.489" v="50" actId="26606"/>
-          <ac:spMkLst>
-            <pc:docMk/>
-            <pc:sldMk cId="1382432922" sldId="258"/>
-            <ac:spMk id="45" creationId="{F530C0F6-C8DF-4539-B30C-8105DB618C20}"/>
-          </ac:spMkLst>
-        </pc:spChg>
-        <pc:spChg chg="add del">
-          <ac:chgData name="Antoine Martet" userId="19c2f1c6d7cf0253" providerId="LiveId" clId="{EBB826D3-0641-494B-8483-E075ED1B91CF}" dt="2023-10-30T10:20:55.489" v="50" actId="26606"/>
-          <ac:spMkLst>
-            <pc:docMk/>
-            <pc:sldMk cId="1382432922" sldId="258"/>
-            <ac:spMk id="46" creationId="{BAE51241-AA8B-4B82-9C59-6738DB85674C}"/>
-          </ac:spMkLst>
-        </pc:spChg>
-        <pc:picChg chg="add mod ord">
-          <ac:chgData name="Antoine Martet" userId="19c2f1c6d7cf0253" providerId="LiveId" clId="{EBB826D3-0641-494B-8483-E075ED1B91CF}" dt="2023-10-30T10:23:24.116" v="143" actId="1076"/>
-          <ac:picMkLst>
-            <pc:docMk/>
-            <pc:sldMk cId="1382432922" sldId="258"/>
-            <ac:picMk id="7" creationId="{5D32B576-7A1A-3166-9944-9E4CF88EF761}"/>
-          </ac:picMkLst>
-        </pc:picChg>
-        <pc:picChg chg="add del mod">
-          <ac:chgData name="Antoine Martet" userId="19c2f1c6d7cf0253" providerId="LiveId" clId="{EBB826D3-0641-494B-8483-E075ED1B91CF}" dt="2023-10-30T10:20:57.715" v="53"/>
-          <ac:picMkLst>
-            <pc:docMk/>
-            <pc:sldMk cId="1382432922" sldId="258"/>
-            <ac:picMk id="9" creationId="{82373322-B8F8-EC58-1320-383787C98F31}"/>
-          </ac:picMkLst>
-        </pc:picChg>
-        <pc:picChg chg="add del mod">
-          <ac:chgData name="Antoine Martet" userId="19c2f1c6d7cf0253" providerId="LiveId" clId="{EBB826D3-0641-494B-8483-E075ED1B91CF}" dt="2023-10-30T10:20:56.621" v="51"/>
-          <ac:picMkLst>
-            <pc:docMk/>
-            <pc:sldMk cId="1382432922" sldId="258"/>
-            <ac:picMk id="11" creationId="{5F7B8FE6-9B13-F23C-9634-B1F9922F9D4F}"/>
-          </ac:picMkLst>
-        </pc:picChg>
-        <pc:picChg chg="add mod">
-          <ac:chgData name="Antoine Martet" userId="19c2f1c6d7cf0253" providerId="LiveId" clId="{EBB826D3-0641-494B-8483-E075ED1B91CF}" dt="2023-10-30T10:23:14.023" v="140" actId="1076"/>
-          <ac:picMkLst>
-            <pc:docMk/>
-            <pc:sldMk cId="1382432922" sldId="258"/>
-            <ac:picMk id="13" creationId="{7E857DAE-36D2-C641-6ABB-A7464986AC6F}"/>
-          </ac:picMkLst>
-        </pc:picChg>
-        <pc:cxnChg chg="add del">
-          <ac:chgData name="Antoine Martet" userId="19c2f1c6d7cf0253" providerId="LiveId" clId="{EBB826D3-0641-494B-8483-E075ED1B91CF}" dt="2023-10-30T10:20:20.017" v="42" actId="26606"/>
-          <ac:cxnSpMkLst>
-            <pc:docMk/>
-            <pc:sldMk cId="1382432922" sldId="258"/>
-            <ac:cxnSpMk id="20" creationId="{514EE78B-AF71-4195-A01B-F1165D9233BF}"/>
-          </ac:cxnSpMkLst>
-        </pc:cxnChg>
-        <pc:cxnChg chg="add del">
-          <ac:chgData name="Antoine Martet" userId="19c2f1c6d7cf0253" providerId="LiveId" clId="{EBB826D3-0641-494B-8483-E075ED1B91CF}" dt="2023-10-30T10:20:20.017" v="42" actId="26606"/>
-          <ac:cxnSpMkLst>
-            <pc:docMk/>
-            <pc:sldMk cId="1382432922" sldId="258"/>
-            <ac:cxnSpMk id="26" creationId="{04733B62-1719-4677-A612-CA0AC0AD7482}"/>
-          </ac:cxnSpMkLst>
-        </pc:cxnChg>
-        <pc:cxnChg chg="add del">
-          <ac:chgData name="Antoine Martet" userId="19c2f1c6d7cf0253" providerId="LiveId" clId="{EBB826D3-0641-494B-8483-E075ED1B91CF}" dt="2023-10-30T10:20:22.820" v="44" actId="26606"/>
-          <ac:cxnSpMkLst>
-            <pc:docMk/>
-            <pc:sldMk cId="1382432922" sldId="258"/>
-            <ac:cxnSpMk id="34" creationId="{514EE78B-AF71-4195-A01B-F1165D9233BF}"/>
-          </ac:cxnSpMkLst>
-        </pc:cxnChg>
-        <pc:cxnChg chg="add del">
-          <ac:chgData name="Antoine Martet" userId="19c2f1c6d7cf0253" providerId="LiveId" clId="{EBB826D3-0641-494B-8483-E075ED1B91CF}" dt="2023-10-30T10:20:22.820" v="44" actId="26606"/>
-          <ac:cxnSpMkLst>
-            <pc:docMk/>
-            <pc:sldMk cId="1382432922" sldId="258"/>
-            <ac:cxnSpMk id="36" creationId="{613AFA59-28DC-4A81-8ADB-6EE5C6322202}"/>
-          </ac:cxnSpMkLst>
-        </pc:cxnChg>
-        <pc:cxnChg chg="add del">
-          <ac:chgData name="Antoine Martet" userId="19c2f1c6d7cf0253" providerId="LiveId" clId="{EBB826D3-0641-494B-8483-E075ED1B91CF}" dt="2023-10-30T10:20:55.489" v="50" actId="26606"/>
-          <ac:cxnSpMkLst>
-            <pc:docMk/>
-            <pc:sldMk cId="1382432922" sldId="258"/>
-            <ac:cxnSpMk id="42" creationId="{514EE78B-AF71-4195-A01B-F1165D9233BF}"/>
-          </ac:cxnSpMkLst>
-        </pc:cxnChg>
-      </pc:sldChg>
-      <pc:sldChg chg="modSp new mod">
-        <pc:chgData name="Antoine Martet" userId="19c2f1c6d7cf0253" providerId="LiveId" clId="{EBB826D3-0641-494B-8483-E075ED1B91CF}" dt="2023-10-30T10:32:35.632" v="334" actId="20577"/>
-        <pc:sldMkLst>
-          <pc:docMk/>
-          <pc:sldMk cId="2686455783" sldId="259"/>
-        </pc:sldMkLst>
-        <pc:spChg chg="mod">
-          <ac:chgData name="Antoine Martet" userId="19c2f1c6d7cf0253" providerId="LiveId" clId="{EBB826D3-0641-494B-8483-E075ED1B91CF}" dt="2023-10-30T10:28:43.896" v="287" actId="20577"/>
-          <ac:spMkLst>
-            <pc:docMk/>
-            <pc:sldMk cId="2686455783" sldId="259"/>
-            <ac:spMk id="2" creationId="{501402DB-434B-36F6-3525-B16732A9FDD7}"/>
-          </ac:spMkLst>
-        </pc:spChg>
-        <pc:spChg chg="mod">
-          <ac:chgData name="Antoine Martet" userId="19c2f1c6d7cf0253" providerId="LiveId" clId="{EBB826D3-0641-494B-8483-E075ED1B91CF}" dt="2023-10-30T10:32:35.632" v="334" actId="20577"/>
-          <ac:spMkLst>
-            <pc:docMk/>
-            <pc:sldMk cId="2686455783" sldId="259"/>
-            <ac:spMk id="3" creationId="{E3709B17-FCD1-61A0-4127-BC0C704FF9B6}"/>
-          </ac:spMkLst>
-        </pc:spChg>
-      </pc:sldChg>
-      <pc:sldChg chg="modSp new mod">
-        <pc:chgData name="Antoine Martet" userId="19c2f1c6d7cf0253" providerId="LiveId" clId="{EBB826D3-0641-494B-8483-E075ED1B91CF}" dt="2023-10-30T10:35:12.500" v="342" actId="20577"/>
-        <pc:sldMkLst>
-          <pc:docMk/>
-          <pc:sldMk cId="4064782123" sldId="260"/>
-        </pc:sldMkLst>
-        <pc:spChg chg="mod">
-          <ac:chgData name="Antoine Martet" userId="19c2f1c6d7cf0253" providerId="LiveId" clId="{EBB826D3-0641-494B-8483-E075ED1B91CF}" dt="2023-10-30T10:28:34.206" v="285" actId="20577"/>
-          <ac:spMkLst>
-            <pc:docMk/>
-            <pc:sldMk cId="4064782123" sldId="260"/>
-            <ac:spMk id="2" creationId="{C126A169-59F4-C0DA-0AFF-7301274F7402}"/>
-          </ac:spMkLst>
-        </pc:spChg>
-        <pc:spChg chg="mod">
-          <ac:chgData name="Antoine Martet" userId="19c2f1c6d7cf0253" providerId="LiveId" clId="{EBB826D3-0641-494B-8483-E075ED1B91CF}" dt="2023-10-30T10:35:12.500" v="342" actId="20577"/>
-          <ac:spMkLst>
-            <pc:docMk/>
-            <pc:sldMk cId="4064782123" sldId="260"/>
-            <ac:spMk id="3" creationId="{8B603177-5EC7-5827-7FEC-9184743BEE3F}"/>
-          </ac:spMkLst>
-        </pc:spChg>
-      </pc:sldChg>
-      <pc:sldChg chg="addSp delSp modSp new mod">
-        <pc:chgData name="Antoine Martet" userId="19c2f1c6d7cf0253" providerId="LiveId" clId="{EBB826D3-0641-494B-8483-E075ED1B91CF}" dt="2023-10-30T10:44:02.289" v="461" actId="20577"/>
-        <pc:sldMkLst>
-          <pc:docMk/>
-          <pc:sldMk cId="3791526076" sldId="261"/>
-        </pc:sldMkLst>
-        <pc:spChg chg="mod">
-          <ac:chgData name="Antoine Martet" userId="19c2f1c6d7cf0253" providerId="LiveId" clId="{EBB826D3-0641-494B-8483-E075ED1B91CF}" dt="2023-10-30T10:36:20.332" v="364" actId="20577"/>
-          <ac:spMkLst>
-            <pc:docMk/>
-            <pc:sldMk cId="3791526076" sldId="261"/>
-            <ac:spMk id="2" creationId="{04AFF39B-F66A-9398-2B7A-52467BAF934C}"/>
-          </ac:spMkLst>
-        </pc:spChg>
-        <pc:spChg chg="del">
-          <ac:chgData name="Antoine Martet" userId="19c2f1c6d7cf0253" providerId="LiveId" clId="{EBB826D3-0641-494B-8483-E075ED1B91CF}" dt="2023-10-30T10:38:00.480" v="365"/>
-          <ac:spMkLst>
-            <pc:docMk/>
-            <pc:sldMk cId="3791526076" sldId="261"/>
-            <ac:spMk id="3" creationId="{5BDEACBE-F4B9-09AB-E168-982E9E5C1E16}"/>
-          </ac:spMkLst>
-        </pc:spChg>
-        <pc:spChg chg="add mod">
-          <ac:chgData name="Antoine Martet" userId="19c2f1c6d7cf0253" providerId="LiveId" clId="{EBB826D3-0641-494B-8483-E075ED1B91CF}" dt="2023-10-30T10:44:02.289" v="461" actId="20577"/>
-          <ac:spMkLst>
-            <pc:docMk/>
-            <pc:sldMk cId="3791526076" sldId="261"/>
-            <ac:spMk id="5" creationId="{91888E6F-9C0C-B098-A4F5-28ADE9C34F2A}"/>
-          </ac:spMkLst>
-        </pc:spChg>
-        <pc:picChg chg="add mod">
-          <ac:chgData name="Antoine Martet" userId="19c2f1c6d7cf0253" providerId="LiveId" clId="{EBB826D3-0641-494B-8483-E075ED1B91CF}" dt="2023-10-30T10:39:53.595" v="367" actId="14100"/>
-          <ac:picMkLst>
-            <pc:docMk/>
-            <pc:sldMk cId="3791526076" sldId="261"/>
-            <ac:picMk id="4" creationId="{C3F1E64F-9373-BC4C-7DE8-22CC7B3AFDE9}"/>
-          </ac:picMkLst>
-        </pc:picChg>
-      </pc:sldChg>
-      <pc:sldChg chg="modSp new mod">
-        <pc:chgData name="Antoine Martet" userId="19c2f1c6d7cf0253" providerId="LiveId" clId="{EBB826D3-0641-494B-8483-E075ED1B91CF}" dt="2023-10-30T20:21:39.986" v="851" actId="20577"/>
-        <pc:sldMkLst>
-          <pc:docMk/>
-          <pc:sldMk cId="2081047817" sldId="262"/>
-        </pc:sldMkLst>
-        <pc:spChg chg="mod">
-          <ac:chgData name="Antoine Martet" userId="19c2f1c6d7cf0253" providerId="LiveId" clId="{EBB826D3-0641-494B-8483-E075ED1B91CF}" dt="2023-10-30T20:10:32.505" v="642" actId="20577"/>
-          <ac:spMkLst>
-            <pc:docMk/>
-            <pc:sldMk cId="2081047817" sldId="262"/>
-            <ac:spMk id="2" creationId="{0302F4C2-08FF-BC0E-F560-394FEE8F05D5}"/>
-          </ac:spMkLst>
-        </pc:spChg>
-        <pc:spChg chg="mod">
-          <ac:chgData name="Antoine Martet" userId="19c2f1c6d7cf0253" providerId="LiveId" clId="{EBB826D3-0641-494B-8483-E075ED1B91CF}" dt="2023-10-30T20:21:39.986" v="851" actId="20577"/>
-          <ac:spMkLst>
-            <pc:docMk/>
-            <pc:sldMk cId="2081047817" sldId="262"/>
-            <ac:spMk id="3" creationId="{E185C213-9BF4-70D2-90C5-9151DE56EB98}"/>
-          </ac:spMkLst>
-        </pc:spChg>
-      </pc:sldChg>
-    </pc:docChg>
-  </pc:docChgLst>
 </pc:chgInfo>
+</file>
+
+<file path=ppt/handoutMasters/handoutMaster1.xml><?xml version="1.0" encoding="utf-8"?>
+<p:handoutMaster xmlns:a="http://schemas.openxmlformats.org/drawingml/2006/main" xmlns:r="http://schemas.openxmlformats.org/officeDocument/2006/relationships" xmlns:p="http://schemas.openxmlformats.org/presentationml/2006/main">
+  <p:cSld>
+    <p:bg>
+      <p:bgRef idx="1001">
+        <a:schemeClr val="bg1"/>
+      </p:bgRef>
+    </p:bg>
+    <p:spTree>
+      <p:nvGrpSpPr>
+        <p:cNvPr id="1" name=""/>
+        <p:cNvGrpSpPr/>
+        <p:nvPr/>
+      </p:nvGrpSpPr>
+      <p:grpSpPr>
+        <a:xfrm>
+          <a:off x="0" y="0"/>
+          <a:ext cx="0" cy="0"/>
+          <a:chOff x="0" y="0"/>
+          <a:chExt cx="0" cy="0"/>
+        </a:xfrm>
+      </p:grpSpPr>
+      <p:sp>
+        <p:nvSpPr>
+          <p:cNvPr id="2" name="Espace réservé de l'en-tête 1">
+            <a:extLst>
+              <a:ext uri="{FF2B5EF4-FFF2-40B4-BE49-F238E27FC236}">
+                <a16:creationId xmlns:a16="http://schemas.microsoft.com/office/drawing/2014/main" id="{2A8453CF-5459-4C0A-B7CB-362FA9056115}"/>
+              </a:ext>
+            </a:extLst>
+          </p:cNvPr>
+          <p:cNvSpPr>
+            <a:spLocks noGrp="1"/>
+          </p:cNvSpPr>
+          <p:nvPr>
+            <p:ph type="hdr" sz="quarter"/>
+          </p:nvPr>
+        </p:nvSpPr>
+        <p:spPr>
+          <a:xfrm>
+            <a:off x="0" y="0"/>
+            <a:ext cx="2971800" cy="458788"/>
+          </a:xfrm>
+          <a:prstGeom prst="rect">
+            <a:avLst/>
+          </a:prstGeom>
+        </p:spPr>
+        <p:txBody>
+          <a:bodyPr vert="horz" lIns="91440" tIns="45720" rIns="91440" bIns="45720" rtlCol="0"/>
+          <a:lstStyle>
+            <a:lvl1pPr algn="l">
+              <a:defRPr sz="1200"/>
+            </a:lvl1pPr>
+          </a:lstStyle>
+          <a:p>
+            <a:endParaRPr lang="fr-CH"/>
+          </a:p>
+        </p:txBody>
+      </p:sp>
+      <p:sp>
+        <p:nvSpPr>
+          <p:cNvPr id="3" name="Espace réservé de la date 2">
+            <a:extLst>
+              <a:ext uri="{FF2B5EF4-FFF2-40B4-BE49-F238E27FC236}">
+                <a16:creationId xmlns:a16="http://schemas.microsoft.com/office/drawing/2014/main" id="{1B43B12C-5C29-4DF0-8C3C-B7B968561D94}"/>
+              </a:ext>
+            </a:extLst>
+          </p:cNvPr>
+          <p:cNvSpPr>
+            <a:spLocks noGrp="1"/>
+          </p:cNvSpPr>
+          <p:nvPr>
+            <p:ph type="dt" sz="quarter" idx="1"/>
+          </p:nvPr>
+        </p:nvSpPr>
+        <p:spPr>
+          <a:xfrm>
+            <a:off x="3884613" y="0"/>
+            <a:ext cx="2971800" cy="458788"/>
+          </a:xfrm>
+          <a:prstGeom prst="rect">
+            <a:avLst/>
+          </a:prstGeom>
+        </p:spPr>
+        <p:txBody>
+          <a:bodyPr vert="horz" lIns="91440" tIns="45720" rIns="91440" bIns="45720" rtlCol="0"/>
+          <a:lstStyle>
+            <a:lvl1pPr algn="r">
+              <a:defRPr sz="1200"/>
+            </a:lvl1pPr>
+          </a:lstStyle>
+          <a:p>
+            <a:fld id="{2CB4D488-CDE6-4263-82AB-E0955AC34EDC}" type="datetimeFigureOut">
+              <a:rPr lang="fr-CH" smtClean="0"/>
+              <a:t>15.01.2024</a:t>
+            </a:fld>
+            <a:endParaRPr lang="fr-CH"/>
+          </a:p>
+        </p:txBody>
+      </p:sp>
+      <p:sp>
+        <p:nvSpPr>
+          <p:cNvPr id="4" name="Espace réservé du pied de page 3">
+            <a:extLst>
+              <a:ext uri="{FF2B5EF4-FFF2-40B4-BE49-F238E27FC236}">
+                <a16:creationId xmlns:a16="http://schemas.microsoft.com/office/drawing/2014/main" id="{ADAAC7D7-3A71-4CE4-AD44-0C2C0BE19C13}"/>
+              </a:ext>
+            </a:extLst>
+          </p:cNvPr>
+          <p:cNvSpPr>
+            <a:spLocks noGrp="1"/>
+          </p:cNvSpPr>
+          <p:nvPr>
+            <p:ph type="ftr" sz="quarter" idx="2"/>
+          </p:nvPr>
+        </p:nvSpPr>
+        <p:spPr>
+          <a:xfrm>
+            <a:off x="0" y="8685213"/>
+            <a:ext cx="2971800" cy="458787"/>
+          </a:xfrm>
+          <a:prstGeom prst="rect">
+            <a:avLst/>
+          </a:prstGeom>
+        </p:spPr>
+        <p:txBody>
+          <a:bodyPr vert="horz" lIns="91440" tIns="45720" rIns="91440" bIns="45720" rtlCol="0" anchor="b"/>
+          <a:lstStyle>
+            <a:lvl1pPr algn="l">
+              <a:defRPr sz="1200"/>
+            </a:lvl1pPr>
+          </a:lstStyle>
+          <a:p>
+            <a:r>
+              <a:rPr lang="fr-CH"/>
+              <a:t>A. Martet / I. Clot</a:t>
+            </a:r>
+          </a:p>
+        </p:txBody>
+      </p:sp>
+      <p:sp>
+        <p:nvSpPr>
+          <p:cNvPr id="5" name="Espace réservé du numéro de diapositive 4">
+            <a:extLst>
+              <a:ext uri="{FF2B5EF4-FFF2-40B4-BE49-F238E27FC236}">
+                <a16:creationId xmlns:a16="http://schemas.microsoft.com/office/drawing/2014/main" id="{9E5C6C04-5533-4A5B-9D9C-CFC27AA5D2B2}"/>
+              </a:ext>
+            </a:extLst>
+          </p:cNvPr>
+          <p:cNvSpPr>
+            <a:spLocks noGrp="1"/>
+          </p:cNvSpPr>
+          <p:nvPr>
+            <p:ph type="sldNum" sz="quarter" idx="3"/>
+          </p:nvPr>
+        </p:nvSpPr>
+        <p:spPr>
+          <a:xfrm>
+            <a:off x="3884613" y="8685213"/>
+            <a:ext cx="2971800" cy="458787"/>
+          </a:xfrm>
+          <a:prstGeom prst="rect">
+            <a:avLst/>
+          </a:prstGeom>
+        </p:spPr>
+        <p:txBody>
+          <a:bodyPr vert="horz" lIns="91440" tIns="45720" rIns="91440" bIns="45720" rtlCol="0" anchor="b"/>
+          <a:lstStyle>
+            <a:lvl1pPr algn="r">
+              <a:defRPr sz="1200"/>
+            </a:lvl1pPr>
+          </a:lstStyle>
+          <a:p>
+            <a:fld id="{2F6694B0-8526-4BAE-AF84-FC154DB662F0}" type="slidenum">
+              <a:rPr lang="fr-CH" smtClean="0"/>
+              <a:t>‹N°›</a:t>
+            </a:fld>
+            <a:endParaRPr lang="fr-CH"/>
+          </a:p>
+        </p:txBody>
+      </p:sp>
+    </p:spTree>
+    <p:extLst>
+      <p:ext uri="{BB962C8B-B14F-4D97-AF65-F5344CB8AC3E}">
+        <p14:creationId xmlns:p14="http://schemas.microsoft.com/office/powerpoint/2010/main" val="1949943976"/>
+      </p:ext>
+    </p:extLst>
+  </p:cSld>
+  <p:clrMap bg1="lt1" tx1="dk1" bg2="lt2" tx2="dk2" accent1="accent1" accent2="accent2" accent3="accent3" accent4="accent4" accent5="accent5" accent6="accent6" hlink="hlink" folHlink="folHlink"/>
+  <p:hf hdr="0" ftr="0" dt="0"/>
+</p:handoutMaster>
 </file>
 
 <file path=ppt/notesMasters/notesMaster1.xml><?xml version="1.0" encoding="utf-8"?>
@@ -1808,7 +2004,7 @@
           <a:p>
             <a:fld id="{397B2814-915E-4666-9114-D680331EBB40}" type="datetimeFigureOut">
               <a:rPr lang="fr-CH" smtClean="0"/>
-              <a:t>14.01.2024</a:t>
+              <a:t>15.01.2024</a:t>
             </a:fld>
             <a:endParaRPr lang="fr-CH"/>
           </a:p>
@@ -1934,7 +2130,10 @@
             </a:lvl1pPr>
           </a:lstStyle>
           <a:p>
-            <a:endParaRPr lang="fr-CH"/>
+            <a:r>
+              <a:rPr lang="fr-CH"/>
+              <a:t>A. Martet / I. Clot</a:t>
+            </a:r>
           </a:p>
         </p:txBody>
       </p:sp>
@@ -1981,6 +2180,7 @@
     </p:extLst>
   </p:cSld>
   <p:clrMap bg1="lt1" tx1="dk1" bg2="lt2" tx2="dk2" accent1="accent1" accent2="accent2" accent3="accent3" accent4="accent4" accent5="accent5" accent6="accent6" hlink="hlink" folHlink="folHlink"/>
+  <p:hf hdr="0" ftr="0" dt="0"/>
   <p:notesStyle>
     <a:lvl1pPr marL="0" algn="l" defTabSz="914400" rtl="0" eaLnBrk="1" latinLnBrk="0" hangingPunct="1">
       <a:defRPr sz="1200" kern="1200">
@@ -2300,9 +2500,9 @@
           <a:bodyPr/>
           <a:lstStyle/>
           <a:p>
-            <a:fld id="{7941FD60-62ED-4B21-A00F-27A77F85D078}" type="datetime1">
+            <a:fld id="{C3ABE4B4-1301-42A0-8153-61B30D31BEFF}" type="datetime1">
               <a:rPr lang="en-US" smtClean="0"/>
-              <a:t>1/14/2024</a:t>
+              <a:t>1/15/2024</a:t>
             </a:fld>
             <a:endParaRPr lang="en-US" dirty="0"/>
           </a:p>
@@ -2323,6 +2523,10 @@
           <a:bodyPr/>
           <a:lstStyle/>
           <a:p>
+            <a:r>
+              <a:rPr lang="en-US"/>
+              <a:t>A. Martet / I. Clot</a:t>
+            </a:r>
             <a:endParaRPr lang="en-US" dirty="0"/>
           </a:p>
         </p:txBody>
@@ -2503,9 +2707,9 @@
           <a:bodyPr/>
           <a:lstStyle/>
           <a:p>
-            <a:fld id="{695F92BE-4D3D-4BC9-9DD1-9164670DAA24}" type="datetime1">
+            <a:fld id="{432DB729-F961-40F6-8F83-087CB3FFF495}" type="datetime1">
               <a:rPr lang="en-US" smtClean="0"/>
-              <a:t>1/14/2024</a:t>
+              <a:t>1/15/2024</a:t>
             </a:fld>
             <a:endParaRPr lang="en-US" dirty="0"/>
           </a:p>
@@ -2526,6 +2730,10 @@
           <a:bodyPr/>
           <a:lstStyle/>
           <a:p>
+            <a:r>
+              <a:rPr lang="en-US"/>
+              <a:t>A. Martet / I. Clot</a:t>
+            </a:r>
             <a:endParaRPr lang="en-US" dirty="0"/>
           </a:p>
         </p:txBody>
@@ -2754,9 +2962,9 @@
           <a:bodyPr/>
           <a:lstStyle/>
           <a:p>
-            <a:fld id="{7D960887-C34A-49AC-B668-CF430ECD6FE9}" type="datetime1">
+            <a:fld id="{31C3DAE0-CB85-4D3C-9308-B4E95EAAA340}" type="datetime1">
               <a:rPr lang="en-US" smtClean="0"/>
-              <a:t>1/14/2024</a:t>
+              <a:t>1/15/2024</a:t>
             </a:fld>
             <a:endParaRPr lang="en-US" dirty="0"/>
           </a:p>
@@ -2777,6 +2985,10 @@
           <a:bodyPr/>
           <a:lstStyle/>
           <a:p>
+            <a:r>
+              <a:rPr lang="en-US"/>
+              <a:t>A. Martet / I. Clot</a:t>
+            </a:r>
             <a:endParaRPr lang="en-US" dirty="0"/>
           </a:p>
         </p:txBody>
@@ -2919,9 +3131,9 @@
           <a:bodyPr/>
           <a:lstStyle/>
           <a:p>
-            <a:fld id="{E0EFA5EF-3B44-4690-841F-81CAF1100F51}" type="datetime1">
+            <a:fld id="{35B8A614-BC04-428C-9923-A7B4B6D1FFEB}" type="datetime1">
               <a:rPr lang="en-US" smtClean="0"/>
-              <a:t>1/14/2024</a:t>
+              <a:t>1/15/2024</a:t>
             </a:fld>
             <a:endParaRPr lang="en-US" dirty="0"/>
           </a:p>
@@ -2942,6 +3154,10 @@
           <a:bodyPr/>
           <a:lstStyle/>
           <a:p>
+            <a:r>
+              <a:rPr lang="en-US"/>
+              <a:t>A. Martet / I. Clot</a:t>
+            </a:r>
             <a:endParaRPr lang="en-US" dirty="0"/>
           </a:p>
         </p:txBody>
@@ -3257,9 +3473,9 @@
           <a:bodyPr/>
           <a:lstStyle/>
           <a:p>
-            <a:fld id="{0D8166DC-B923-4471-ABF7-D2C8A82D39B2}" type="datetime1">
+            <a:fld id="{C3B53918-68B9-4EA2-91DC-CC65A6394EB9}" type="datetime1">
               <a:rPr lang="en-US" smtClean="0"/>
-              <a:t>1/14/2024</a:t>
+              <a:t>1/15/2024</a:t>
             </a:fld>
             <a:endParaRPr lang="en-US" dirty="0"/>
           </a:p>
@@ -3280,6 +3496,10 @@
           <a:bodyPr/>
           <a:lstStyle/>
           <a:p>
+            <a:r>
+              <a:rPr lang="en-US"/>
+              <a:t>A. Martet / I. Clot</a:t>
+            </a:r>
             <a:endParaRPr lang="en-US" dirty="0"/>
           </a:p>
         </p:txBody>
@@ -3527,9 +3747,9 @@
           <a:bodyPr/>
           <a:lstStyle/>
           <a:p>
-            <a:fld id="{B6EF7CE2-C672-4F3C-B2E2-A8E310A4EEBE}" type="datetime1">
+            <a:fld id="{9073B8D4-E504-4351-BC73-874BA5FECED3}" type="datetime1">
               <a:rPr lang="en-US" smtClean="0"/>
-              <a:t>1/14/2024</a:t>
+              <a:t>1/15/2024</a:t>
             </a:fld>
             <a:endParaRPr lang="en-US" dirty="0"/>
           </a:p>
@@ -3550,6 +3770,10 @@
           <a:bodyPr/>
           <a:lstStyle/>
           <a:p>
+            <a:r>
+              <a:rPr lang="en-US"/>
+              <a:t>A. Martet / I. Clot</a:t>
+            </a:r>
             <a:endParaRPr lang="en-US" dirty="0"/>
           </a:p>
         </p:txBody>
@@ -3901,9 +4125,9 @@
           <a:bodyPr/>
           <a:lstStyle/>
           <a:p>
-            <a:fld id="{1325F562-1580-42F3-AEAB-B9B7D6F71C0C}" type="datetime1">
+            <a:fld id="{B6D75DC8-C687-446F-B36E-87B7C45ECD74}" type="datetime1">
               <a:rPr lang="en-US" smtClean="0"/>
-              <a:t>1/14/2024</a:t>
+              <a:t>1/15/2024</a:t>
             </a:fld>
             <a:endParaRPr lang="en-US" dirty="0"/>
           </a:p>
@@ -3924,6 +4148,10 @@
           <a:bodyPr/>
           <a:lstStyle/>
           <a:p>
+            <a:r>
+              <a:rPr lang="en-US"/>
+              <a:t>A. Martet / I. Clot</a:t>
+            </a:r>
             <a:endParaRPr lang="en-US" dirty="0"/>
           </a:p>
         </p:txBody>
@@ -4014,9 +4242,9 @@
           <a:bodyPr/>
           <a:lstStyle/>
           <a:p>
-            <a:fld id="{66EF7433-C84A-4313-A153-02279F9D89F1}" type="datetime1">
+            <a:fld id="{44DEC50A-B86B-400D-A463-6E5FE63078FA}" type="datetime1">
               <a:rPr lang="en-US" smtClean="0"/>
-              <a:t>1/14/2024</a:t>
+              <a:t>1/15/2024</a:t>
             </a:fld>
             <a:endParaRPr lang="en-US" dirty="0"/>
           </a:p>
@@ -4037,6 +4265,10 @@
           <a:bodyPr/>
           <a:lstStyle/>
           <a:p>
+            <a:r>
+              <a:rPr lang="en-US"/>
+              <a:t>A. Martet / I. Clot</a:t>
+            </a:r>
             <a:endParaRPr lang="en-US" dirty="0"/>
           </a:p>
         </p:txBody>
@@ -4180,9 +4412,9 @@
           <a:bodyPr/>
           <a:lstStyle/>
           <a:p>
-            <a:fld id="{ED59817C-B653-4512-AFF8-DD495F9B8E7C}" type="datetime1">
+            <a:fld id="{8796133A-1FFB-4A40-9BE0-888B02BAC55F}" type="datetime1">
               <a:rPr lang="en-US" smtClean="0"/>
-              <a:t>1/14/2024</a:t>
+              <a:t>1/15/2024</a:t>
             </a:fld>
             <a:endParaRPr lang="en-US" dirty="0"/>
           </a:p>
@@ -4211,6 +4443,10 @@
             </a:lvl1pPr>
           </a:lstStyle>
           <a:p>
+            <a:r>
+              <a:rPr lang="en-US"/>
+              <a:t>A. Martet / I. Clot</a:t>
+            </a:r>
             <a:endParaRPr lang="en-US" dirty="0"/>
           </a:p>
         </p:txBody>
@@ -4530,9 +4766,9 @@
             </a:lvl1pPr>
           </a:lstStyle>
           <a:p>
-            <a:fld id="{7A66B822-2072-44EA-8E8D-5DB7DAC6657A}" type="datetime1">
+            <a:fld id="{F1D53A8D-4758-4851-87C3-48B3C277FF8C}" type="datetime1">
               <a:rPr lang="en-US" smtClean="0"/>
-              <a:t>1/14/2024</a:t>
+              <a:t>1/15/2024</a:t>
             </a:fld>
             <a:endParaRPr lang="en-US" dirty="0"/>
           </a:p>
@@ -4566,6 +4802,10 @@
             </a:lvl1pPr>
           </a:lstStyle>
           <a:p>
+            <a:r>
+              <a:rPr lang="en-US"/>
+              <a:t>A. Martet / I. Clot</a:t>
+            </a:r>
             <a:endParaRPr lang="en-US" dirty="0"/>
           </a:p>
         </p:txBody>
@@ -4903,9 +5143,9 @@
           <a:bodyPr/>
           <a:lstStyle/>
           <a:p>
-            <a:fld id="{916CA623-A161-42C1-A70D-EB8AF098032E}" type="datetime1">
+            <a:fld id="{757A977C-B89F-4A52-AE6D-F3A691148FAB}" type="datetime1">
               <a:rPr lang="en-US" smtClean="0"/>
-              <a:t>1/14/2024</a:t>
+              <a:t>1/15/2024</a:t>
             </a:fld>
             <a:endParaRPr lang="en-US" dirty="0"/>
           </a:p>
@@ -4926,6 +5166,10 @@
           <a:bodyPr/>
           <a:lstStyle/>
           <a:p>
+            <a:r>
+              <a:rPr lang="en-US"/>
+              <a:t>A. Martet / I. Clot</a:t>
+            </a:r>
             <a:endParaRPr lang="en-US" dirty="0"/>
           </a:p>
         </p:txBody>
@@ -5185,9 +5429,9 @@
             </a:lvl1pPr>
           </a:lstStyle>
           <a:p>
-            <a:fld id="{3DDE002B-5B24-48FD-ADEF-97443A6CF268}" type="datetime1">
+            <a:fld id="{992FEC5F-C033-4AC4-8458-11D509BE7C2E}" type="datetime1">
               <a:rPr lang="en-US" smtClean="0"/>
-              <a:t>1/14/2024</a:t>
+              <a:t>1/15/2024</a:t>
             </a:fld>
             <a:endParaRPr lang="en-US" dirty="0"/>
           </a:p>
@@ -5224,6 +5468,10 @@
             </a:lvl1pPr>
           </a:lstStyle>
           <a:p>
+            <a:r>
+              <a:rPr lang="en-US"/>
+              <a:t>A. Martet / I. Clot</a:t>
+            </a:r>
             <a:endParaRPr lang="en-US" dirty="0"/>
           </a:p>
         </p:txBody>
@@ -5322,7 +5570,7 @@
     <p:sldLayoutId id="2147483658" r:id="rId10"/>
     <p:sldLayoutId id="2147483659" r:id="rId11"/>
   </p:sldLayoutIdLst>
-  <p:hf hdr="0" ftr="0" dt="0"/>
+  <p:hf hdr="0" dt="0"/>
   <p:txStyles>
     <p:titleStyle>
       <a:lvl1pPr algn="l" defTabSz="914400" rtl="0" eaLnBrk="1" latinLnBrk="0" hangingPunct="1">
@@ -6672,6 +6920,35 @@
           </a:p>
         </p:txBody>
       </p:sp>
+      <p:sp>
+        <p:nvSpPr>
+          <p:cNvPr id="3" name="Espace réservé du pied de page 2">
+            <a:extLst>
+              <a:ext uri="{FF2B5EF4-FFF2-40B4-BE49-F238E27FC236}">
+                <a16:creationId xmlns:a16="http://schemas.microsoft.com/office/drawing/2014/main" id="{F7B4419A-C660-47AA-ADFC-047429460800}"/>
+              </a:ext>
+            </a:extLst>
+          </p:cNvPr>
+          <p:cNvSpPr>
+            <a:spLocks noGrp="1"/>
+          </p:cNvSpPr>
+          <p:nvPr>
+            <p:ph type="ftr" sz="quarter" idx="11"/>
+          </p:nvPr>
+        </p:nvSpPr>
+        <p:spPr/>
+        <p:txBody>
+          <a:bodyPr/>
+          <a:lstStyle/>
+          <a:p>
+            <a:r>
+              <a:rPr lang="en-US"/>
+              <a:t>A. Martet / I. Clot</a:t>
+            </a:r>
+            <a:endParaRPr lang="en-US" dirty="0"/>
+          </a:p>
+        </p:txBody>
+      </p:sp>
     </p:spTree>
     <p:extLst>
       <p:ext uri="{BB962C8B-B14F-4D97-AF65-F5344CB8AC3E}">
@@ -7088,6 +7365,42 @@
           </a:p>
         </p:txBody>
       </p:sp>
+      <p:sp>
+        <p:nvSpPr>
+          <p:cNvPr id="3" name="Espace réservé du pied de page 2">
+            <a:extLst>
+              <a:ext uri="{FF2B5EF4-FFF2-40B4-BE49-F238E27FC236}">
+                <a16:creationId xmlns:a16="http://schemas.microsoft.com/office/drawing/2014/main" id="{40897BAF-B0DD-4542-BB55-76142F4B9B80}"/>
+              </a:ext>
+            </a:extLst>
+          </p:cNvPr>
+          <p:cNvSpPr>
+            <a:spLocks noGrp="1"/>
+          </p:cNvSpPr>
+          <p:nvPr>
+            <p:ph type="ftr" sz="quarter" idx="11"/>
+          </p:nvPr>
+        </p:nvSpPr>
+        <p:spPr/>
+        <p:txBody>
+          <a:bodyPr/>
+          <a:lstStyle/>
+          <a:p>
+            <a:r>
+              <a:rPr lang="en-US" dirty="0"/>
+              <a:t>A. </a:t>
+            </a:r>
+            <a:r>
+              <a:rPr lang="en-US" dirty="0" err="1"/>
+              <a:t>Martet</a:t>
+            </a:r>
+            <a:r>
+              <a:rPr lang="en-US" dirty="0"/>
+              <a:t> / I. Clot</a:t>
+            </a:r>
+          </a:p>
+        </p:txBody>
+      </p:sp>
     </p:spTree>
     <p:extLst>
       <p:ext uri="{BB962C8B-B14F-4D97-AF65-F5344CB8AC3E}">
@@ -7579,6 +7892,35 @@
           </a:p>
         </p:txBody>
       </p:sp>
+      <p:sp>
+        <p:nvSpPr>
+          <p:cNvPr id="4" name="Espace réservé du pied de page 3">
+            <a:extLst>
+              <a:ext uri="{FF2B5EF4-FFF2-40B4-BE49-F238E27FC236}">
+                <a16:creationId xmlns:a16="http://schemas.microsoft.com/office/drawing/2014/main" id="{72C8A1CE-EE0A-4143-945E-BFB920411846}"/>
+              </a:ext>
+            </a:extLst>
+          </p:cNvPr>
+          <p:cNvSpPr>
+            <a:spLocks noGrp="1"/>
+          </p:cNvSpPr>
+          <p:nvPr>
+            <p:ph type="ftr" sz="quarter" idx="11"/>
+          </p:nvPr>
+        </p:nvSpPr>
+        <p:spPr/>
+        <p:txBody>
+          <a:bodyPr/>
+          <a:lstStyle/>
+          <a:p>
+            <a:r>
+              <a:rPr lang="en-US"/>
+              <a:t>A. Martet / I. Clot</a:t>
+            </a:r>
+            <a:endParaRPr lang="en-US" dirty="0"/>
+          </a:p>
+        </p:txBody>
+      </p:sp>
     </p:spTree>
     <p:extLst>
       <p:ext uri="{BB962C8B-B14F-4D97-AF65-F5344CB8AC3E}">
@@ -7751,6 +8093,35 @@
               <a:rPr lang="en-US" smtClean="0"/>
               <a:t>2</a:t>
             </a:fld>
+            <a:endParaRPr lang="en-US" dirty="0"/>
+          </a:p>
+        </p:txBody>
+      </p:sp>
+      <p:sp>
+        <p:nvSpPr>
+          <p:cNvPr id="5" name="Espace réservé du pied de page 4">
+            <a:extLst>
+              <a:ext uri="{FF2B5EF4-FFF2-40B4-BE49-F238E27FC236}">
+                <a16:creationId xmlns:a16="http://schemas.microsoft.com/office/drawing/2014/main" id="{6666CE6D-348B-4BD5-B6F3-311D1BF97F4E}"/>
+              </a:ext>
+            </a:extLst>
+          </p:cNvPr>
+          <p:cNvSpPr>
+            <a:spLocks noGrp="1"/>
+          </p:cNvSpPr>
+          <p:nvPr>
+            <p:ph type="ftr" sz="quarter" idx="11"/>
+          </p:nvPr>
+        </p:nvSpPr>
+        <p:spPr/>
+        <p:txBody>
+          <a:bodyPr/>
+          <a:lstStyle/>
+          <a:p>
+            <a:r>
+              <a:rPr lang="en-US"/>
+              <a:t>A. Martet / I. Clot</a:t>
+            </a:r>
             <a:endParaRPr lang="en-US" dirty="0"/>
           </a:p>
         </p:txBody>
@@ -7907,6 +8278,35 @@
           </a:prstGeom>
         </p:spPr>
       </p:pic>
+      <p:sp>
+        <p:nvSpPr>
+          <p:cNvPr id="2" name="Espace réservé du pied de page 1">
+            <a:extLst>
+              <a:ext uri="{FF2B5EF4-FFF2-40B4-BE49-F238E27FC236}">
+                <a16:creationId xmlns:a16="http://schemas.microsoft.com/office/drawing/2014/main" id="{BD520B18-1416-44FF-9EE4-6693A3FEDC8A}"/>
+              </a:ext>
+            </a:extLst>
+          </p:cNvPr>
+          <p:cNvSpPr>
+            <a:spLocks noGrp="1"/>
+          </p:cNvSpPr>
+          <p:nvPr>
+            <p:ph type="ftr" sz="quarter" idx="11"/>
+          </p:nvPr>
+        </p:nvSpPr>
+        <p:spPr/>
+        <p:txBody>
+          <a:bodyPr/>
+          <a:lstStyle/>
+          <a:p>
+            <a:r>
+              <a:rPr lang="en-US"/>
+              <a:t>A. Martet / I. Clot</a:t>
+            </a:r>
+            <a:endParaRPr lang="en-US" dirty="0"/>
+          </a:p>
+        </p:txBody>
+      </p:sp>
     </p:spTree>
     <p:extLst>
       <p:ext uri="{BB962C8B-B14F-4D97-AF65-F5344CB8AC3E}">
@@ -8059,6 +8459,35 @@
           </a:prstGeom>
         </p:spPr>
       </p:pic>
+      <p:sp>
+        <p:nvSpPr>
+          <p:cNvPr id="2" name="Espace réservé du pied de page 1">
+            <a:extLst>
+              <a:ext uri="{FF2B5EF4-FFF2-40B4-BE49-F238E27FC236}">
+                <a16:creationId xmlns:a16="http://schemas.microsoft.com/office/drawing/2014/main" id="{AAFA12E7-F6CD-49CD-9D7A-A8023CCB3DE4}"/>
+              </a:ext>
+            </a:extLst>
+          </p:cNvPr>
+          <p:cNvSpPr>
+            <a:spLocks noGrp="1"/>
+          </p:cNvSpPr>
+          <p:nvPr>
+            <p:ph type="ftr" sz="quarter" idx="11"/>
+          </p:nvPr>
+        </p:nvSpPr>
+        <p:spPr/>
+        <p:txBody>
+          <a:bodyPr/>
+          <a:lstStyle/>
+          <a:p>
+            <a:r>
+              <a:rPr lang="en-US"/>
+              <a:t>A. Martet / I. Clot</a:t>
+            </a:r>
+            <a:endParaRPr lang="en-US" dirty="0"/>
+          </a:p>
+        </p:txBody>
+      </p:sp>
     </p:spTree>
     <p:extLst>
       <p:ext uri="{BB962C8B-B14F-4D97-AF65-F5344CB8AC3E}">
@@ -8211,6 +8640,35 @@
           </a:prstGeom>
         </p:spPr>
       </p:pic>
+      <p:sp>
+        <p:nvSpPr>
+          <p:cNvPr id="2" name="Espace réservé du pied de page 1">
+            <a:extLst>
+              <a:ext uri="{FF2B5EF4-FFF2-40B4-BE49-F238E27FC236}">
+                <a16:creationId xmlns:a16="http://schemas.microsoft.com/office/drawing/2014/main" id="{845CD6FB-E156-44EC-A654-4EA2021AFCE9}"/>
+              </a:ext>
+            </a:extLst>
+          </p:cNvPr>
+          <p:cNvSpPr>
+            <a:spLocks noGrp="1"/>
+          </p:cNvSpPr>
+          <p:nvPr>
+            <p:ph type="ftr" sz="quarter" idx="11"/>
+          </p:nvPr>
+        </p:nvSpPr>
+        <p:spPr/>
+        <p:txBody>
+          <a:bodyPr/>
+          <a:lstStyle/>
+          <a:p>
+            <a:r>
+              <a:rPr lang="en-US"/>
+              <a:t>A. Martet / I. Clot</a:t>
+            </a:r>
+            <a:endParaRPr lang="en-US" dirty="0"/>
+          </a:p>
+        </p:txBody>
+      </p:sp>
     </p:spTree>
     <p:extLst>
       <p:ext uri="{BB962C8B-B14F-4D97-AF65-F5344CB8AC3E}">
@@ -8363,6 +8821,35 @@
           </a:prstGeom>
         </p:spPr>
       </p:pic>
+      <p:sp>
+        <p:nvSpPr>
+          <p:cNvPr id="2" name="Espace réservé du pied de page 1">
+            <a:extLst>
+              <a:ext uri="{FF2B5EF4-FFF2-40B4-BE49-F238E27FC236}">
+                <a16:creationId xmlns:a16="http://schemas.microsoft.com/office/drawing/2014/main" id="{24A8CEC1-F7AC-48CE-8B99-BBA8C7D45921}"/>
+              </a:ext>
+            </a:extLst>
+          </p:cNvPr>
+          <p:cNvSpPr>
+            <a:spLocks noGrp="1"/>
+          </p:cNvSpPr>
+          <p:nvPr>
+            <p:ph type="ftr" sz="quarter" idx="11"/>
+          </p:nvPr>
+        </p:nvSpPr>
+        <p:spPr/>
+        <p:txBody>
+          <a:bodyPr/>
+          <a:lstStyle/>
+          <a:p>
+            <a:r>
+              <a:rPr lang="en-US"/>
+              <a:t>A. Martet / I. Clot</a:t>
+            </a:r>
+            <a:endParaRPr lang="en-US" dirty="0"/>
+          </a:p>
+        </p:txBody>
+      </p:sp>
     </p:spTree>
     <p:extLst>
       <p:ext uri="{BB962C8B-B14F-4D97-AF65-F5344CB8AC3E}">
@@ -8515,6 +9002,35 @@
           </a:prstGeom>
         </p:spPr>
       </p:pic>
+      <p:sp>
+        <p:nvSpPr>
+          <p:cNvPr id="2" name="Espace réservé du pied de page 1">
+            <a:extLst>
+              <a:ext uri="{FF2B5EF4-FFF2-40B4-BE49-F238E27FC236}">
+                <a16:creationId xmlns:a16="http://schemas.microsoft.com/office/drawing/2014/main" id="{607AA5FF-F8BB-462E-9281-15E4AB87711A}"/>
+              </a:ext>
+            </a:extLst>
+          </p:cNvPr>
+          <p:cNvSpPr>
+            <a:spLocks noGrp="1"/>
+          </p:cNvSpPr>
+          <p:nvPr>
+            <p:ph type="ftr" sz="quarter" idx="11"/>
+          </p:nvPr>
+        </p:nvSpPr>
+        <p:spPr/>
+        <p:txBody>
+          <a:bodyPr/>
+          <a:lstStyle/>
+          <a:p>
+            <a:r>
+              <a:rPr lang="en-US"/>
+              <a:t>A. Martet / I. Clot</a:t>
+            </a:r>
+            <a:endParaRPr lang="en-US" dirty="0"/>
+          </a:p>
+        </p:txBody>
+      </p:sp>
     </p:spTree>
     <p:extLst>
       <p:ext uri="{BB962C8B-B14F-4D97-AF65-F5344CB8AC3E}">
@@ -9498,6 +10014,35 @@
           </a:p>
         </p:txBody>
       </p:sp>
+      <p:sp>
+        <p:nvSpPr>
+          <p:cNvPr id="4" name="Espace réservé du pied de page 3">
+            <a:extLst>
+              <a:ext uri="{FF2B5EF4-FFF2-40B4-BE49-F238E27FC236}">
+                <a16:creationId xmlns:a16="http://schemas.microsoft.com/office/drawing/2014/main" id="{82B45EF7-70CA-45D0-852E-32762AFEC2AE}"/>
+              </a:ext>
+            </a:extLst>
+          </p:cNvPr>
+          <p:cNvSpPr>
+            <a:spLocks noGrp="1"/>
+          </p:cNvSpPr>
+          <p:nvPr>
+            <p:ph type="ftr" sz="quarter" idx="11"/>
+          </p:nvPr>
+        </p:nvSpPr>
+        <p:spPr/>
+        <p:txBody>
+          <a:bodyPr/>
+          <a:lstStyle/>
+          <a:p>
+            <a:r>
+              <a:rPr lang="en-US"/>
+              <a:t>A. Martet / I. Clot</a:t>
+            </a:r>
+            <a:endParaRPr lang="en-US" dirty="0"/>
+          </a:p>
+        </p:txBody>
+      </p:sp>
     </p:spTree>
     <p:extLst>
       <p:ext uri="{BB962C8B-B14F-4D97-AF65-F5344CB8AC3E}">
@@ -10000,6 +10545,35 @@
           </a:prstGeom>
         </p:spPr>
       </p:pic>
+      <p:sp>
+        <p:nvSpPr>
+          <p:cNvPr id="3" name="Espace réservé du pied de page 2">
+            <a:extLst>
+              <a:ext uri="{FF2B5EF4-FFF2-40B4-BE49-F238E27FC236}">
+                <a16:creationId xmlns:a16="http://schemas.microsoft.com/office/drawing/2014/main" id="{A403CA73-405B-446B-A849-57930F13D11A}"/>
+              </a:ext>
+            </a:extLst>
+          </p:cNvPr>
+          <p:cNvSpPr>
+            <a:spLocks noGrp="1"/>
+          </p:cNvSpPr>
+          <p:nvPr>
+            <p:ph type="ftr" sz="quarter" idx="11"/>
+          </p:nvPr>
+        </p:nvSpPr>
+        <p:spPr/>
+        <p:txBody>
+          <a:bodyPr/>
+          <a:lstStyle/>
+          <a:p>
+            <a:r>
+              <a:rPr lang="en-US"/>
+              <a:t>A. Martet / I. Clot</a:t>
+            </a:r>
+            <a:endParaRPr lang="en-US" dirty="0"/>
+          </a:p>
+        </p:txBody>
+      </p:sp>
     </p:spTree>
     <p:extLst>
       <p:ext uri="{BB962C8B-B14F-4D97-AF65-F5344CB8AC3E}">
@@ -10609,4 +11183,299 @@
     </a:ext>
   </a:extLst>
 </a:theme>
+</file>
+
+<file path=ppt/theme/theme3.xml><?xml version="1.0" encoding="utf-8"?>
+<a:theme xmlns:a="http://schemas.openxmlformats.org/drawingml/2006/main" name="Thème Office">
+  <a:themeElements>
+    <a:clrScheme name="Office">
+      <a:dk1>
+        <a:sysClr val="windowText" lastClr="000000"/>
+      </a:dk1>
+      <a:lt1>
+        <a:sysClr val="window" lastClr="FFFFFF"/>
+      </a:lt1>
+      <a:dk2>
+        <a:srgbClr val="44546A"/>
+      </a:dk2>
+      <a:lt2>
+        <a:srgbClr val="E7E6E6"/>
+      </a:lt2>
+      <a:accent1>
+        <a:srgbClr val="4472C4"/>
+      </a:accent1>
+      <a:accent2>
+        <a:srgbClr val="ED7D31"/>
+      </a:accent2>
+      <a:accent3>
+        <a:srgbClr val="A5A5A5"/>
+      </a:accent3>
+      <a:accent4>
+        <a:srgbClr val="FFC000"/>
+      </a:accent4>
+      <a:accent5>
+        <a:srgbClr val="5B9BD5"/>
+      </a:accent5>
+      <a:accent6>
+        <a:srgbClr val="70AD47"/>
+      </a:accent6>
+      <a:hlink>
+        <a:srgbClr val="0563C1"/>
+      </a:hlink>
+      <a:folHlink>
+        <a:srgbClr val="954F72"/>
+      </a:folHlink>
+    </a:clrScheme>
+    <a:fontScheme name="Office">
+      <a:majorFont>
+        <a:latin typeface="Calibri Light" panose="020F0302020204030204"/>
+        <a:ea typeface=""/>
+        <a:cs typeface=""/>
+        <a:font script="Jpan" typeface="游ゴシック Light"/>
+        <a:font script="Hang" typeface="맑은 고딕"/>
+        <a:font script="Hans" typeface="等线 Light"/>
+        <a:font script="Hant" typeface="新細明體"/>
+        <a:font script="Arab" typeface="Times New Roman"/>
+        <a:font script="Hebr" typeface="Times New Roman"/>
+        <a:font script="Thai" typeface="Angsana New"/>
+        <a:font script="Ethi" typeface="Nyala"/>
+        <a:font script="Beng" typeface="Vrinda"/>
+        <a:font script="Gujr" typeface="Shruti"/>
+        <a:font script="Khmr" typeface="MoolBoran"/>
+        <a:font script="Knda" typeface="Tunga"/>
+        <a:font script="Guru" typeface="Raavi"/>
+        <a:font script="Cans" typeface="Euphemia"/>
+        <a:font script="Cher" typeface="Plantagenet Cherokee"/>
+        <a:font script="Yiii" typeface="Microsoft Yi Baiti"/>
+        <a:font script="Tibt" typeface="Microsoft Himalaya"/>
+        <a:font script="Thaa" typeface="MV Boli"/>
+        <a:font script="Deva" typeface="Mangal"/>
+        <a:font script="Telu" typeface="Gautami"/>
+        <a:font script="Taml" typeface="Latha"/>
+        <a:font script="Syrc" typeface="Estrangelo Edessa"/>
+        <a:font script="Orya" typeface="Kalinga"/>
+        <a:font script="Mlym" typeface="Kartika"/>
+        <a:font script="Laoo" typeface="DokChampa"/>
+        <a:font script="Sinh" typeface="Iskoola Pota"/>
+        <a:font script="Mong" typeface="Mongolian Baiti"/>
+        <a:font script="Viet" typeface="Times New Roman"/>
+        <a:font script="Uigh" typeface="Microsoft Uighur"/>
+        <a:font script="Geor" typeface="Sylfaen"/>
+        <a:font script="Armn" typeface="Arial"/>
+        <a:font script="Bugi" typeface="Leelawadee UI"/>
+        <a:font script="Bopo" typeface="Microsoft JhengHei"/>
+        <a:font script="Java" typeface="Javanese Text"/>
+        <a:font script="Lisu" typeface="Segoe UI"/>
+        <a:font script="Mymr" typeface="Myanmar Text"/>
+        <a:font script="Nkoo" typeface="Ebrima"/>
+        <a:font script="Olck" typeface="Nirmala UI"/>
+        <a:font script="Osma" typeface="Ebrima"/>
+        <a:font script="Phag" typeface="Phagspa"/>
+        <a:font script="Syrn" typeface="Estrangelo Edessa"/>
+        <a:font script="Syrj" typeface="Estrangelo Edessa"/>
+        <a:font script="Syre" typeface="Estrangelo Edessa"/>
+        <a:font script="Sora" typeface="Nirmala UI"/>
+        <a:font script="Tale" typeface="Microsoft Tai Le"/>
+        <a:font script="Talu" typeface="Microsoft New Tai Lue"/>
+        <a:font script="Tfng" typeface="Ebrima"/>
+      </a:majorFont>
+      <a:minorFont>
+        <a:latin typeface="Calibri" panose="020F0502020204030204"/>
+        <a:ea typeface=""/>
+        <a:cs typeface=""/>
+        <a:font script="Jpan" typeface="游ゴシック"/>
+        <a:font script="Hang" typeface="맑은 고딕"/>
+        <a:font script="Hans" typeface="等线"/>
+        <a:font script="Hant" typeface="新細明體"/>
+        <a:font script="Arab" typeface="Arial"/>
+        <a:font script="Hebr" typeface="Arial"/>
+        <a:font script="Thai" typeface="Cordia New"/>
+        <a:font script="Ethi" typeface="Nyala"/>
+        <a:font script="Beng" typeface="Vrinda"/>
+        <a:font script="Gujr" typeface="Shruti"/>
+        <a:font script="Khmr" typeface="DaunPenh"/>
+        <a:font script="Knda" typeface="Tunga"/>
+        <a:font script="Guru" typeface="Raavi"/>
+        <a:font script="Cans" typeface="Euphemia"/>
+        <a:font script="Cher" typeface="Plantagenet Cherokee"/>
+        <a:font script="Yiii" typeface="Microsoft Yi Baiti"/>
+        <a:font script="Tibt" typeface="Microsoft Himalaya"/>
+        <a:font script="Thaa" typeface="MV Boli"/>
+        <a:font script="Deva" typeface="Mangal"/>
+        <a:font script="Telu" typeface="Gautami"/>
+        <a:font script="Taml" typeface="Latha"/>
+        <a:font script="Syrc" typeface="Estrangelo Edessa"/>
+        <a:font script="Orya" typeface="Kalinga"/>
+        <a:font script="Mlym" typeface="Kartika"/>
+        <a:font script="Laoo" typeface="DokChampa"/>
+        <a:font script="Sinh" typeface="Iskoola Pota"/>
+        <a:font script="Mong" typeface="Mongolian Baiti"/>
+        <a:font script="Viet" typeface="Arial"/>
+        <a:font script="Uigh" typeface="Microsoft Uighur"/>
+        <a:font script="Geor" typeface="Sylfaen"/>
+        <a:font script="Armn" typeface="Arial"/>
+        <a:font script="Bugi" typeface="Leelawadee UI"/>
+        <a:font script="Bopo" typeface="Microsoft JhengHei"/>
+        <a:font script="Java" typeface="Javanese Text"/>
+        <a:font script="Lisu" typeface="Segoe UI"/>
+        <a:font script="Mymr" typeface="Myanmar Text"/>
+        <a:font script="Nkoo" typeface="Ebrima"/>
+        <a:font script="Olck" typeface="Nirmala UI"/>
+        <a:font script="Osma" typeface="Ebrima"/>
+        <a:font script="Phag" typeface="Phagspa"/>
+        <a:font script="Syrn" typeface="Estrangelo Edessa"/>
+        <a:font script="Syrj" typeface="Estrangelo Edessa"/>
+        <a:font script="Syre" typeface="Estrangelo Edessa"/>
+        <a:font script="Sora" typeface="Nirmala UI"/>
+        <a:font script="Tale" typeface="Microsoft Tai Le"/>
+        <a:font script="Talu" typeface="Microsoft New Tai Lue"/>
+        <a:font script="Tfng" typeface="Ebrima"/>
+      </a:minorFont>
+    </a:fontScheme>
+    <a:fmtScheme name="Office">
+      <a:fillStyleLst>
+        <a:solidFill>
+          <a:schemeClr val="phClr"/>
+        </a:solidFill>
+        <a:gradFill rotWithShape="1">
+          <a:gsLst>
+            <a:gs pos="0">
+              <a:schemeClr val="phClr">
+                <a:lumMod val="110000"/>
+                <a:satMod val="105000"/>
+                <a:tint val="67000"/>
+              </a:schemeClr>
+            </a:gs>
+            <a:gs pos="50000">
+              <a:schemeClr val="phClr">
+                <a:lumMod val="105000"/>
+                <a:satMod val="103000"/>
+                <a:tint val="73000"/>
+              </a:schemeClr>
+            </a:gs>
+            <a:gs pos="100000">
+              <a:schemeClr val="phClr">
+                <a:lumMod val="105000"/>
+                <a:satMod val="109000"/>
+                <a:tint val="81000"/>
+              </a:schemeClr>
+            </a:gs>
+          </a:gsLst>
+          <a:lin ang="5400000" scaled="0"/>
+        </a:gradFill>
+        <a:gradFill rotWithShape="1">
+          <a:gsLst>
+            <a:gs pos="0">
+              <a:schemeClr val="phClr">
+                <a:satMod val="103000"/>
+                <a:lumMod val="102000"/>
+                <a:tint val="94000"/>
+              </a:schemeClr>
+            </a:gs>
+            <a:gs pos="50000">
+              <a:schemeClr val="phClr">
+                <a:satMod val="110000"/>
+                <a:lumMod val="100000"/>
+                <a:shade val="100000"/>
+              </a:schemeClr>
+            </a:gs>
+            <a:gs pos="100000">
+              <a:schemeClr val="phClr">
+                <a:lumMod val="99000"/>
+                <a:satMod val="120000"/>
+                <a:shade val="78000"/>
+              </a:schemeClr>
+            </a:gs>
+          </a:gsLst>
+          <a:lin ang="5400000" scaled="0"/>
+        </a:gradFill>
+      </a:fillStyleLst>
+      <a:lnStyleLst>
+        <a:ln w="6350" cap="flat" cmpd="sng" algn="ctr">
+          <a:solidFill>
+            <a:schemeClr val="phClr"/>
+          </a:solidFill>
+          <a:prstDash val="solid"/>
+          <a:miter lim="800000"/>
+        </a:ln>
+        <a:ln w="12700" cap="flat" cmpd="sng" algn="ctr">
+          <a:solidFill>
+            <a:schemeClr val="phClr"/>
+          </a:solidFill>
+          <a:prstDash val="solid"/>
+          <a:miter lim="800000"/>
+        </a:ln>
+        <a:ln w="19050" cap="flat" cmpd="sng" algn="ctr">
+          <a:solidFill>
+            <a:schemeClr val="phClr"/>
+          </a:solidFill>
+          <a:prstDash val="solid"/>
+          <a:miter lim="800000"/>
+        </a:ln>
+      </a:lnStyleLst>
+      <a:effectStyleLst>
+        <a:effectStyle>
+          <a:effectLst/>
+        </a:effectStyle>
+        <a:effectStyle>
+          <a:effectLst/>
+        </a:effectStyle>
+        <a:effectStyle>
+          <a:effectLst>
+            <a:outerShdw blurRad="57150" dist="19050" dir="5400000" algn="ctr" rotWithShape="0">
+              <a:srgbClr val="000000">
+                <a:alpha val="63000"/>
+              </a:srgbClr>
+            </a:outerShdw>
+          </a:effectLst>
+        </a:effectStyle>
+      </a:effectStyleLst>
+      <a:bgFillStyleLst>
+        <a:solidFill>
+          <a:schemeClr val="phClr"/>
+        </a:solidFill>
+        <a:solidFill>
+          <a:schemeClr val="phClr">
+            <a:tint val="95000"/>
+            <a:satMod val="170000"/>
+          </a:schemeClr>
+        </a:solidFill>
+        <a:gradFill rotWithShape="1">
+          <a:gsLst>
+            <a:gs pos="0">
+              <a:schemeClr val="phClr">
+                <a:tint val="93000"/>
+                <a:satMod val="150000"/>
+                <a:shade val="98000"/>
+                <a:lumMod val="102000"/>
+              </a:schemeClr>
+            </a:gs>
+            <a:gs pos="50000">
+              <a:schemeClr val="phClr">
+                <a:tint val="98000"/>
+                <a:satMod val="130000"/>
+                <a:shade val="90000"/>
+                <a:lumMod val="103000"/>
+              </a:schemeClr>
+            </a:gs>
+            <a:gs pos="100000">
+              <a:schemeClr val="phClr">
+                <a:shade val="63000"/>
+                <a:satMod val="120000"/>
+              </a:schemeClr>
+            </a:gs>
+          </a:gsLst>
+          <a:lin ang="5400000" scaled="0"/>
+        </a:gradFill>
+      </a:bgFillStyleLst>
+    </a:fmtScheme>
+  </a:themeElements>
+  <a:objectDefaults/>
+  <a:extraClrSchemeLst/>
+  <a:extLst>
+    <a:ext uri="{05A4C25C-085E-4340-85A3-A5531E510DB2}">
+      <thm15:themeFamily xmlns:thm15="http://schemas.microsoft.com/office/thememl/2012/main" name="Office Theme" id="{62F939B6-93AF-4DB8-9C6B-D6C7DFDC589F}" vid="{4A3C46E8-61CC-4603-A589-7422A47A8E4A}"/>
+    </a:ext>
+  </a:extLst>
+</a:theme>
 </file>
</xml_diff>